<commit_message>
Presentation ppt from Christy v 2.0
</commit_message>
<xml_diff>
--- a/MachoHacks2018.pptx
+++ b/MachoHacks2018.pptx
@@ -9,13 +9,13 @@
   </p:notesMasterIdLst>
   <p:sldIdLst>
     <p:sldId id="256" r:id="rId2"/>
-    <p:sldId id="257" r:id="rId3"/>
+    <p:sldId id="260" r:id="rId3"/>
     <p:sldId id="259" r:id="rId4"/>
-    <p:sldId id="260" r:id="rId5"/>
-    <p:sldId id="261" r:id="rId6"/>
-    <p:sldId id="263" r:id="rId7"/>
-    <p:sldId id="264" r:id="rId8"/>
-    <p:sldId id="262" r:id="rId9"/>
+    <p:sldId id="261" r:id="rId5"/>
+    <p:sldId id="263" r:id="rId6"/>
+    <p:sldId id="264" r:id="rId7"/>
+    <p:sldId id="262" r:id="rId8"/>
+    <p:sldId id="266" r:id="rId9"/>
     <p:sldId id="265" r:id="rId10"/>
   </p:sldIdLst>
   <p:sldSz cx="12192000" cy="6858000"/>
@@ -527,10 +527,10 @@
                 <a:ea typeface="+mn-ea"/>
                 <a:cs typeface="+mn-cs"/>
               </a:rPr>
-              <a:t>If you think about it, proving that original documents you own are genuine is still mostly reliant on physical security features. Passports or academic certificates rely on things like security ink, watermarks, micro-text, or serial numbers printed on special security paper.  Scanned or</a:t>
-            </a:r>
-            <a:r>
-              <a:rPr lang="en-US" sz="1200" kern="1200" baseline="0" dirty="0" smtClean="0">
+              <a:t>Hey </a:t>
+            </a:r>
+            <a:r>
+              <a:rPr lang="en-US" sz="1200" kern="1200" dirty="0" err="1" smtClean="0">
                 <a:solidFill>
                   <a:schemeClr val="tx1"/>
                 </a:solidFill>
@@ -539,9 +539,255 @@
                 <a:ea typeface="+mn-ea"/>
                 <a:cs typeface="+mn-cs"/>
               </a:rPr>
-              <a:t> otherwise electronic documents have to be additionally verified by the issuer.</a:t>
-            </a:r>
-            <a:endParaRPr lang="en-US" dirty="0"/>
+              <a:t>MachoHackers</a:t>
+            </a:r>
+            <a:r>
+              <a:rPr lang="en-US" sz="1200" kern="1200" dirty="0" smtClean="0">
+                <a:solidFill>
+                  <a:schemeClr val="tx1"/>
+                </a:solidFill>
+                <a:effectLst/>
+                <a:latin typeface="+mn-lt"/>
+                <a:ea typeface="+mn-ea"/>
+                <a:cs typeface="+mn-cs"/>
+              </a:rPr>
+              <a:t>!  We’re &lt;team name&gt;.</a:t>
+            </a:r>
+            <a:r>
+              <a:rPr lang="en-US" sz="1200" kern="1200" baseline="0" dirty="0" smtClean="0">
+                <a:solidFill>
+                  <a:schemeClr val="tx1"/>
+                </a:solidFill>
+                <a:effectLst/>
+                <a:latin typeface="+mn-lt"/>
+                <a:ea typeface="+mn-ea"/>
+                <a:cs typeface="+mn-cs"/>
+              </a:rPr>
+              <a:t>  </a:t>
+            </a:r>
+          </a:p>
+          <a:p>
+            <a:endParaRPr lang="en-US" sz="1200" kern="1200" baseline="0" dirty="0" smtClean="0">
+              <a:solidFill>
+                <a:schemeClr val="tx1"/>
+              </a:solidFill>
+              <a:effectLst/>
+              <a:latin typeface="+mn-lt"/>
+              <a:ea typeface="+mn-ea"/>
+              <a:cs typeface="+mn-cs"/>
+            </a:endParaRPr>
+          </a:p>
+          <a:p>
+            <a:r>
+              <a:rPr lang="en-US" sz="1200" kern="1200" baseline="0" dirty="0" smtClean="0">
+                <a:solidFill>
+                  <a:schemeClr val="tx1"/>
+                </a:solidFill>
+                <a:effectLst/>
+                <a:latin typeface="+mn-lt"/>
+                <a:ea typeface="+mn-ea"/>
+                <a:cs typeface="+mn-cs"/>
+              </a:rPr>
+              <a:t>&lt;Team member introduction&gt;</a:t>
+            </a:r>
+          </a:p>
+          <a:p>
+            <a:endParaRPr lang="en-US" sz="1200" kern="1200" baseline="0" dirty="0" smtClean="0">
+              <a:solidFill>
+                <a:schemeClr val="tx1"/>
+              </a:solidFill>
+              <a:effectLst/>
+              <a:latin typeface="+mn-lt"/>
+              <a:ea typeface="+mn-ea"/>
+              <a:cs typeface="+mn-cs"/>
+            </a:endParaRPr>
+          </a:p>
+          <a:p>
+            <a:r>
+              <a:rPr lang="en-US" sz="1200" kern="1200" dirty="0" smtClean="0">
+                <a:solidFill>
+                  <a:schemeClr val="tx1"/>
+                </a:solidFill>
+                <a:effectLst/>
+                <a:latin typeface="+mn-lt"/>
+                <a:ea typeface="+mn-ea"/>
+                <a:cs typeface="+mn-cs"/>
+              </a:rPr>
+              <a:t>Most aspects of our lives have</a:t>
+            </a:r>
+            <a:r>
+              <a:rPr lang="en-US" sz="1200" kern="1200" baseline="0" dirty="0" smtClean="0">
+                <a:solidFill>
+                  <a:schemeClr val="tx1"/>
+                </a:solidFill>
+                <a:effectLst/>
+                <a:latin typeface="+mn-lt"/>
+                <a:ea typeface="+mn-ea"/>
+                <a:cs typeface="+mn-cs"/>
+              </a:rPr>
+              <a:t> been </a:t>
+            </a:r>
+            <a:r>
+              <a:rPr lang="en-US" sz="1200" kern="1200" baseline="0" dirty="0" err="1" smtClean="0">
+                <a:solidFill>
+                  <a:schemeClr val="tx1"/>
+                </a:solidFill>
+                <a:effectLst/>
+                <a:latin typeface="+mn-lt"/>
+                <a:ea typeface="+mn-ea"/>
+                <a:cs typeface="+mn-cs"/>
+              </a:rPr>
+              <a:t>digitised</a:t>
+            </a:r>
+            <a:r>
+              <a:rPr lang="en-US" sz="1200" kern="1200" baseline="0" dirty="0" smtClean="0">
+                <a:solidFill>
+                  <a:schemeClr val="tx1"/>
+                </a:solidFill>
+                <a:effectLst/>
+                <a:latin typeface="+mn-lt"/>
+                <a:ea typeface="+mn-ea"/>
+                <a:cs typeface="+mn-cs"/>
+              </a:rPr>
+              <a:t>, but one area remains resistant to the tides of change.  Most institutions still require hard copies for any official certification, because we’re r</a:t>
+            </a:r>
+            <a:r>
+              <a:rPr lang="en-US" sz="1200" kern="1200" dirty="0" smtClean="0">
+                <a:solidFill>
+                  <a:schemeClr val="tx1"/>
+                </a:solidFill>
+                <a:effectLst/>
+                <a:latin typeface="+mn-lt"/>
+                <a:ea typeface="+mn-ea"/>
+                <a:cs typeface="+mn-cs"/>
+              </a:rPr>
+              <a:t>eliant on physical security features</a:t>
+            </a:r>
+            <a:r>
+              <a:rPr lang="en-US" sz="1200" kern="1200" baseline="0" dirty="0" smtClean="0">
+                <a:solidFill>
+                  <a:schemeClr val="tx1"/>
+                </a:solidFill>
+                <a:effectLst/>
+                <a:latin typeface="+mn-lt"/>
+                <a:ea typeface="+mn-ea"/>
+                <a:cs typeface="+mn-cs"/>
+              </a:rPr>
+              <a:t> such as </a:t>
+            </a:r>
+            <a:r>
+              <a:rPr lang="en-US" sz="1200" kern="1200" dirty="0" smtClean="0">
+                <a:solidFill>
+                  <a:schemeClr val="tx1"/>
+                </a:solidFill>
+                <a:effectLst/>
+                <a:latin typeface="+mn-lt"/>
+                <a:ea typeface="+mn-ea"/>
+                <a:cs typeface="+mn-cs"/>
+              </a:rPr>
+              <a:t>security ink, watermarks, micro-text, or serial numbers printed on special security paper. </a:t>
+            </a:r>
+          </a:p>
+          <a:p>
+            <a:endParaRPr lang="en-US" sz="1200" kern="1200" baseline="0" dirty="0" smtClean="0">
+              <a:solidFill>
+                <a:schemeClr val="tx1"/>
+              </a:solidFill>
+              <a:effectLst/>
+              <a:latin typeface="+mn-lt"/>
+              <a:ea typeface="+mn-ea"/>
+              <a:cs typeface="+mn-cs"/>
+            </a:endParaRPr>
+          </a:p>
+          <a:p>
+            <a:pPr marL="0" marR="0" lvl="0" indent="0" algn="l" defTabSz="914400" rtl="0" eaLnBrk="1" fontAlgn="auto" latinLnBrk="0" hangingPunct="1">
+              <a:lnSpc>
+                <a:spcPct val="100000"/>
+              </a:lnSpc>
+              <a:spcBef>
+                <a:spcPts val="0"/>
+              </a:spcBef>
+              <a:spcAft>
+                <a:spcPts val="0"/>
+              </a:spcAft>
+              <a:buClrTx/>
+              <a:buSzTx/>
+              <a:buFontTx/>
+              <a:buNone/>
+              <a:tabLst/>
+              <a:defRPr/>
+            </a:pPr>
+            <a:r>
+              <a:rPr lang="en-US" sz="1200" kern="1200" baseline="0" dirty="0" smtClean="0">
+                <a:solidFill>
+                  <a:schemeClr val="tx1"/>
+                </a:solidFill>
+                <a:effectLst/>
+                <a:latin typeface="+mn-lt"/>
+                <a:ea typeface="+mn-ea"/>
+                <a:cs typeface="+mn-cs"/>
+              </a:rPr>
+              <a:t>This reliance on hard copies is slow and inflexible.  But with only 48 hours to deliver our project, we narrowed our focus to something that all six of us have struggled with as students -- we set out with the goal of </a:t>
+            </a:r>
+            <a:r>
+              <a:rPr lang="en-US" sz="1200" kern="1200" baseline="0" dirty="0" err="1" smtClean="0">
+                <a:solidFill>
+                  <a:schemeClr val="tx1"/>
+                </a:solidFill>
+                <a:effectLst/>
+                <a:latin typeface="+mn-lt"/>
+                <a:ea typeface="+mn-ea"/>
+                <a:cs typeface="+mn-cs"/>
+              </a:rPr>
+              <a:t>digitising</a:t>
+            </a:r>
+            <a:r>
+              <a:rPr lang="en-US" sz="1200" kern="1200" baseline="0" dirty="0" smtClean="0">
+                <a:solidFill>
+                  <a:schemeClr val="tx1"/>
+                </a:solidFill>
+                <a:effectLst/>
+                <a:latin typeface="+mn-lt"/>
+                <a:ea typeface="+mn-ea"/>
+                <a:cs typeface="+mn-cs"/>
+              </a:rPr>
+              <a:t> verified academic transcripts with </a:t>
+            </a:r>
+            <a:r>
+              <a:rPr lang="en-US" sz="1200" kern="1200" baseline="0" dirty="0" err="1" smtClean="0">
+                <a:solidFill>
+                  <a:schemeClr val="tx1"/>
+                </a:solidFill>
+                <a:effectLst/>
+                <a:latin typeface="+mn-lt"/>
+                <a:ea typeface="+mn-ea"/>
+                <a:cs typeface="+mn-cs"/>
+              </a:rPr>
+              <a:t>blockchain</a:t>
+            </a:r>
+            <a:r>
+              <a:rPr lang="en-US" sz="1200" kern="1200" baseline="0" dirty="0" smtClean="0">
+                <a:solidFill>
+                  <a:schemeClr val="tx1"/>
+                </a:solidFill>
+                <a:effectLst/>
+                <a:latin typeface="+mn-lt"/>
+                <a:ea typeface="+mn-ea"/>
+                <a:cs typeface="+mn-cs"/>
+              </a:rPr>
+              <a:t>.</a:t>
+            </a:r>
+          </a:p>
+          <a:p>
+            <a:endParaRPr lang="en-US" sz="1200" kern="1200" baseline="0" dirty="0" smtClean="0">
+              <a:solidFill>
+                <a:schemeClr val="tx1"/>
+              </a:solidFill>
+              <a:effectLst/>
+              <a:latin typeface="+mn-lt"/>
+              <a:ea typeface="+mn-ea"/>
+              <a:cs typeface="+mn-cs"/>
+            </a:endParaRPr>
           </a:p>
         </p:txBody>
       </p:sp>
@@ -626,12 +872,84 @@
           <a:lstStyle/>
           <a:p>
             <a:r>
+              <a:rPr lang="en-US" baseline="0" dirty="0" smtClean="0"/>
+              <a:t>Right now, it can be painful </a:t>
+            </a:r>
+            <a:r>
               <a:rPr lang="en-US" dirty="0" smtClean="0"/>
-              <a:t>This makes official documents very difficult to store and access safely.  If you put it in a physically secure spot,</a:t>
+              <a:t>applying to university</a:t>
             </a:r>
             <a:r>
               <a:rPr lang="en-US" baseline="0" dirty="0" smtClean="0"/>
-              <a:t> like a safety deposit box, you’re restricted by when your bank is open.  If you want to send something to several places, you have to request physical copies from the issuer, wait for it to be sent to you through snail mail, and then send it off again to whatever you’re applying for.  Or worse, you’ll have to go in person with your copy, perhaps repeatedly.  </a:t>
+              <a:t> or college. </a:t>
+            </a:r>
+            <a:endParaRPr lang="en-US" baseline="0" dirty="0" smtClean="0"/>
+          </a:p>
+          <a:p>
+            <a:endParaRPr lang="en-US" baseline="0" dirty="0" smtClean="0"/>
+          </a:p>
+          <a:p>
+            <a:r>
+              <a:rPr lang="en-US" baseline="0" dirty="0" smtClean="0"/>
+              <a:t>We </a:t>
+            </a:r>
+            <a:r>
+              <a:rPr lang="en-US" baseline="0" dirty="0" smtClean="0"/>
+              <a:t>think it’s </a:t>
+            </a:r>
+            <a:r>
+              <a:rPr lang="en-US" baseline="0" dirty="0" smtClean="0"/>
+              <a:t>unacceptable </a:t>
+            </a:r>
+            <a:r>
+              <a:rPr lang="en-US" baseline="0" dirty="0" smtClean="0"/>
+              <a:t>that it can take days or up to weeks </a:t>
+            </a:r>
+            <a:r>
+              <a:rPr lang="en-US" baseline="0" dirty="0" smtClean="0"/>
+              <a:t>to request, receive, and submit transcripts to schools of our choice.  The six of us are </a:t>
+            </a:r>
+            <a:r>
+              <a:rPr lang="en-US" baseline="0" dirty="0" smtClean="0"/>
+              <a:t>BCIT students, and </a:t>
+            </a:r>
+            <a:r>
+              <a:rPr lang="en-US" baseline="0" dirty="0" smtClean="0"/>
+              <a:t>we had </a:t>
+            </a:r>
+            <a:r>
+              <a:rPr lang="en-US" baseline="0" dirty="0" smtClean="0"/>
+              <a:t>to pay to get a physical copy of our transcript, scan it, and then </a:t>
+            </a:r>
+            <a:r>
+              <a:rPr lang="en-US" baseline="0" dirty="0" smtClean="0"/>
+              <a:t>send the scanned image </a:t>
+            </a:r>
+            <a:r>
+              <a:rPr lang="en-US" baseline="0" dirty="0" smtClean="0"/>
+              <a:t>to BCIT.  </a:t>
+            </a:r>
+            <a:endParaRPr lang="en-US" baseline="0" dirty="0" smtClean="0"/>
+          </a:p>
+          <a:p>
+            <a:endParaRPr lang="en-US" baseline="0" dirty="0" smtClean="0"/>
+          </a:p>
+          <a:p>
+            <a:r>
+              <a:rPr lang="en-US" baseline="0" dirty="0" smtClean="0"/>
+              <a:t>Going </a:t>
+            </a:r>
+            <a:r>
+              <a:rPr lang="en-US" baseline="0" dirty="0" smtClean="0"/>
+              <a:t>from digital to physical and back to digital </a:t>
+            </a:r>
+            <a:r>
+              <a:rPr lang="en-US" baseline="0" dirty="0" smtClean="0"/>
+              <a:t>makes no sense.  Our </a:t>
+            </a:r>
+            <a:r>
+              <a:rPr lang="en-US" baseline="0" dirty="0" smtClean="0"/>
+              <a:t>grades are stored inefficiently as JPEG or PDF files.</a:t>
             </a:r>
             <a:endParaRPr lang="en-US" dirty="0"/>
           </a:p>
@@ -663,7 +981,7 @@
     </p:spTree>
     <p:extLst>
       <p:ext uri="{BB962C8B-B14F-4D97-AF65-F5344CB8AC3E}">
-        <p14:creationId xmlns:p14="http://schemas.microsoft.com/office/powerpoint/2010/main" val="679755637"/>
+        <p14:creationId xmlns:p14="http://schemas.microsoft.com/office/powerpoint/2010/main" val="3955689357"/>
       </p:ext>
     </p:extLst>
   </p:cSld>
@@ -763,9 +1081,20 @@
                 <a:ea typeface="+mn-ea"/>
                 <a:cs typeface="+mn-cs"/>
               </a:rPr>
-              <a:t> everyone can trust.</a:t>
-            </a:r>
-            <a:endParaRPr lang="en-US" dirty="0"/>
+              <a:t> everyone can trust</a:t>
+            </a:r>
+            <a:r>
+              <a:rPr lang="en-US" sz="1200" kern="1200" baseline="0" dirty="0" smtClean="0">
+                <a:solidFill>
+                  <a:schemeClr val="tx1"/>
+                </a:solidFill>
+                <a:effectLst/>
+                <a:latin typeface="+mn-lt"/>
+                <a:ea typeface="+mn-ea"/>
+                <a:cs typeface="+mn-cs"/>
+              </a:rPr>
+              <a:t>. </a:t>
+            </a:r>
           </a:p>
         </p:txBody>
       </p:sp>
@@ -851,29 +1180,53 @@
           <a:p>
             <a:r>
               <a:rPr lang="en-US" dirty="0" smtClean="0"/>
-              <a:t>As</a:t>
+              <a:t>We decided to piggyback on an</a:t>
             </a:r>
             <a:r>
               <a:rPr lang="en-US" baseline="0" dirty="0" smtClean="0"/>
-              <a:t> students, we are especially concerned about verifying our academic </a:t>
+              <a:t> existing cryptocurrency – namely, either Bitcoin or </a:t>
+            </a:r>
+            <a:r>
+              <a:rPr lang="en-US" baseline="0" dirty="0" err="1" smtClean="0"/>
+              <a:t>Namecoin</a:t>
             </a:r>
             <a:r>
               <a:rPr lang="en-US" baseline="0" dirty="0" smtClean="0"/>
-              <a:t>transcripts so we’ll be using this as an example.  </a:t>
+              <a:t>. They’re well established and trusted, and not as susceptible </a:t>
             </a:r>
             <a:r>
               <a:rPr lang="en-US" baseline="0" dirty="0" smtClean="0"/>
-              <a:t>It’s painful </a:t>
-            </a:r>
-            <a:r>
-              <a:rPr lang="en-US" dirty="0" smtClean="0"/>
-              <a:t>applying to university</a:t>
+              <a:t>to attacks because </a:t>
             </a:r>
             <a:r>
               <a:rPr lang="en-US" baseline="0" dirty="0" smtClean="0"/>
-              <a:t> or college. We think it’s pretty unacceptable that it can take days or up to weeks to submit our transcripts.  We’re all BCIT students, and the six of us had to pay to get a physical copy of our transcript, scan it, and then send it to BCIT.  Going from digital to physical and back to digital is redundant, and our grades are stored inefficiently as JPEG or PDF files.</a:t>
-            </a:r>
-            <a:endParaRPr lang="en-US" dirty="0"/>
+              <a:t>of the size of their P2P network.</a:t>
+            </a:r>
+          </a:p>
+          <a:p>
+            <a:endParaRPr lang="en-US" baseline="0" dirty="0" smtClean="0"/>
+          </a:p>
+          <a:p>
+            <a:r>
+              <a:rPr lang="en-US" baseline="0" dirty="0" smtClean="0"/>
+              <a:t>If a university or college burns a small amount of money from their public address in provably </a:t>
+            </a:r>
+            <a:r>
+              <a:rPr lang="en-US" baseline="0" dirty="0" err="1" smtClean="0"/>
+              <a:t>unspendable</a:t>
+            </a:r>
+            <a:r>
+              <a:rPr lang="en-US" baseline="0" dirty="0" smtClean="0"/>
+              <a:t> commitments, they can use student and transcript information as inputs in creating a hash commitment on the </a:t>
+            </a:r>
+            <a:r>
+              <a:rPr lang="en-US" baseline="0" dirty="0" err="1" smtClean="0"/>
+              <a:t>blockchain</a:t>
+            </a:r>
+            <a:r>
+              <a:rPr lang="en-US" baseline="0" dirty="0" smtClean="0"/>
+              <a:t>.  This data can be signed by the issuer, and stored in the OP_RETURN field.</a:t>
+            </a:r>
           </a:p>
         </p:txBody>
       </p:sp>
@@ -903,7 +1256,7 @@
     </p:spTree>
     <p:extLst>
       <p:ext uri="{BB962C8B-B14F-4D97-AF65-F5344CB8AC3E}">
-        <p14:creationId xmlns:p14="http://schemas.microsoft.com/office/powerpoint/2010/main" val="3955689357"/>
+        <p14:creationId xmlns:p14="http://schemas.microsoft.com/office/powerpoint/2010/main" val="3627453317"/>
       </p:ext>
     </p:extLst>
   </p:cSld>
@@ -958,53 +1311,41 @@
           <a:lstStyle/>
           <a:p>
             <a:r>
-              <a:rPr lang="en-US" dirty="0" smtClean="0"/>
-              <a:t>We decided to piggyback on an</a:t>
-            </a:r>
-            <a:r>
               <a:rPr lang="en-US" baseline="0" dirty="0" smtClean="0"/>
-              <a:t> existing cryptocurrency – namely, either Bitcoin or </a:t>
+              <a:t>We felt that student information was too sensitive to store publicly, so our solution still uses a </a:t>
             </a:r>
             <a:r>
               <a:rPr lang="en-US" baseline="0" dirty="0" err="1" smtClean="0"/>
-              <a:t>Namecoin</a:t>
+              <a:t>centralised</a:t>
             </a:r>
             <a:r>
               <a:rPr lang="en-US" baseline="0" dirty="0" smtClean="0"/>
-              <a:t>. They’re well established and trusted, and not as susceptible to 51% attacks as a newly </a:t>
-            </a:r>
+              <a:t> database.</a:t>
+            </a:r>
+          </a:p>
+          <a:p>
+            <a:endParaRPr lang="en-US" baseline="0" dirty="0" smtClean="0"/>
+          </a:p>
+          <a:p>
             <a:r>
               <a:rPr lang="en-US" baseline="0" dirty="0" smtClean="0"/>
-              <a:t>minted </a:t>
+              <a:t>It’s important to note that our primary goal is </a:t>
+            </a:r>
+            <a:r>
+              <a:rPr lang="en-US" baseline="0" dirty="0" smtClean="0"/>
+              <a:t>improving efficiency </a:t>
+            </a:r>
+            <a:r>
+              <a:rPr lang="en-US" baseline="0" dirty="0" smtClean="0"/>
+              <a:t>and </a:t>
             </a:r>
             <a:r>
               <a:rPr lang="en-US" baseline="0" dirty="0" err="1" smtClean="0"/>
-              <a:t>blockchains</a:t>
+              <a:t>digitising</a:t>
             </a:r>
             <a:r>
               <a:rPr lang="en-US" baseline="0" dirty="0" smtClean="0"/>
-              <a:t> because of the size of their P2P network.</a:t>
-            </a:r>
-          </a:p>
-          <a:p>
-            <a:endParaRPr lang="en-US" baseline="0" dirty="0" smtClean="0"/>
-          </a:p>
-          <a:p>
-            <a:r>
-              <a:rPr lang="en-US" baseline="0" dirty="0" smtClean="0"/>
-              <a:t>If a university or college burns a small amount of money from their public address in provably </a:t>
-            </a:r>
-            <a:r>
-              <a:rPr lang="en-US" baseline="0" dirty="0" err="1" smtClean="0"/>
-              <a:t>unspendable</a:t>
-            </a:r>
-            <a:r>
-              <a:rPr lang="en-US" baseline="0" dirty="0" smtClean="0"/>
-              <a:t> </a:t>
-            </a:r>
-            <a:r>
-              <a:rPr lang="en-US" baseline="0" dirty="0" smtClean="0"/>
-              <a:t>commitments, they can use student and transcript information as inputs in creating a hash commitment on the </a:t>
+              <a:t> verification. Using </a:t>
             </a:r>
             <a:r>
               <a:rPr lang="en-US" baseline="0" dirty="0" err="1" smtClean="0"/>
@@ -1012,9 +1353,16 @@
             </a:r>
             <a:r>
               <a:rPr lang="en-US" baseline="0" dirty="0" smtClean="0"/>
-              <a:t>.  This data can be signed by the issuer, and stored in the OP_RETURN field.</a:t>
-            </a:r>
-            <a:endParaRPr lang="en-US" baseline="0" dirty="0" smtClean="0"/>
+              <a:t> for security is secondary.  Our implementation relies on the security of the database itself, and </a:t>
+            </a:r>
+            <a:r>
+              <a:rPr lang="en-US" baseline="0" dirty="0" err="1" smtClean="0"/>
+              <a:t>blockchain</a:t>
+            </a:r>
+            <a:r>
+              <a:rPr lang="en-US" baseline="0" dirty="0" smtClean="0"/>
+              <a:t> is at most used to notify us if information has been tampered with.</a:t>
+            </a:r>
           </a:p>
         </p:txBody>
       </p:sp>
@@ -1044,7 +1392,7 @@
     </p:spTree>
     <p:extLst>
       <p:ext uri="{BB962C8B-B14F-4D97-AF65-F5344CB8AC3E}">
-        <p14:creationId xmlns:p14="http://schemas.microsoft.com/office/powerpoint/2010/main" val="3627453317"/>
+        <p14:creationId xmlns:p14="http://schemas.microsoft.com/office/powerpoint/2010/main" val="2296405001"/>
       </p:ext>
     </p:extLst>
   </p:cSld>
@@ -1100,44 +1448,7 @@
           <a:p>
             <a:r>
               <a:rPr lang="en-US" baseline="0" dirty="0" smtClean="0"/>
-              <a:t>We felt that student information was too sensitive to store </a:t>
-            </a:r>
-            <a:r>
-              <a:rPr lang="en-US" baseline="0" dirty="0" smtClean="0"/>
-              <a:t>publicly, so our solution still uses a </a:t>
-            </a:r>
-            <a:r>
-              <a:rPr lang="en-US" baseline="0" dirty="0" err="1" smtClean="0"/>
-              <a:t>centralised</a:t>
-            </a:r>
-            <a:r>
-              <a:rPr lang="en-US" baseline="0" dirty="0" smtClean="0"/>
-              <a:t> database.</a:t>
-            </a:r>
-          </a:p>
-          <a:p>
-            <a:endParaRPr lang="en-US" baseline="0" dirty="0" smtClean="0"/>
-          </a:p>
-          <a:p>
-            <a:r>
-              <a:rPr lang="en-US" baseline="0" dirty="0" smtClean="0"/>
-              <a:t>It’s </a:t>
-            </a:r>
-            <a:r>
-              <a:rPr lang="en-US" baseline="0" dirty="0" smtClean="0"/>
-              <a:t>important to note that our primary goal is efficiency </a:t>
-            </a:r>
-            <a:r>
-              <a:rPr lang="en-US" baseline="0" dirty="0" smtClean="0"/>
-              <a:t>and </a:t>
-            </a:r>
-            <a:r>
-              <a:rPr lang="en-US" baseline="0" dirty="0" err="1" smtClean="0"/>
-              <a:t>digitising</a:t>
-            </a:r>
-            <a:r>
-              <a:rPr lang="en-US" baseline="0" dirty="0" smtClean="0"/>
-              <a:t> verification. Using </a:t>
+              <a:t>After the hash is committed to the </a:t>
             </a:r>
             <a:r>
               <a:rPr lang="en-US" baseline="0" dirty="0" err="1" smtClean="0"/>
@@ -1145,15 +1456,16 @@
             </a:r>
             <a:r>
               <a:rPr lang="en-US" baseline="0" dirty="0" smtClean="0"/>
-              <a:t> for security is secondary.  Our implementation relies on the security of the database itself, and </a:t>
-            </a:r>
-            <a:r>
-              <a:rPr lang="en-US" baseline="0" dirty="0" err="1" smtClean="0"/>
-              <a:t>blockchain</a:t>
-            </a:r>
+              <a:t>, students can log in to their school account to select the term grades they want to share.  A random key is generated and stored in the student database.</a:t>
+            </a:r>
+          </a:p>
+          <a:p>
+            <a:endParaRPr lang="en-US" baseline="0" dirty="0" smtClean="0"/>
+          </a:p>
+          <a:p>
             <a:r>
               <a:rPr lang="en-US" baseline="0" dirty="0" smtClean="0"/>
-              <a:t> is at most used to notify us if information has been tampered with.</a:t>
+              <a:t>This key is used to both pull up the relevant transcript information and to verify that the information displayed is correct.</a:t>
             </a:r>
           </a:p>
         </p:txBody>
@@ -1184,7 +1496,7 @@
     </p:spTree>
     <p:extLst>
       <p:ext uri="{BB962C8B-B14F-4D97-AF65-F5344CB8AC3E}">
-        <p14:creationId xmlns:p14="http://schemas.microsoft.com/office/powerpoint/2010/main" val="2296405001"/>
+        <p14:creationId xmlns:p14="http://schemas.microsoft.com/office/powerpoint/2010/main" val="2529185713"/>
       </p:ext>
     </p:extLst>
   </p:cSld>
@@ -1240,7 +1552,7 @@
           <a:p>
             <a:r>
               <a:rPr lang="en-US" baseline="0" dirty="0" smtClean="0"/>
-              <a:t>After the hash is committed to the </a:t>
+              <a:t>Once </a:t>
             </a:r>
             <a:r>
               <a:rPr lang="en-US" baseline="0" dirty="0" err="1" smtClean="0"/>
@@ -1248,7 +1560,23 @@
             </a:r>
             <a:r>
               <a:rPr lang="en-US" baseline="0" dirty="0" smtClean="0"/>
-              <a:t>, students can log in to their school account to select the term grades they want to share.  A random key is generated and stored in the student database.</a:t>
+              <a:t> gains further acceptance and understanding, institutions can certify and verify documents on their own privately maintained </a:t>
+            </a:r>
+            <a:r>
+              <a:rPr lang="en-US" baseline="0" dirty="0" err="1" smtClean="0"/>
+              <a:t>blockchain</a:t>
+            </a:r>
+            <a:r>
+              <a:rPr lang="en-US" baseline="0" dirty="0" smtClean="0"/>
+              <a:t> for further </a:t>
+            </a:r>
+            <a:r>
+              <a:rPr lang="en-US" baseline="0" dirty="0" err="1" smtClean="0"/>
+              <a:t>customisation</a:t>
+            </a:r>
+            <a:r>
+              <a:rPr lang="en-US" baseline="0" dirty="0" smtClean="0"/>
+              <a:t>. </a:t>
             </a:r>
           </a:p>
           <a:p>
@@ -1257,9 +1585,49 @@
           <a:p>
             <a:r>
               <a:rPr lang="en-US" baseline="0" dirty="0" smtClean="0"/>
-              <a:t>This key is used to both pull up the relevant transcript information and to verify that the information displayed is correct.</a:t>
-            </a:r>
+              <a:t>We can also </a:t>
+            </a:r>
+            <a:r>
+              <a:rPr lang="en-US" baseline="0" dirty="0" err="1" smtClean="0"/>
+              <a:t>optimise</a:t>
+            </a:r>
+            <a:r>
+              <a:rPr lang="en-US" baseline="0" dirty="0" smtClean="0"/>
+              <a:t> this concept by committing a </a:t>
+            </a:r>
+            <a:r>
+              <a:rPr lang="en-US" baseline="0" dirty="0" err="1" smtClean="0"/>
+              <a:t>Merkle</a:t>
+            </a:r>
+            <a:r>
+              <a:rPr lang="en-US" baseline="0" dirty="0" smtClean="0"/>
+              <a:t> root’s hash.  This way, we can logically store batches of information, like transcripts from all computer science students from the same graduating year.</a:t>
+            </a:r>
+          </a:p>
+          <a:p>
             <a:endParaRPr lang="en-US" baseline="0" dirty="0" smtClean="0"/>
+          </a:p>
+          <a:p>
+            <a:r>
+              <a:rPr lang="en-US" baseline="0" dirty="0" smtClean="0"/>
+              <a:t>While </a:t>
+            </a:r>
+            <a:r>
+              <a:rPr lang="en-US" baseline="0" dirty="0" err="1" smtClean="0"/>
+              <a:t>blockchain</a:t>
+            </a:r>
+            <a:r>
+              <a:rPr lang="en-US" baseline="0" dirty="0" smtClean="0"/>
+              <a:t> cryptocurrencies were originally conceived as a way to </a:t>
+            </a:r>
+            <a:r>
+              <a:rPr lang="en-US" baseline="0" dirty="0" err="1" smtClean="0"/>
+              <a:t>decentralise</a:t>
+            </a:r>
+            <a:r>
+              <a:rPr lang="en-US" baseline="0" dirty="0" smtClean="0"/>
+              <a:t> information, its properties as an immutable append-only ledger makes it an excellent choice for digital verification.</a:t>
+            </a:r>
           </a:p>
         </p:txBody>
       </p:sp>
@@ -1289,7 +1657,7 @@
     </p:spTree>
     <p:extLst>
       <p:ext uri="{BB962C8B-B14F-4D97-AF65-F5344CB8AC3E}">
-        <p14:creationId xmlns:p14="http://schemas.microsoft.com/office/powerpoint/2010/main" val="2529185713"/>
+        <p14:creationId xmlns:p14="http://schemas.microsoft.com/office/powerpoint/2010/main" val="4204968903"/>
       </p:ext>
     </p:extLst>
   </p:cSld>
@@ -1421,7 +1789,6 @@
               <a:rPr lang="en-US" baseline="0" dirty="0" smtClean="0"/>
               <a:t> information, its properties as an immutable append-only ledger makes it an excellent choice for digital verification.</a:t>
             </a:r>
-            <a:endParaRPr lang="en-US" baseline="0" dirty="0" smtClean="0"/>
           </a:p>
         </p:txBody>
       </p:sp>
@@ -1451,7 +1818,7 @@
     </p:spTree>
     <p:extLst>
       <p:ext uri="{BB962C8B-B14F-4D97-AF65-F5344CB8AC3E}">
-        <p14:creationId xmlns:p14="http://schemas.microsoft.com/office/powerpoint/2010/main" val="4204968903"/>
+        <p14:creationId xmlns:p14="http://schemas.microsoft.com/office/powerpoint/2010/main" val="2325144710"/>
       </p:ext>
     </p:extLst>
   </p:cSld>
@@ -7235,7 +7602,11 @@
             </a:r>
             <a:r>
               <a:rPr lang="en-US" sz="7000" b="1" dirty="0" smtClean="0"/>
-              <a:t> document certification</a:t>
+              <a:t> </a:t>
+            </a:r>
+            <a:r>
+              <a:rPr lang="en-US" sz="7000" b="1" dirty="0" smtClean="0"/>
+              <a:t>certification</a:t>
             </a:r>
             <a:endParaRPr lang="en-US" sz="7000" b="1" dirty="0"/>
           </a:p>
@@ -7269,7 +7640,7 @@
             </a:r>
             <a:r>
               <a:rPr lang="en-US" sz="4000" dirty="0" smtClean="0"/>
-              <a:t>Bubble three</a:t>
+              <a:t>NKB</a:t>
             </a:r>
             <a:endParaRPr lang="en-US" sz="4000" dirty="0" smtClean="0"/>
           </a:p>
@@ -7324,7 +7695,7 @@
           <a:p>
             <a:r>
               <a:rPr lang="en-US" sz="6000" b="1" dirty="0" smtClean="0"/>
-              <a:t>Problem</a:t>
+              <a:t>CURRENTLY…</a:t>
             </a:r>
             <a:endParaRPr lang="en-US" sz="6000" b="1" dirty="0"/>
           </a:p>
@@ -7342,8 +7713,8 @@
         </p:nvSpPr>
         <p:spPr>
           <a:xfrm>
-            <a:off x="685800" y="1975812"/>
-            <a:ext cx="7835347" cy="3649133"/>
+            <a:off x="685801" y="1975812"/>
+            <a:ext cx="10131425" cy="3649133"/>
           </a:xfrm>
         </p:spPr>
         <p:txBody>
@@ -7357,14 +7728,37 @@
             </a:pPr>
             <a:r>
               <a:rPr lang="en-US" sz="5000" dirty="0" smtClean="0"/>
-              <a:t>Verified certificates and documents are difficult to store, access, &amp; send quickly</a:t>
+              <a:t>Verification is</a:t>
+            </a:r>
+            <a:r>
+              <a:rPr lang="en-US" sz="5000" dirty="0" smtClean="0"/>
+              <a:t>:</a:t>
+            </a:r>
+            <a:endParaRPr lang="en-US" sz="5000" dirty="0"/>
+          </a:p>
+          <a:p>
+            <a:r>
+              <a:rPr lang="en-US" sz="5000" dirty="0" smtClean="0"/>
+              <a:t>Slow</a:t>
+            </a:r>
+          </a:p>
+          <a:p>
+            <a:r>
+              <a:rPr lang="en-US" sz="5000" dirty="0" smtClean="0"/>
+              <a:t>Redundant</a:t>
+            </a:r>
+          </a:p>
+          <a:p>
+            <a:r>
+              <a:rPr lang="en-US" sz="5000" dirty="0" smtClean="0"/>
+              <a:t>Inefficient </a:t>
             </a:r>
           </a:p>
         </p:txBody>
       </p:sp>
       <p:pic>
         <p:nvPicPr>
-          <p:cNvPr id="1026" name="Picture 2" descr="Modano Certification"/>
+          <p:cNvPr id="3074" name="Picture 2" descr="Nice Design Ideas Tortoise Clipart PNG Transparent Images All"/>
           <p:cNvPicPr>
             <a:picLocks noChangeAspect="1" noChangeArrowheads="1"/>
           </p:cNvPicPr>
@@ -7385,8 +7779,8 @@
         </p:blipFill>
         <p:spPr bwMode="auto">
           <a:xfrm>
-            <a:off x="8146472" y="2655694"/>
-            <a:ext cx="2969521" cy="2379424"/>
+            <a:off x="6056314" y="2944097"/>
+            <a:ext cx="5168278" cy="3059137"/>
           </a:xfrm>
           <a:prstGeom prst="rect">
             <a:avLst/>
@@ -7406,7 +7800,7 @@
     </p:spTree>
     <p:extLst>
       <p:ext uri="{BB962C8B-B14F-4D97-AF65-F5344CB8AC3E}">
-        <p14:creationId xmlns:p14="http://schemas.microsoft.com/office/powerpoint/2010/main" val="1608526326"/>
+        <p14:creationId xmlns:p14="http://schemas.microsoft.com/office/powerpoint/2010/main" val="4266650124"/>
       </p:ext>
     </p:extLst>
   </p:cSld>
@@ -7596,7 +7990,7 @@
           <a:p>
             <a:r>
               <a:rPr lang="en-US" sz="6000" b="1" dirty="0" smtClean="0"/>
-              <a:t>CURRENTLY…</a:t>
+              <a:t>Implementation</a:t>
             </a:r>
             <a:endParaRPr lang="en-US" sz="6000" b="1" dirty="0"/>
           </a:p>
@@ -7624,80 +8018,31 @@
           </a:bodyPr>
           <a:lstStyle/>
           <a:p>
-            <a:pPr marL="0" indent="0">
-              <a:buNone/>
-            </a:pPr>
             <a:r>
               <a:rPr lang="en-US" sz="5000" dirty="0" smtClean="0"/>
-              <a:t>Verifying academic transcripts is:</a:t>
-            </a:r>
-            <a:endParaRPr lang="en-US" sz="5000" dirty="0"/>
+              <a:t>Piggyback on existing cryptocurrency</a:t>
+            </a:r>
           </a:p>
           <a:p>
             <a:r>
               <a:rPr lang="en-US" sz="5000" dirty="0" smtClean="0"/>
-              <a:t>Slow</a:t>
-            </a:r>
-          </a:p>
-          <a:p>
+              <a:t>Use provably </a:t>
+            </a:r>
+            <a:r>
+              <a:rPr lang="en-US" sz="5000" dirty="0" err="1" smtClean="0"/>
+              <a:t>unspendable</a:t>
+            </a:r>
             <a:r>
               <a:rPr lang="en-US" sz="5000" dirty="0" smtClean="0"/>
-              <a:t>Redundant</a:t>
-            </a:r>
-          </a:p>
-          <a:p>
-            <a:r>
-              <a:rPr lang="en-US" sz="5000" dirty="0" smtClean="0"/>
-              <a:t>Inefficient </a:t>
-            </a:r>
-          </a:p>
-        </p:txBody>
-      </p:sp>
-      <p:pic>
-        <p:nvPicPr>
-          <p:cNvPr id="3074" name="Picture 2" descr="Nice Design Ideas Tortoise Clipart PNG Transparent Images All"/>
-          <p:cNvPicPr>
-            <a:picLocks noChangeAspect="1" noChangeArrowheads="1"/>
-          </p:cNvPicPr>
-          <p:nvPr/>
-        </p:nvPicPr>
-        <p:blipFill>
-          <a:blip r:embed="rId3">
-            <a:extLst>
-              <a:ext uri="{28A0092B-C50C-407E-A947-70E740481C1C}">
-                <a14:useLocalDpi xmlns:a14="http://schemas.microsoft.com/office/drawing/2010/main" val="0"/>
-              </a:ext>
-            </a:extLst>
-          </a:blip>
-          <a:srcRect/>
-          <a:stretch>
-            <a:fillRect/>
-          </a:stretch>
-        </p:blipFill>
-        <p:spPr bwMode="auto">
-          <a:xfrm>
-            <a:off x="6056314" y="2944097"/>
-            <a:ext cx="5168278" cy="3059137"/>
-          </a:xfrm>
-          <a:prstGeom prst="rect">
-            <a:avLst/>
-          </a:prstGeom>
-          <a:noFill/>
-          <a:extLst>
-            <a:ext uri="{909E8E84-426E-40DD-AFC4-6F175D3DCCD1}">
-              <a14:hiddenFill xmlns:a14="http://schemas.microsoft.com/office/drawing/2010/main">
-                <a:solidFill>
-                  <a:srgbClr val="FFFFFF"/>
-                </a:solidFill>
-              </a14:hiddenFill>
-            </a:ext>
-          </a:extLst>
-        </p:spPr>
-      </p:pic>
+              <a:t> commitments to store hashes signed by issuer in OP_RETURN field</a:t>
+            </a:r>
+          </a:p>
+        </p:txBody>
+      </p:sp>
     </p:spTree>
     <p:extLst>
       <p:ext uri="{BB962C8B-B14F-4D97-AF65-F5344CB8AC3E}">
-        <p14:creationId xmlns:p14="http://schemas.microsoft.com/office/powerpoint/2010/main" val="4266650124"/>
+        <p14:creationId xmlns:p14="http://schemas.microsoft.com/office/powerpoint/2010/main" val="516013789"/>
       </p:ext>
     </p:extLst>
   </p:cSld>
@@ -7761,112 +8106,6 @@
         </p:nvSpPr>
         <p:spPr>
           <a:xfrm>
-            <a:off x="685801" y="1975812"/>
-            <a:ext cx="10131425" cy="3649133"/>
-          </a:xfrm>
-        </p:spPr>
-        <p:txBody>
-          <a:bodyPr>
-            <a:noAutofit/>
-          </a:bodyPr>
-          <a:lstStyle/>
-          <a:p>
-            <a:r>
-              <a:rPr lang="en-US" sz="5000" dirty="0" smtClean="0"/>
-              <a:t>Piggyback on existing cryptocurrency</a:t>
-            </a:r>
-          </a:p>
-          <a:p>
-            <a:r>
-              <a:rPr lang="en-US" sz="5000" dirty="0" smtClean="0"/>
-              <a:t>Use provably </a:t>
-            </a:r>
-            <a:r>
-              <a:rPr lang="en-US" sz="5000" dirty="0" err="1" smtClean="0"/>
-              <a:t>unspendable</a:t>
-            </a:r>
-            <a:r>
-              <a:rPr lang="en-US" sz="5000" dirty="0" smtClean="0"/>
-              <a:t> </a:t>
-            </a:r>
-            <a:r>
-              <a:rPr lang="en-US" sz="5000" dirty="0" smtClean="0"/>
-              <a:t>commitments </a:t>
-            </a:r>
-            <a:r>
-              <a:rPr lang="en-US" sz="5000" dirty="0" smtClean="0"/>
-              <a:t>to store hashes signed by issuer in OP_RETURN field</a:t>
-            </a:r>
-          </a:p>
-        </p:txBody>
-      </p:sp>
-    </p:spTree>
-    <p:extLst>
-      <p:ext uri="{BB962C8B-B14F-4D97-AF65-F5344CB8AC3E}">
-        <p14:creationId xmlns:p14="http://schemas.microsoft.com/office/powerpoint/2010/main" val="516013789"/>
-      </p:ext>
-    </p:extLst>
-  </p:cSld>
-  <p:clrMapOvr>
-    <a:masterClrMapping/>
-  </p:clrMapOvr>
-</p:sld>
-</file>
-
-<file path=ppt/slides/slide6.xml><?xml version="1.0" encoding="utf-8"?>
-<p:sld xmlns:a="http://schemas.openxmlformats.org/drawingml/2006/main" xmlns:r="http://schemas.openxmlformats.org/officeDocument/2006/relationships" xmlns:p="http://schemas.openxmlformats.org/presentationml/2006/main">
-  <p:cSld>
-    <p:spTree>
-      <p:nvGrpSpPr>
-        <p:cNvPr id="1" name=""/>
-        <p:cNvGrpSpPr/>
-        <p:nvPr/>
-      </p:nvGrpSpPr>
-      <p:grpSpPr>
-        <a:xfrm>
-          <a:off x="0" y="0"/>
-          <a:ext cx="0" cy="0"/>
-          <a:chOff x="0" y="0"/>
-          <a:chExt cx="0" cy="0"/>
-        </a:xfrm>
-      </p:grpSpPr>
-      <p:sp>
-        <p:nvSpPr>
-          <p:cNvPr id="2" name="Title 1"/>
-          <p:cNvSpPr>
-            <a:spLocks noGrp="1"/>
-          </p:cNvSpPr>
-          <p:nvPr>
-            <p:ph type="title"/>
-          </p:nvPr>
-        </p:nvSpPr>
-        <p:spPr/>
-        <p:txBody>
-          <a:bodyPr>
-            <a:normAutofit/>
-          </a:bodyPr>
-          <a:lstStyle/>
-          <a:p>
-            <a:r>
-              <a:rPr lang="en-US" sz="6000" b="1" dirty="0" smtClean="0"/>
-              <a:t>Implementation</a:t>
-            </a:r>
-            <a:endParaRPr lang="en-US" sz="6000" b="1" dirty="0"/>
-          </a:p>
-        </p:txBody>
-      </p:sp>
-      <p:sp>
-        <p:nvSpPr>
-          <p:cNvPr id="3" name="Content Placeholder 2"/>
-          <p:cNvSpPr>
-            <a:spLocks noGrp="1"/>
-          </p:cNvSpPr>
-          <p:nvPr>
-            <p:ph idx="1"/>
-          </p:nvPr>
-        </p:nvSpPr>
-        <p:spPr>
-          <a:xfrm>
             <a:off x="685802" y="1975812"/>
             <a:ext cx="6735416" cy="3649133"/>
           </a:xfrm>
@@ -7883,11 +8122,7 @@
             </a:r>
             <a:r>
               <a:rPr lang="en-US" sz="5000" dirty="0" smtClean="0"/>
-              <a:t> </a:t>
-            </a:r>
-            <a:r>
-              <a:rPr lang="en-US" sz="5000" dirty="0" smtClean="0"/>
-              <a:t>database to protect confidential info</a:t>
+              <a:t> database to protect confidential info</a:t>
             </a:r>
           </a:p>
           <a:p>
@@ -7895,7 +8130,6 @@
               <a:rPr lang="en-US" sz="5000" dirty="0" smtClean="0"/>
               <a:t>Still reliant on database security</a:t>
             </a:r>
-            <a:endParaRPr lang="en-US" sz="5000" dirty="0" smtClean="0"/>
           </a:p>
         </p:txBody>
       </p:sp>
@@ -7953,7 +8187,7 @@
 </p:sld>
 </file>
 
-<file path=ppt/slides/slide7.xml><?xml version="1.0" encoding="utf-8"?>
+<file path=ppt/slides/slide6.xml><?xml version="1.0" encoding="utf-8"?>
 <p:sld xmlns:a="http://schemas.openxmlformats.org/drawingml/2006/main" xmlns:r="http://schemas.openxmlformats.org/officeDocument/2006/relationships" xmlns:p="http://schemas.openxmlformats.org/presentationml/2006/main">
   <p:cSld>
     <p:spTree>
@@ -8107,6 +8341,121 @@
 </p:sld>
 </file>
 
+<file path=ppt/slides/slide7.xml><?xml version="1.0" encoding="utf-8"?>
+<p:sld xmlns:a="http://schemas.openxmlformats.org/drawingml/2006/main" xmlns:r="http://schemas.openxmlformats.org/officeDocument/2006/relationships" xmlns:p="http://schemas.openxmlformats.org/presentationml/2006/main">
+  <p:cSld>
+    <p:spTree>
+      <p:nvGrpSpPr>
+        <p:cNvPr id="1" name=""/>
+        <p:cNvGrpSpPr/>
+        <p:nvPr/>
+      </p:nvGrpSpPr>
+      <p:grpSpPr>
+        <a:xfrm>
+          <a:off x="0" y="0"/>
+          <a:ext cx="0" cy="0"/>
+          <a:chOff x="0" y="0"/>
+          <a:chExt cx="0" cy="0"/>
+        </a:xfrm>
+      </p:grpSpPr>
+      <p:sp>
+        <p:nvSpPr>
+          <p:cNvPr id="2" name="Title 1"/>
+          <p:cNvSpPr>
+            <a:spLocks noGrp="1"/>
+          </p:cNvSpPr>
+          <p:nvPr>
+            <p:ph type="title"/>
+          </p:nvPr>
+        </p:nvSpPr>
+        <p:spPr/>
+        <p:txBody>
+          <a:bodyPr>
+            <a:normAutofit/>
+          </a:bodyPr>
+          <a:lstStyle/>
+          <a:p>
+            <a:r>
+              <a:rPr lang="en-US" sz="6000" b="1" dirty="0" smtClean="0"/>
+              <a:t>Future </a:t>
+            </a:r>
+            <a:r>
+              <a:rPr lang="en-US" sz="6000" b="1" dirty="0" smtClean="0"/>
+              <a:t>improvements</a:t>
+            </a:r>
+            <a:endParaRPr lang="en-US" sz="6000" b="1" dirty="0"/>
+          </a:p>
+        </p:txBody>
+      </p:sp>
+      <p:sp>
+        <p:nvSpPr>
+          <p:cNvPr id="3" name="Content Placeholder 2"/>
+          <p:cNvSpPr>
+            <a:spLocks noGrp="1"/>
+          </p:cNvSpPr>
+          <p:nvPr>
+            <p:ph idx="1"/>
+          </p:nvPr>
+        </p:nvSpPr>
+        <p:spPr>
+          <a:xfrm>
+            <a:off x="685801" y="1975812"/>
+            <a:ext cx="10131425" cy="3649133"/>
+          </a:xfrm>
+        </p:spPr>
+        <p:txBody>
+          <a:bodyPr>
+            <a:noAutofit/>
+          </a:bodyPr>
+          <a:lstStyle/>
+          <a:p>
+            <a:r>
+              <a:rPr lang="en-US" sz="5000" dirty="0" smtClean="0"/>
+              <a:t>Schools </a:t>
+            </a:r>
+            <a:r>
+              <a:rPr lang="en-US" sz="5000" dirty="0" smtClean="0"/>
+              <a:t>can maintain their own </a:t>
+            </a:r>
+            <a:r>
+              <a:rPr lang="en-US" sz="5000" dirty="0" err="1" smtClean="0"/>
+              <a:t>blockchain</a:t>
+            </a:r>
+            <a:endParaRPr lang="en-US" sz="5000" dirty="0" smtClean="0"/>
+          </a:p>
+          <a:p>
+            <a:r>
+              <a:rPr lang="en-US" sz="5000" dirty="0" err="1" smtClean="0"/>
+              <a:t>Optimising</a:t>
+            </a:r>
+            <a:r>
+              <a:rPr lang="en-US" sz="5000" dirty="0" smtClean="0"/>
+              <a:t> by collecting commitments with </a:t>
+            </a:r>
+            <a:r>
+              <a:rPr lang="en-US" sz="5000" dirty="0" err="1" smtClean="0"/>
+              <a:t>Merkle</a:t>
+            </a:r>
+            <a:r>
+              <a:rPr lang="en-US" sz="5000" dirty="0" smtClean="0"/>
+              <a:t> root hash</a:t>
+            </a:r>
+          </a:p>
+        </p:txBody>
+      </p:sp>
+    </p:spTree>
+    <p:extLst>
+      <p:ext uri="{BB962C8B-B14F-4D97-AF65-F5344CB8AC3E}">
+        <p14:creationId xmlns:p14="http://schemas.microsoft.com/office/powerpoint/2010/main" val="701794689"/>
+      </p:ext>
+    </p:extLst>
+  </p:cSld>
+  <p:clrMapOvr>
+    <a:masterClrMapping/>
+  </p:clrMapOvr>
+</p:sld>
+</file>
+
 <file path=ppt/slides/slide8.xml><?xml version="1.0" encoding="utf-8"?>
 <p:sld xmlns:a="http://schemas.openxmlformats.org/drawingml/2006/main" xmlns:r="http://schemas.openxmlformats.org/officeDocument/2006/relationships" xmlns:p="http://schemas.openxmlformats.org/presentationml/2006/main">
   <p:cSld>
@@ -8143,7 +8492,7 @@
           <a:p>
             <a:r>
               <a:rPr lang="en-US" sz="6000" b="1" dirty="0" smtClean="0"/>
-              <a:t>Future directions</a:t>
+              <a:t>Other applications</a:t>
             </a:r>
             <a:endParaRPr lang="en-US" sz="6000" b="1" dirty="0"/>
           </a:p>
@@ -8173,34 +8522,28 @@
           <a:p>
             <a:r>
               <a:rPr lang="en-US" sz="5000" dirty="0" smtClean="0"/>
-              <a:t>Institutions </a:t>
+              <a:t>Certification of any kind</a:t>
+            </a:r>
+            <a:r>
+              <a:rPr lang="en-US" sz="5000" dirty="0"/>
+              <a:t> </a:t>
             </a:r>
             <a:r>
               <a:rPr lang="en-US" sz="5000" dirty="0" smtClean="0"/>
-              <a:t>can maintain their own </a:t>
-            </a:r>
-            <a:r>
-              <a:rPr lang="en-US" sz="5000" dirty="0" err="1" smtClean="0"/>
-              <a:t>blockchain</a:t>
-            </a:r>
-            <a:endParaRPr lang="en-US" sz="5000" dirty="0" smtClean="0"/>
-          </a:p>
-          <a:p>
-            <a:r>
-              <a:rPr lang="en-US" sz="5000" dirty="0" err="1" smtClean="0"/>
-              <a:t>Optimising</a:t>
-            </a:r>
+              <a:t>from an issuer that consumers trust</a:t>
+            </a:r>
+          </a:p>
+          <a:p>
             <a:r>
               <a:rPr lang="en-US" sz="5000" dirty="0" smtClean="0"/>
-              <a:t> by collecting commitments with </a:t>
-            </a:r>
-            <a:r>
-              <a:rPr lang="en-US" sz="5000" dirty="0" err="1" smtClean="0"/>
-              <a:t>Merkle</a:t>
-            </a:r>
-            <a:r>
+              <a:t>Safe to use for confidential info</a:t>
+            </a:r>
+            <a:br>
               <a:rPr lang="en-US" sz="5000" dirty="0" smtClean="0"/>
-              <a:t> root hash</a:t>
+            </a:br>
+            <a:r>
+              <a:rPr lang="en-US" sz="5000" dirty="0" smtClean="0"/>
+              <a:t>(e.g. medical records)</a:t>
             </a:r>
           </a:p>
         </p:txBody>
@@ -8208,7 +8551,7 @@
     </p:spTree>
     <p:extLst>
       <p:ext uri="{BB962C8B-B14F-4D97-AF65-F5344CB8AC3E}">
-        <p14:creationId xmlns:p14="http://schemas.microsoft.com/office/powerpoint/2010/main" val="701794689"/>
+        <p14:creationId xmlns:p14="http://schemas.microsoft.com/office/powerpoint/2010/main" val="859995104"/>
       </p:ext>
     </p:extLst>
   </p:cSld>

</xml_diff>

<commit_message>
Presentation ppt from Christy v 3.0
</commit_message>
<xml_diff>
--- a/MachoHacks2018.pptx
+++ b/MachoHacks2018.pptx
@@ -5,7 +5,7 @@
     <p:sldMasterId id="2147483648" r:id="rId1"/>
   </p:sldMasterIdLst>
   <p:notesMasterIdLst>
-    <p:notesMasterId r:id="rId11"/>
+    <p:notesMasterId r:id="rId13"/>
   </p:notesMasterIdLst>
   <p:sldIdLst>
     <p:sldId id="256" r:id="rId2"/>
@@ -13,10 +13,12 @@
     <p:sldId id="259" r:id="rId4"/>
     <p:sldId id="261" r:id="rId5"/>
     <p:sldId id="263" r:id="rId6"/>
-    <p:sldId id="264" r:id="rId7"/>
-    <p:sldId id="262" r:id="rId8"/>
-    <p:sldId id="266" r:id="rId9"/>
-    <p:sldId id="265" r:id="rId10"/>
+    <p:sldId id="267" r:id="rId7"/>
+    <p:sldId id="264" r:id="rId8"/>
+    <p:sldId id="268" r:id="rId9"/>
+    <p:sldId id="262" r:id="rId10"/>
+    <p:sldId id="266" r:id="rId11"/>
+    <p:sldId id="265" r:id="rId12"/>
   </p:sldIdLst>
   <p:sldSz cx="12192000" cy="6858000"/>
   <p:notesSz cx="6858000" cy="9144000"/>
@@ -727,7 +729,31 @@
                 <a:ea typeface="+mn-ea"/>
                 <a:cs typeface="+mn-cs"/>
               </a:rPr>
-              <a:t>This reliance on hard copies is slow and inflexible.  But with only 48 hours to deliver our project, we narrowed our focus to something that all six of us have struggled with as students -- we set out with the goal of </a:t>
+              <a:t>This reliance on hard copies is slow and inflexible.  But with only 48 hours to deliver our project, we narrowed our focus to something that all six of us have struggled with as students </a:t>
+            </a:r>
+            <a:r>
+              <a:rPr lang="en-US" sz="1200" kern="1200" baseline="0" dirty="0" smtClean="0">
+                <a:solidFill>
+                  <a:schemeClr val="tx1"/>
+                </a:solidFill>
+                <a:effectLst/>
+                <a:latin typeface="+mn-lt"/>
+                <a:ea typeface="+mn-ea"/>
+                <a:cs typeface="+mn-cs"/>
+              </a:rPr>
+              <a:t>– so we </a:t>
+            </a:r>
+            <a:r>
+              <a:rPr lang="en-US" sz="1200" kern="1200" baseline="0" dirty="0" smtClean="0">
+                <a:solidFill>
+                  <a:schemeClr val="tx1"/>
+                </a:solidFill>
+                <a:effectLst/>
+                <a:latin typeface="+mn-lt"/>
+                <a:ea typeface="+mn-ea"/>
+                <a:cs typeface="+mn-cs"/>
+              </a:rPr>
+              <a:t>set out with the goal of </a:t>
             </a:r>
             <a:r>
               <a:rPr lang="en-US" sz="1200" kern="1200" baseline="0" dirty="0" err="1" smtClean="0">
@@ -818,6 +844,207 @@
     <p:extLst>
       <p:ext uri="{BB962C8B-B14F-4D97-AF65-F5344CB8AC3E}">
         <p14:creationId xmlns:p14="http://schemas.microsoft.com/office/powerpoint/2010/main" val="4096719260"/>
+      </p:ext>
+    </p:extLst>
+  </p:cSld>
+  <p:clrMapOvr>
+    <a:masterClrMapping/>
+  </p:clrMapOvr>
+</p:notes>
+</file>
+
+<file path=ppt/notesSlides/notesSlide10.xml><?xml version="1.0" encoding="utf-8"?>
+<p:notes xmlns:a="http://schemas.openxmlformats.org/drawingml/2006/main" xmlns:r="http://schemas.openxmlformats.org/officeDocument/2006/relationships" xmlns:p="http://schemas.openxmlformats.org/presentationml/2006/main">
+  <p:cSld>
+    <p:spTree>
+      <p:nvGrpSpPr>
+        <p:cNvPr id="1" name=""/>
+        <p:cNvGrpSpPr/>
+        <p:nvPr/>
+      </p:nvGrpSpPr>
+      <p:grpSpPr>
+        <a:xfrm>
+          <a:off x="0" y="0"/>
+          <a:ext cx="0" cy="0"/>
+          <a:chOff x="0" y="0"/>
+          <a:chExt cx="0" cy="0"/>
+        </a:xfrm>
+      </p:grpSpPr>
+      <p:sp>
+        <p:nvSpPr>
+          <p:cNvPr id="2" name="Slide Image Placeholder 1"/>
+          <p:cNvSpPr>
+            <a:spLocks noGrp="1" noRot="1" noChangeAspect="1"/>
+          </p:cNvSpPr>
+          <p:nvPr>
+            <p:ph type="sldImg"/>
+          </p:nvPr>
+        </p:nvSpPr>
+        <p:spPr/>
+      </p:sp>
+      <p:sp>
+        <p:nvSpPr>
+          <p:cNvPr id="3" name="Notes Placeholder 2"/>
+          <p:cNvSpPr>
+            <a:spLocks noGrp="1"/>
+          </p:cNvSpPr>
+          <p:nvPr>
+            <p:ph type="body" idx="1"/>
+          </p:nvPr>
+        </p:nvSpPr>
+        <p:spPr/>
+        <p:txBody>
+          <a:bodyPr/>
+          <a:lstStyle/>
+          <a:p>
+            <a:r>
+              <a:rPr lang="en-US" baseline="0" dirty="0" smtClean="0"/>
+              <a:t>While </a:t>
+            </a:r>
+            <a:r>
+              <a:rPr lang="en-US" baseline="0" dirty="0" err="1" smtClean="0"/>
+              <a:t>blockchain</a:t>
+            </a:r>
+            <a:r>
+              <a:rPr lang="en-US" baseline="0" dirty="0" smtClean="0"/>
+              <a:t> cryptocurrencies were originally conceived as a way to </a:t>
+            </a:r>
+            <a:r>
+              <a:rPr lang="en-US" baseline="0" dirty="0" err="1" smtClean="0"/>
+              <a:t>decentralise</a:t>
+            </a:r>
+            <a:r>
+              <a:rPr lang="en-US" baseline="0" dirty="0" smtClean="0"/>
+              <a:t> information, its properties as an immutable append-only ledger makes it an excellent choice for digital </a:t>
+            </a:r>
+            <a:r>
+              <a:rPr lang="en-US" baseline="0" dirty="0" smtClean="0"/>
+              <a:t>verification of any kind.</a:t>
+            </a:r>
+          </a:p>
+          <a:p>
+            <a:endParaRPr lang="en-US" baseline="0" dirty="0" smtClean="0"/>
+          </a:p>
+          <a:p>
+            <a:r>
+              <a:rPr lang="en-US" baseline="0" dirty="0" smtClean="0"/>
+              <a:t>And most importantly, it’s safe to use with confidential information.  So our solution is compatible with tracking things as sensitive as medical records as well.</a:t>
+            </a:r>
+            <a:endParaRPr lang="en-US" baseline="0" dirty="0" smtClean="0"/>
+          </a:p>
+        </p:txBody>
+      </p:sp>
+      <p:sp>
+        <p:nvSpPr>
+          <p:cNvPr id="4" name="Slide Number Placeholder 3"/>
+          <p:cNvSpPr>
+            <a:spLocks noGrp="1"/>
+          </p:cNvSpPr>
+          <p:nvPr>
+            <p:ph type="sldNum" sz="quarter" idx="10"/>
+          </p:nvPr>
+        </p:nvSpPr>
+        <p:spPr/>
+        <p:txBody>
+          <a:bodyPr/>
+          <a:lstStyle/>
+          <a:p>
+            <a:fld id="{EF034704-03E9-4A76-ACD6-2132D503C18D}" type="slidenum">
+              <a:rPr lang="en-US" smtClean="0"/>
+              <a:t>10</a:t>
+            </a:fld>
+            <a:endParaRPr lang="en-US"/>
+          </a:p>
+        </p:txBody>
+      </p:sp>
+    </p:spTree>
+    <p:extLst>
+      <p:ext uri="{BB962C8B-B14F-4D97-AF65-F5344CB8AC3E}">
+        <p14:creationId xmlns:p14="http://schemas.microsoft.com/office/powerpoint/2010/main" val="2325144710"/>
+      </p:ext>
+    </p:extLst>
+  </p:cSld>
+  <p:clrMapOvr>
+    <a:masterClrMapping/>
+  </p:clrMapOvr>
+</p:notes>
+</file>
+
+<file path=ppt/notesSlides/notesSlide11.xml><?xml version="1.0" encoding="utf-8"?>
+<p:notes xmlns:a="http://schemas.openxmlformats.org/drawingml/2006/main" xmlns:r="http://schemas.openxmlformats.org/officeDocument/2006/relationships" xmlns:p="http://schemas.openxmlformats.org/presentationml/2006/main">
+  <p:cSld>
+    <p:spTree>
+      <p:nvGrpSpPr>
+        <p:cNvPr id="1" name=""/>
+        <p:cNvGrpSpPr/>
+        <p:nvPr/>
+      </p:nvGrpSpPr>
+      <p:grpSpPr>
+        <a:xfrm>
+          <a:off x="0" y="0"/>
+          <a:ext cx="0" cy="0"/>
+          <a:chOff x="0" y="0"/>
+          <a:chExt cx="0" cy="0"/>
+        </a:xfrm>
+      </p:grpSpPr>
+      <p:sp>
+        <p:nvSpPr>
+          <p:cNvPr id="2" name="Slide Image Placeholder 1"/>
+          <p:cNvSpPr>
+            <a:spLocks noGrp="1" noRot="1" noChangeAspect="1"/>
+          </p:cNvSpPr>
+          <p:nvPr>
+            <p:ph type="sldImg"/>
+          </p:nvPr>
+        </p:nvSpPr>
+        <p:spPr/>
+      </p:sp>
+      <p:sp>
+        <p:nvSpPr>
+          <p:cNvPr id="3" name="Notes Placeholder 2"/>
+          <p:cNvSpPr>
+            <a:spLocks noGrp="1"/>
+          </p:cNvSpPr>
+          <p:nvPr>
+            <p:ph type="body" idx="1"/>
+          </p:nvPr>
+        </p:nvSpPr>
+        <p:spPr/>
+        <p:txBody>
+          <a:bodyPr/>
+          <a:lstStyle/>
+          <a:p>
+            <a:endParaRPr lang="en-US" baseline="0" dirty="0" smtClean="0"/>
+          </a:p>
+        </p:txBody>
+      </p:sp>
+      <p:sp>
+        <p:nvSpPr>
+          <p:cNvPr id="4" name="Slide Number Placeholder 3"/>
+          <p:cNvSpPr>
+            <a:spLocks noGrp="1"/>
+          </p:cNvSpPr>
+          <p:nvPr>
+            <p:ph type="sldNum" sz="quarter" idx="10"/>
+          </p:nvPr>
+        </p:nvSpPr>
+        <p:spPr/>
+        <p:txBody>
+          <a:bodyPr/>
+          <a:lstStyle/>
+          <a:p>
+            <a:fld id="{EF034704-03E9-4A76-ACD6-2132D503C18D}" type="slidenum">
+              <a:rPr lang="en-US" smtClean="0"/>
+              <a:t>11</a:t>
+            </a:fld>
+            <a:endParaRPr lang="en-US"/>
+          </a:p>
+        </p:txBody>
+      </p:sp>
+    </p:spTree>
+    <p:extLst>
+      <p:ext uri="{BB962C8B-B14F-4D97-AF65-F5344CB8AC3E}">
+        <p14:creationId xmlns:p14="http://schemas.microsoft.com/office/powerpoint/2010/main" val="4131472644"/>
       </p:ext>
     </p:extLst>
   </p:cSld>
@@ -881,7 +1108,7 @@
             </a:r>
             <a:r>
               <a:rPr lang="en-US" baseline="0" dirty="0" smtClean="0"/>
-              <a:t> or college. </a:t>
+              <a:t> or college.</a:t>
             </a:r>
             <a:endParaRPr lang="en-US" baseline="0" dirty="0" smtClean="0"/>
           </a:p>
@@ -891,65 +1118,52 @@
           <a:p>
             <a:r>
               <a:rPr lang="en-US" baseline="0" dirty="0" smtClean="0"/>
-              <a:t>We </a:t>
+              <a:t>It </a:t>
             </a:r>
             <a:r>
               <a:rPr lang="en-US" baseline="0" dirty="0" smtClean="0"/>
-              <a:t>think it’s </a:t>
+              <a:t>can take days or up to weeks </a:t>
             </a:r>
             <a:r>
               <a:rPr lang="en-US" baseline="0" dirty="0" smtClean="0"/>
-              <a:t>unacceptable </a:t>
+              <a:t>to request, receive and </a:t>
             </a:r>
             <a:r>
               <a:rPr lang="en-US" baseline="0" dirty="0" smtClean="0"/>
-              <a:t>that it can take days or up to weeks </a:t>
+              <a:t>submit </a:t>
             </a:r>
             <a:r>
               <a:rPr lang="en-US" baseline="0" dirty="0" smtClean="0"/>
-              <a:t>to request, receive, and submit transcripts to schools of our choice.  The six of us are </a:t>
+              <a:t>transcripts </a:t>
             </a:r>
             <a:r>
               <a:rPr lang="en-US" baseline="0" dirty="0" smtClean="0"/>
-              <a:t>BCIT students, and </a:t>
+              <a:t>to schools of </a:t>
             </a:r>
             <a:r>
               <a:rPr lang="en-US" baseline="0" dirty="0" smtClean="0"/>
-              <a:t>we had </a:t>
+              <a:t>our </a:t>
             </a:r>
             <a:r>
               <a:rPr lang="en-US" baseline="0" dirty="0" smtClean="0"/>
-              <a:t>to pay to get a physical copy of our transcript, scan it, and then </a:t>
+              <a:t>choice.  </a:t>
             </a:r>
             <a:r>
               <a:rPr lang="en-US" baseline="0" dirty="0" smtClean="0"/>
-              <a:t>send the scanned image </a:t>
+              <a:t>As students, we had to pay $10 to </a:t>
             </a:r>
             <a:r>
               <a:rPr lang="en-US" baseline="0" dirty="0" smtClean="0"/>
-              <a:t>to BCIT.  </a:t>
-            </a:r>
+              <a:t>get a physical copy of our transcript, scan it, and then send the scanned image to BCIT.  </a:t>
+            </a:r>
+          </a:p>
+          <a:p>
             <a:endParaRPr lang="en-US" baseline="0" dirty="0" smtClean="0"/>
           </a:p>
           <a:p>
-            <a:endParaRPr lang="en-US" baseline="0" dirty="0" smtClean="0"/>
-          </a:p>
-          <a:p>
             <a:r>
               <a:rPr lang="en-US" baseline="0" dirty="0" smtClean="0"/>
-              <a:t>Going </a:t>
-            </a:r>
-            <a:r>
-              <a:rPr lang="en-US" baseline="0" dirty="0" smtClean="0"/>
-              <a:t>from digital to physical and back to digital </a:t>
-            </a:r>
-            <a:r>
-              <a:rPr lang="en-US" baseline="0" dirty="0" smtClean="0"/>
-              <a:t>makes no sense.  Our </a:t>
-            </a:r>
-            <a:r>
-              <a:rPr lang="en-US" baseline="0" dirty="0" smtClean="0"/>
-              <a:t>grades are stored inefficiently as JPEG or PDF files.</a:t>
+              <a:t>Going from digital to physical and back to digital makes no sense.  </a:t>
             </a:r>
             <a:endParaRPr lang="en-US" dirty="0"/>
           </a:p>
@@ -1081,19 +1295,7 @@
                 <a:ea typeface="+mn-ea"/>
                 <a:cs typeface="+mn-cs"/>
               </a:rPr>
-              <a:t> everyone can trust</a:t>
-            </a:r>
-            <a:r>
-              <a:rPr lang="en-US" sz="1200" kern="1200" baseline="0" dirty="0" smtClean="0">
-                <a:solidFill>
-                  <a:schemeClr val="tx1"/>
-                </a:solidFill>
-                <a:effectLst/>
-                <a:latin typeface="+mn-lt"/>
-                <a:ea typeface="+mn-ea"/>
-                <a:cs typeface="+mn-cs"/>
-              </a:rPr>
-              <a:t>. </a:t>
+              <a:t> everyone can trust. </a:t>
             </a:r>
           </a:p>
         </p:txBody>
@@ -1192,32 +1394,20 @@
             </a:r>
             <a:r>
               <a:rPr lang="en-US" baseline="0" dirty="0" smtClean="0"/>
-              <a:t>. They’re well established and trusted, and not as susceptible </a:t>
+              <a:t>. They’re well established and trusted, and not as susceptible to attacks because of the size of their P2P network</a:t>
             </a:r>
             <a:r>
               <a:rPr lang="en-US" baseline="0" dirty="0" smtClean="0"/>
-              <a:t>to attacks because </a:t>
-            </a:r>
+              <a:t>.</a:t>
+            </a:r>
+          </a:p>
+          <a:p>
+            <a:endParaRPr lang="en-US" baseline="0" dirty="0" smtClean="0"/>
+          </a:p>
+          <a:p>
             <a:r>
               <a:rPr lang="en-US" baseline="0" dirty="0" smtClean="0"/>
-              <a:t>of the size of their P2P network.</a:t>
-            </a:r>
-          </a:p>
-          <a:p>
-            <a:endParaRPr lang="en-US" baseline="0" dirty="0" smtClean="0"/>
-          </a:p>
-          <a:p>
-            <a:r>
-              <a:rPr lang="en-US" baseline="0" dirty="0" smtClean="0"/>
-              <a:t>If a university or college burns a small amount of money from their public address in provably </a:t>
-            </a:r>
-            <a:r>
-              <a:rPr lang="en-US" baseline="0" dirty="0" err="1" smtClean="0"/>
-              <a:t>unspendable</a:t>
-            </a:r>
-            <a:r>
-              <a:rPr lang="en-US" baseline="0" dirty="0" smtClean="0"/>
-              <a:t> commitments, they can use student and transcript information as inputs in creating a hash commitment on the </a:t>
+              <a:t>We store hashes signed by the school on the </a:t>
             </a:r>
             <a:r>
               <a:rPr lang="en-US" baseline="0" dirty="0" err="1" smtClean="0"/>
@@ -1225,8 +1415,9 @@
             </a:r>
             <a:r>
               <a:rPr lang="en-US" baseline="0" dirty="0" smtClean="0"/>
-              <a:t>.  This data can be signed by the issuer, and stored in the OP_RETURN field.</a:t>
-            </a:r>
+              <a:t>.</a:t>
+            </a:r>
+            <a:endParaRPr lang="en-US" baseline="0" dirty="0" smtClean="0"/>
           </a:p>
         </p:txBody>
       </p:sp>
@@ -1329,15 +1520,15 @@
           <a:p>
             <a:r>
               <a:rPr lang="en-US" baseline="0" dirty="0" smtClean="0"/>
-              <a:t>It’s important to note that our primary goal is </a:t>
+              <a:t>It’s important to note that our </a:t>
+            </a:r>
+            <a:r>
+              <a:rPr lang="en-US" b="1" baseline="0" dirty="0" smtClean="0"/>
+              <a:t>primary goal </a:t>
             </a:r>
             <a:r>
               <a:rPr lang="en-US" baseline="0" dirty="0" smtClean="0"/>
-              <a:t>improving efficiency </a:t>
-            </a:r>
-            <a:r>
-              <a:rPr lang="en-US" baseline="0" dirty="0" smtClean="0"/>
-              <a:t>and </a:t>
+              <a:t>is improving efficiency and </a:t>
             </a:r>
             <a:r>
               <a:rPr lang="en-US" baseline="0" dirty="0" err="1" smtClean="0"/>
@@ -1353,16 +1544,13 @@
             </a:r>
             <a:r>
               <a:rPr lang="en-US" baseline="0" dirty="0" smtClean="0"/>
-              <a:t> for security is secondary.  Our implementation relies on the security of the database itself, and </a:t>
-            </a:r>
-            <a:r>
-              <a:rPr lang="en-US" baseline="0" dirty="0" err="1" smtClean="0"/>
-              <a:t>blockchain</a:t>
+              <a:t> for security is secondary.  Our implementation relies on the security of the database </a:t>
             </a:r>
             <a:r>
               <a:rPr lang="en-US" baseline="0" dirty="0" smtClean="0"/>
-              <a:t> is at most used to notify us if information has been tampered with.</a:t>
-            </a:r>
+              <a:t>itself.</a:t>
+            </a:r>
+            <a:endParaRPr lang="en-US" baseline="0" dirty="0" smtClean="0"/>
           </a:p>
         </p:txBody>
       </p:sp>
@@ -1448,7 +1636,36 @@
           <a:p>
             <a:r>
               <a:rPr lang="en-US" baseline="0" dirty="0" smtClean="0"/>
-              <a:t>After the hash is committed to the </a:t>
+              <a:t>Let’s take a closer look at the nuts and bolts.  </a:t>
+            </a:r>
+          </a:p>
+          <a:p>
+            <a:endParaRPr lang="en-US" baseline="0" dirty="0" smtClean="0"/>
+          </a:p>
+          <a:p>
+            <a:r>
+              <a:rPr lang="en-US" baseline="0" dirty="0" smtClean="0"/>
+              <a:t>We take information from the student database as inputs to generate a hash that is verified by the school.  The school burns a small amount of money from their public address in </a:t>
+            </a:r>
+            <a:r>
+              <a:rPr lang="en-US" b="1" baseline="0" dirty="0" smtClean="0"/>
+              <a:t>provably </a:t>
+            </a:r>
+            <a:r>
+              <a:rPr lang="en-US" b="1" baseline="0" dirty="0" err="1" smtClean="0"/>
+              <a:t>unspendable</a:t>
+            </a:r>
+            <a:r>
+              <a:rPr lang="en-US" b="1" baseline="0" dirty="0" smtClean="0"/>
+              <a:t> commitments </a:t>
+            </a:r>
+            <a:r>
+              <a:rPr lang="en-US" b="0" baseline="0" dirty="0" smtClean="0"/>
+              <a:t>to store hashes</a:t>
+            </a:r>
+            <a:r>
+              <a:rPr lang="en-US" baseline="0" dirty="0" smtClean="0"/>
+              <a:t> in the OP_RETURN field on a </a:t>
             </a:r>
             <a:r>
               <a:rPr lang="en-US" baseline="0" dirty="0" err="1" smtClean="0"/>
@@ -1456,17 +1673,9 @@
             </a:r>
             <a:r>
               <a:rPr lang="en-US" baseline="0" dirty="0" smtClean="0"/>
-              <a:t>, students can log in to their school account to select the term grades they want to share.  A random key is generated and stored in the student database.</a:t>
-            </a:r>
-          </a:p>
-          <a:p>
+              <a:t>.</a:t>
+            </a:r>
             <a:endParaRPr lang="en-US" baseline="0" dirty="0" smtClean="0"/>
-          </a:p>
-          <a:p>
-            <a:r>
-              <a:rPr lang="en-US" baseline="0" dirty="0" smtClean="0"/>
-              <a:t>This key is used to both pull up the relevant transcript information and to verify that the information displayed is correct.</a:t>
-            </a:r>
           </a:p>
         </p:txBody>
       </p:sp>
@@ -1496,7 +1705,7 @@
     </p:spTree>
     <p:extLst>
       <p:ext uri="{BB962C8B-B14F-4D97-AF65-F5344CB8AC3E}">
-        <p14:creationId xmlns:p14="http://schemas.microsoft.com/office/powerpoint/2010/main" val="2529185713"/>
+        <p14:creationId xmlns:p14="http://schemas.microsoft.com/office/powerpoint/2010/main" val="314149806"/>
       </p:ext>
     </p:extLst>
   </p:cSld>
@@ -1552,31 +1761,23 @@
           <a:p>
             <a:r>
               <a:rPr lang="en-US" baseline="0" dirty="0" smtClean="0"/>
-              <a:t>Once </a:t>
-            </a:r>
-            <a:r>
-              <a:rPr lang="en-US" baseline="0" dirty="0" err="1" smtClean="0"/>
-              <a:t>blockchain</a:t>
+              <a:t>After </a:t>
             </a:r>
             <a:r>
               <a:rPr lang="en-US" baseline="0" dirty="0" smtClean="0"/>
-              <a:t> gains further acceptance and understanding, institutions can certify and verify documents on their own privately maintained </a:t>
-            </a:r>
-            <a:r>
-              <a:rPr lang="en-US" baseline="0" dirty="0" err="1" smtClean="0"/>
-              <a:t>blockchain</a:t>
+              <a:t>the hash commitment, </a:t>
             </a:r>
             <a:r>
               <a:rPr lang="en-US" baseline="0" dirty="0" smtClean="0"/>
-              <a:t> for further </a:t>
-            </a:r>
-            <a:r>
-              <a:rPr lang="en-US" baseline="0" dirty="0" err="1" smtClean="0"/>
-              <a:t>customisation</a:t>
+              <a:t>students can log in to their school account to select the term grades they want to share.  A random key </a:t>
             </a:r>
             <a:r>
               <a:rPr lang="en-US" baseline="0" dirty="0" smtClean="0"/>
-              <a:t>. </a:t>
+              <a:t>and transcript file are generated based on their choice, and the random key is </a:t>
+            </a:r>
+            <a:r>
+              <a:rPr lang="en-US" baseline="0" dirty="0" smtClean="0"/>
+              <a:t>stored in the student database.</a:t>
             </a:r>
           </a:p>
           <a:p>
@@ -1585,48 +1786,31 @@
           <a:p>
             <a:r>
               <a:rPr lang="en-US" baseline="0" dirty="0" smtClean="0"/>
-              <a:t>We can also </a:t>
-            </a:r>
-            <a:r>
-              <a:rPr lang="en-US" baseline="0" dirty="0" err="1" smtClean="0"/>
-              <a:t>optimise</a:t>
+              <a:t>This key is used to </a:t>
             </a:r>
             <a:r>
               <a:rPr lang="en-US" baseline="0" dirty="0" smtClean="0"/>
-              <a:t> this concept by committing a </a:t>
-            </a:r>
-            <a:r>
-              <a:rPr lang="en-US" baseline="0" dirty="0" err="1" smtClean="0"/>
-              <a:t>Merkle</a:t>
+              <a:t>(a) pull </a:t>
             </a:r>
             <a:r>
               <a:rPr lang="en-US" baseline="0" dirty="0" smtClean="0"/>
-              <a:t> root’s hash.  This way, we can logically store batches of information, like transcripts from all computer science students from the same graduating year.</a:t>
-            </a:r>
-          </a:p>
-          <a:p>
-            <a:endParaRPr lang="en-US" baseline="0" dirty="0" smtClean="0"/>
-          </a:p>
-          <a:p>
+              <a:t>up the relevant transcript information </a:t>
+            </a:r>
             <a:r>
               <a:rPr lang="en-US" baseline="0" dirty="0" smtClean="0"/>
-              <a:t>While </a:t>
-            </a:r>
-            <a:r>
-              <a:rPr lang="en-US" baseline="0" dirty="0" err="1" smtClean="0"/>
-              <a:t>blockchain</a:t>
+              <a:t>and (b) </a:t>
             </a:r>
             <a:r>
               <a:rPr lang="en-US" baseline="0" dirty="0" smtClean="0"/>
-              <a:t> cryptocurrencies were originally conceived as a way to </a:t>
-            </a:r>
-            <a:r>
-              <a:rPr lang="en-US" baseline="0" dirty="0" err="1" smtClean="0"/>
-              <a:t>decentralise</a:t>
+              <a:t>to </a:t>
             </a:r>
             <a:r>
               <a:rPr lang="en-US" baseline="0" dirty="0" smtClean="0"/>
-              <a:t> information, its properties as an immutable append-only ledger makes it an excellent choice for digital verification.</a:t>
+              <a:t>calculate the hash and verify </a:t>
+            </a:r>
+            <a:r>
+              <a:rPr lang="en-US" baseline="0" dirty="0" smtClean="0"/>
+              <a:t>that the information displayed is correct.</a:t>
             </a:r>
           </a:p>
         </p:txBody>
@@ -1657,7 +1841,7 @@
     </p:spTree>
     <p:extLst>
       <p:ext uri="{BB962C8B-B14F-4D97-AF65-F5344CB8AC3E}">
-        <p14:creationId xmlns:p14="http://schemas.microsoft.com/office/powerpoint/2010/main" val="4204968903"/>
+        <p14:creationId xmlns:p14="http://schemas.microsoft.com/office/powerpoint/2010/main" val="2529185713"/>
       </p:ext>
     </p:extLst>
   </p:cSld>
@@ -1711,84 +1895,7 @@
           <a:bodyPr/>
           <a:lstStyle/>
           <a:p>
-            <a:r>
-              <a:rPr lang="en-US" baseline="0" dirty="0" smtClean="0"/>
-              <a:t>Once </a:t>
-            </a:r>
-            <a:r>
-              <a:rPr lang="en-US" baseline="0" dirty="0" err="1" smtClean="0"/>
-              <a:t>blockchain</a:t>
-            </a:r>
-            <a:r>
-              <a:rPr lang="en-US" baseline="0" dirty="0" smtClean="0"/>
-              <a:t> gains further acceptance and understanding, institutions can certify and verify documents on their own privately maintained </a:t>
-            </a:r>
-            <a:r>
-              <a:rPr lang="en-US" baseline="0" dirty="0" err="1" smtClean="0"/>
-              <a:t>blockchain</a:t>
-            </a:r>
-            <a:r>
-              <a:rPr lang="en-US" baseline="0" dirty="0" smtClean="0"/>
-              <a:t> for further </a:t>
-            </a:r>
-            <a:r>
-              <a:rPr lang="en-US" baseline="0" dirty="0" err="1" smtClean="0"/>
-              <a:t>customisation</a:t>
-            </a:r>
-            <a:r>
-              <a:rPr lang="en-US" baseline="0" dirty="0" smtClean="0"/>
-              <a:t>. </a:t>
-            </a:r>
-          </a:p>
-          <a:p>
             <a:endParaRPr lang="en-US" baseline="0" dirty="0" smtClean="0"/>
-          </a:p>
-          <a:p>
-            <a:r>
-              <a:rPr lang="en-US" baseline="0" dirty="0" smtClean="0"/>
-              <a:t>We can also </a:t>
-            </a:r>
-            <a:r>
-              <a:rPr lang="en-US" baseline="0" dirty="0" err="1" smtClean="0"/>
-              <a:t>optimise</a:t>
-            </a:r>
-            <a:r>
-              <a:rPr lang="en-US" baseline="0" dirty="0" smtClean="0"/>
-              <a:t> this concept by committing a </a:t>
-            </a:r>
-            <a:r>
-              <a:rPr lang="en-US" baseline="0" dirty="0" err="1" smtClean="0"/>
-              <a:t>Merkle</a:t>
-            </a:r>
-            <a:r>
-              <a:rPr lang="en-US" baseline="0" dirty="0" smtClean="0"/>
-              <a:t> root’s hash.  This way, we can logically store batches of information, like transcripts from all computer science students from the same graduating year.</a:t>
-            </a:r>
-          </a:p>
-          <a:p>
-            <a:endParaRPr lang="en-US" baseline="0" dirty="0" smtClean="0"/>
-          </a:p>
-          <a:p>
-            <a:r>
-              <a:rPr lang="en-US" baseline="0" dirty="0" smtClean="0"/>
-              <a:t>While </a:t>
-            </a:r>
-            <a:r>
-              <a:rPr lang="en-US" baseline="0" dirty="0" err="1" smtClean="0"/>
-              <a:t>blockchain</a:t>
-            </a:r>
-            <a:r>
-              <a:rPr lang="en-US" baseline="0" dirty="0" smtClean="0"/>
-              <a:t> cryptocurrencies were originally conceived as a way to </a:t>
-            </a:r>
-            <a:r>
-              <a:rPr lang="en-US" baseline="0" dirty="0" err="1" smtClean="0"/>
-              <a:t>decentralise</a:t>
-            </a:r>
-            <a:r>
-              <a:rPr lang="en-US" baseline="0" dirty="0" smtClean="0"/>
-              <a:t> information, its properties as an immutable append-only ledger makes it an excellent choice for digital verification.</a:t>
-            </a:r>
           </a:p>
         </p:txBody>
       </p:sp>
@@ -1818,7 +1925,7 @@
     </p:spTree>
     <p:extLst>
       <p:ext uri="{BB962C8B-B14F-4D97-AF65-F5344CB8AC3E}">
-        <p14:creationId xmlns:p14="http://schemas.microsoft.com/office/powerpoint/2010/main" val="2325144710"/>
+        <p14:creationId xmlns:p14="http://schemas.microsoft.com/office/powerpoint/2010/main" val="2018885129"/>
       </p:ext>
     </p:extLst>
   </p:cSld>
@@ -1872,6 +1979,85 @@
           <a:bodyPr/>
           <a:lstStyle/>
           <a:p>
+            <a:r>
+              <a:rPr lang="en-US" baseline="0" dirty="0" smtClean="0"/>
+              <a:t>Once </a:t>
+            </a:r>
+            <a:r>
+              <a:rPr lang="en-US" baseline="0" dirty="0" err="1" smtClean="0"/>
+              <a:t>blockchain</a:t>
+            </a:r>
+            <a:r>
+              <a:rPr lang="en-US" baseline="0" dirty="0" smtClean="0"/>
+              <a:t> gains further acceptance and understanding, institutions can </a:t>
+            </a:r>
+            <a:r>
+              <a:rPr lang="en-US" baseline="0" dirty="0" smtClean="0"/>
+              <a:t>certify documents </a:t>
+            </a:r>
+            <a:r>
+              <a:rPr lang="en-US" baseline="0" dirty="0" smtClean="0"/>
+              <a:t>on their own privately maintained </a:t>
+            </a:r>
+            <a:r>
+              <a:rPr lang="en-US" baseline="0" dirty="0" err="1" smtClean="0"/>
+              <a:t>blockchain</a:t>
+            </a:r>
+            <a:r>
+              <a:rPr lang="en-US" baseline="0" dirty="0" smtClean="0"/>
+              <a:t> for further </a:t>
+            </a:r>
+            <a:r>
+              <a:rPr lang="en-US" baseline="0" dirty="0" err="1" smtClean="0"/>
+              <a:t>customisation</a:t>
+            </a:r>
+            <a:r>
+              <a:rPr lang="en-US" baseline="0" dirty="0" smtClean="0"/>
+              <a:t>. </a:t>
+            </a:r>
+          </a:p>
+          <a:p>
+            <a:endParaRPr lang="en-US" baseline="0" dirty="0" smtClean="0"/>
+          </a:p>
+          <a:p>
+            <a:r>
+              <a:rPr lang="en-US" baseline="0" dirty="0" smtClean="0"/>
+              <a:t>We can also </a:t>
+            </a:r>
+            <a:r>
+              <a:rPr lang="en-US" baseline="0" dirty="0" err="1" smtClean="0"/>
+              <a:t>optimise</a:t>
+            </a:r>
+            <a:r>
+              <a:rPr lang="en-US" baseline="0" dirty="0" smtClean="0"/>
+              <a:t> this </a:t>
+            </a:r>
+            <a:r>
+              <a:rPr lang="en-US" baseline="0" dirty="0" smtClean="0"/>
+              <a:t>by committing the hash of a </a:t>
+            </a:r>
+            <a:r>
+              <a:rPr lang="en-US" baseline="0" dirty="0" err="1" smtClean="0"/>
+              <a:t>Merkle</a:t>
+            </a:r>
+            <a:r>
+              <a:rPr lang="en-US" baseline="0" dirty="0" smtClean="0"/>
+              <a:t> root.  </a:t>
+            </a:r>
+            <a:r>
+              <a:rPr lang="en-US" baseline="0" dirty="0" smtClean="0"/>
+              <a:t>This way, we can logically </a:t>
+            </a:r>
+            <a:r>
+              <a:rPr lang="en-US" baseline="0" dirty="0" smtClean="0"/>
+              <a:t>store large </a:t>
+            </a:r>
+            <a:r>
+              <a:rPr lang="en-US" baseline="0" dirty="0" smtClean="0"/>
+              <a:t>batches of information, like transcripts from all computer science students from the same graduating year.</a:t>
+            </a:r>
+          </a:p>
+          <a:p>
             <a:endParaRPr lang="en-US" baseline="0" dirty="0" smtClean="0"/>
           </a:p>
         </p:txBody>
@@ -1902,7 +2088,7 @@
     </p:spTree>
     <p:extLst>
       <p:ext uri="{BB962C8B-B14F-4D97-AF65-F5344CB8AC3E}">
-        <p14:creationId xmlns:p14="http://schemas.microsoft.com/office/powerpoint/2010/main" val="4131472644"/>
+        <p14:creationId xmlns:p14="http://schemas.microsoft.com/office/powerpoint/2010/main" val="4204968903"/>
       </p:ext>
     </p:extLst>
   </p:cSld>
@@ -7602,11 +7788,7 @@
             </a:r>
             <a:r>
               <a:rPr lang="en-US" sz="7000" b="1" dirty="0" smtClean="0"/>
-              <a:t> </a:t>
-            </a:r>
-            <a:r>
-              <a:rPr lang="en-US" sz="7000" b="1" dirty="0" smtClean="0"/>
-              <a:t>certification</a:t>
+              <a:t> certification</a:t>
             </a:r>
             <a:endParaRPr lang="en-US" sz="7000" b="1" dirty="0"/>
           </a:p>
@@ -7636,13 +7818,8 @@
           <a:p>
             <a:r>
               <a:rPr lang="en-US" sz="4000" dirty="0" smtClean="0"/>
-              <a:t>Team: </a:t>
-            </a:r>
-            <a:r>
-              <a:rPr lang="en-US" sz="4000" dirty="0" smtClean="0"/>
-              <a:t>NKB</a:t>
-            </a:r>
-            <a:endParaRPr lang="en-US" sz="4000" dirty="0" smtClean="0"/>
+              <a:t>Team: NKB</a:t>
+            </a:r>
           </a:p>
         </p:txBody>
       </p:sp>
@@ -7650,6 +7827,200 @@
     <p:extLst>
       <p:ext uri="{BB962C8B-B14F-4D97-AF65-F5344CB8AC3E}">
         <p14:creationId xmlns:p14="http://schemas.microsoft.com/office/powerpoint/2010/main" val="3989666954"/>
+      </p:ext>
+    </p:extLst>
+  </p:cSld>
+  <p:clrMapOvr>
+    <a:masterClrMapping/>
+  </p:clrMapOvr>
+</p:sld>
+</file>
+
+<file path=ppt/slides/slide10.xml><?xml version="1.0" encoding="utf-8"?>
+<p:sld xmlns:a="http://schemas.openxmlformats.org/drawingml/2006/main" xmlns:r="http://schemas.openxmlformats.org/officeDocument/2006/relationships" xmlns:p="http://schemas.openxmlformats.org/presentationml/2006/main">
+  <p:cSld>
+    <p:spTree>
+      <p:nvGrpSpPr>
+        <p:cNvPr id="1" name=""/>
+        <p:cNvGrpSpPr/>
+        <p:nvPr/>
+      </p:nvGrpSpPr>
+      <p:grpSpPr>
+        <a:xfrm>
+          <a:off x="0" y="0"/>
+          <a:ext cx="0" cy="0"/>
+          <a:chOff x="0" y="0"/>
+          <a:chExt cx="0" cy="0"/>
+        </a:xfrm>
+      </p:grpSpPr>
+      <p:sp>
+        <p:nvSpPr>
+          <p:cNvPr id="2" name="Title 1"/>
+          <p:cNvSpPr>
+            <a:spLocks noGrp="1"/>
+          </p:cNvSpPr>
+          <p:nvPr>
+            <p:ph type="title"/>
+          </p:nvPr>
+        </p:nvSpPr>
+        <p:spPr/>
+        <p:txBody>
+          <a:bodyPr>
+            <a:normAutofit/>
+          </a:bodyPr>
+          <a:lstStyle/>
+          <a:p>
+            <a:r>
+              <a:rPr lang="en-US" sz="6000" b="1" dirty="0" smtClean="0"/>
+              <a:t>Other applications</a:t>
+            </a:r>
+            <a:endParaRPr lang="en-US" sz="6000" b="1" dirty="0"/>
+          </a:p>
+        </p:txBody>
+      </p:sp>
+      <p:sp>
+        <p:nvSpPr>
+          <p:cNvPr id="3" name="Content Placeholder 2"/>
+          <p:cNvSpPr>
+            <a:spLocks noGrp="1"/>
+          </p:cNvSpPr>
+          <p:nvPr>
+            <p:ph idx="1"/>
+          </p:nvPr>
+        </p:nvSpPr>
+        <p:spPr>
+          <a:xfrm>
+            <a:off x="685801" y="1975812"/>
+            <a:ext cx="10131425" cy="3649133"/>
+          </a:xfrm>
+        </p:spPr>
+        <p:txBody>
+          <a:bodyPr>
+            <a:noAutofit/>
+          </a:bodyPr>
+          <a:lstStyle/>
+          <a:p>
+            <a:r>
+              <a:rPr lang="en-US" sz="5000" dirty="0" smtClean="0"/>
+              <a:t>Certification of any kind</a:t>
+            </a:r>
+            <a:r>
+              <a:rPr lang="en-US" sz="5000" dirty="0"/>
+              <a:t> </a:t>
+            </a:r>
+            <a:r>
+              <a:rPr lang="en-US" sz="5000" dirty="0" smtClean="0"/>
+              <a:t>from an issuer that consumers trust</a:t>
+            </a:r>
+          </a:p>
+          <a:p>
+            <a:r>
+              <a:rPr lang="en-US" sz="5000" dirty="0" smtClean="0"/>
+              <a:t>Safe to use for confidential info</a:t>
+            </a:r>
+            <a:br>
+              <a:rPr lang="en-US" sz="5000" dirty="0" smtClean="0"/>
+            </a:br>
+            <a:r>
+              <a:rPr lang="en-US" sz="5000" dirty="0" smtClean="0"/>
+              <a:t>(e.g. medical records)</a:t>
+            </a:r>
+          </a:p>
+        </p:txBody>
+      </p:sp>
+    </p:spTree>
+    <p:extLst>
+      <p:ext uri="{BB962C8B-B14F-4D97-AF65-F5344CB8AC3E}">
+        <p14:creationId xmlns:p14="http://schemas.microsoft.com/office/powerpoint/2010/main" val="859995104"/>
+      </p:ext>
+    </p:extLst>
+  </p:cSld>
+  <p:clrMapOvr>
+    <a:masterClrMapping/>
+  </p:clrMapOvr>
+</p:sld>
+</file>
+
+<file path=ppt/slides/slide11.xml><?xml version="1.0" encoding="utf-8"?>
+<p:sld xmlns:a="http://schemas.openxmlformats.org/drawingml/2006/main" xmlns:r="http://schemas.openxmlformats.org/officeDocument/2006/relationships" xmlns:p="http://schemas.openxmlformats.org/presentationml/2006/main">
+  <p:cSld>
+    <p:spTree>
+      <p:nvGrpSpPr>
+        <p:cNvPr id="1" name=""/>
+        <p:cNvGrpSpPr/>
+        <p:nvPr/>
+      </p:nvGrpSpPr>
+      <p:grpSpPr>
+        <a:xfrm>
+          <a:off x="0" y="0"/>
+          <a:ext cx="0" cy="0"/>
+          <a:chOff x="0" y="0"/>
+          <a:chExt cx="0" cy="0"/>
+        </a:xfrm>
+      </p:grpSpPr>
+      <p:sp>
+        <p:nvSpPr>
+          <p:cNvPr id="2" name="Title 1"/>
+          <p:cNvSpPr>
+            <a:spLocks noGrp="1"/>
+          </p:cNvSpPr>
+          <p:nvPr>
+            <p:ph type="title"/>
+          </p:nvPr>
+        </p:nvSpPr>
+        <p:spPr>
+          <a:xfrm>
+            <a:off x="844827" y="331305"/>
+            <a:ext cx="10131425" cy="1456267"/>
+          </a:xfrm>
+        </p:spPr>
+        <p:txBody>
+          <a:bodyPr>
+            <a:normAutofit/>
+          </a:bodyPr>
+          <a:lstStyle/>
+          <a:p>
+            <a:endParaRPr lang="en-US" sz="6000" b="1" dirty="0"/>
+          </a:p>
+        </p:txBody>
+      </p:sp>
+      <p:sp>
+        <p:nvSpPr>
+          <p:cNvPr id="3" name="Content Placeholder 2"/>
+          <p:cNvSpPr>
+            <a:spLocks noGrp="1"/>
+          </p:cNvSpPr>
+          <p:nvPr>
+            <p:ph idx="1"/>
+          </p:nvPr>
+        </p:nvSpPr>
+        <p:spPr>
+          <a:xfrm>
+            <a:off x="844826" y="1602041"/>
+            <a:ext cx="10131425" cy="3649133"/>
+          </a:xfrm>
+        </p:spPr>
+        <p:txBody>
+          <a:bodyPr>
+            <a:noAutofit/>
+          </a:bodyPr>
+          <a:lstStyle/>
+          <a:p>
+            <a:pPr marL="0" indent="0" algn="ctr">
+              <a:buNone/>
+            </a:pPr>
+            <a:r>
+              <a:rPr lang="en-US" sz="8000" b="1" dirty="0" smtClean="0"/>
+              <a:t>THANK YOU!</a:t>
+            </a:r>
+            <a:endParaRPr lang="en-US" sz="8000" dirty="0" smtClean="0"/>
+          </a:p>
+        </p:txBody>
+      </p:sp>
+    </p:spTree>
+    <p:extLst>
+      <p:ext uri="{BB962C8B-B14F-4D97-AF65-F5344CB8AC3E}">
+        <p14:creationId xmlns:p14="http://schemas.microsoft.com/office/powerpoint/2010/main" val="3452967928"/>
       </p:ext>
     </p:extLst>
   </p:cSld>
@@ -7713,7 +8084,7 @@
         </p:nvSpPr>
         <p:spPr>
           <a:xfrm>
-            <a:off x="685801" y="1975812"/>
+            <a:off x="685801" y="1583926"/>
             <a:ext cx="10131425" cy="3649133"/>
           </a:xfrm>
         </p:spPr>
@@ -7728,31 +8099,22 @@
             </a:pPr>
             <a:r>
               <a:rPr lang="en-US" sz="5000" dirty="0" smtClean="0"/>
-              <a:t>Verification is</a:t>
-            </a:r>
+              <a:t>Verification is:</a:t>
+            </a:r>
+            <a:endParaRPr lang="en-US" sz="5000" dirty="0"/>
+          </a:p>
+          <a:p>
             <a:r>
               <a:rPr lang="en-US" sz="5000" dirty="0" smtClean="0"/>
-              <a:t>:</a:t>
-            </a:r>
-            <a:endParaRPr lang="en-US" sz="5000" dirty="0"/>
+              <a:t>Slow (1 – 2 weeks)</a:t>
+            </a:r>
           </a:p>
           <a:p>
             <a:r>
               <a:rPr lang="en-US" sz="5000" dirty="0" smtClean="0"/>
-              <a:t>Slow</a:t>
-            </a:r>
-          </a:p>
-          <a:p>
-            <a:r>
-              <a:rPr lang="en-US" sz="5000" dirty="0" smtClean="0"/>
-              <a:t>Redundant</a:t>
-            </a:r>
-          </a:p>
-          <a:p>
-            <a:r>
-              <a:rPr lang="en-US" sz="5000" dirty="0" smtClean="0"/>
-              <a:t>Inefficient </a:t>
-            </a:r>
+              <a:t>$10</a:t>
+            </a:r>
+            <a:endParaRPr lang="en-US" sz="5000" dirty="0" smtClean="0"/>
           </a:p>
         </p:txBody>
       </p:sp>
@@ -8026,16 +8388,21 @@
           <a:p>
             <a:r>
               <a:rPr lang="en-US" sz="5000" dirty="0" smtClean="0"/>
-              <a:t>Use provably </a:t>
+              <a:t>Store hashes </a:t>
+            </a:r>
+            <a:r>
+              <a:rPr lang="en-US" sz="5000" dirty="0" smtClean="0"/>
+              <a:t>signed by </a:t>
+            </a:r>
+            <a:r>
+              <a:rPr lang="en-US" sz="5000" dirty="0" smtClean="0"/>
+              <a:t>issuer on </a:t>
             </a:r>
             <a:r>
               <a:rPr lang="en-US" sz="5000" dirty="0" err="1" smtClean="0"/>
-              <a:t>unspendable</a:t>
-            </a:r>
-            <a:r>
-              <a:rPr lang="en-US" sz="5000" dirty="0" smtClean="0"/>
-              <a:t> commitments to store hashes signed by issuer in OP_RETURN field</a:t>
-            </a:r>
+              <a:t>blockchain</a:t>
+            </a:r>
+            <a:endParaRPr lang="en-US" sz="5000" dirty="0" smtClean="0"/>
           </a:p>
         </p:txBody>
       </p:sp>
@@ -8223,6 +8590,122 @@
           <a:p>
             <a:r>
               <a:rPr lang="en-US" sz="6000" b="1" dirty="0" smtClean="0"/>
+              <a:t>A closer look…</a:t>
+            </a:r>
+            <a:endParaRPr lang="en-US" sz="6000" b="1" dirty="0"/>
+          </a:p>
+        </p:txBody>
+      </p:sp>
+      <p:sp>
+        <p:nvSpPr>
+          <p:cNvPr id="3" name="Content Placeholder 2"/>
+          <p:cNvSpPr>
+            <a:spLocks noGrp="1"/>
+          </p:cNvSpPr>
+          <p:nvPr>
+            <p:ph idx="1"/>
+          </p:nvPr>
+        </p:nvSpPr>
+        <p:spPr>
+          <a:xfrm>
+            <a:off x="584200" y="1389252"/>
+            <a:ext cx="10131425" cy="2150760"/>
+          </a:xfrm>
+        </p:spPr>
+        <p:txBody>
+          <a:bodyPr>
+            <a:noAutofit/>
+          </a:bodyPr>
+          <a:lstStyle/>
+          <a:p>
+            <a:pPr marL="0" indent="0">
+              <a:buNone/>
+            </a:pPr>
+            <a:r>
+              <a:rPr lang="en-US" sz="5000" dirty="0" err="1" smtClean="0"/>
+              <a:t>Centralised</a:t>
+            </a:r>
+            <a:r>
+              <a:rPr lang="en-US" sz="5000" dirty="0" smtClean="0"/>
+              <a:t> Database</a:t>
+            </a:r>
+            <a:endParaRPr lang="en-US" sz="5000" dirty="0" smtClean="0"/>
+          </a:p>
+        </p:txBody>
+      </p:sp>
+      <p:pic>
+        <p:nvPicPr>
+          <p:cNvPr id="5" name="Picture 4"/>
+          <p:cNvPicPr>
+            <a:picLocks noChangeAspect="1"/>
+          </p:cNvPicPr>
+          <p:nvPr/>
+        </p:nvPicPr>
+        <p:blipFill>
+          <a:blip r:embed="rId3"/>
+          <a:stretch>
+            <a:fillRect/>
+          </a:stretch>
+        </p:blipFill>
+        <p:spPr>
+          <a:xfrm>
+            <a:off x="685801" y="2863397"/>
+            <a:ext cx="10925175" cy="1885950"/>
+          </a:xfrm>
+          <a:prstGeom prst="rect">
+            <a:avLst/>
+          </a:prstGeom>
+        </p:spPr>
+      </p:pic>
+    </p:spTree>
+    <p:extLst>
+      <p:ext uri="{BB962C8B-B14F-4D97-AF65-F5344CB8AC3E}">
+        <p14:creationId xmlns:p14="http://schemas.microsoft.com/office/powerpoint/2010/main" val="3456801123"/>
+      </p:ext>
+    </p:extLst>
+  </p:cSld>
+  <p:clrMapOvr>
+    <a:masterClrMapping/>
+  </p:clrMapOvr>
+</p:sld>
+</file>
+
+<file path=ppt/slides/slide7.xml><?xml version="1.0" encoding="utf-8"?>
+<p:sld xmlns:a="http://schemas.openxmlformats.org/drawingml/2006/main" xmlns:r="http://schemas.openxmlformats.org/officeDocument/2006/relationships" xmlns:p="http://schemas.openxmlformats.org/presentationml/2006/main">
+  <p:cSld>
+    <p:spTree>
+      <p:nvGrpSpPr>
+        <p:cNvPr id="1" name=""/>
+        <p:cNvGrpSpPr/>
+        <p:nvPr/>
+      </p:nvGrpSpPr>
+      <p:grpSpPr>
+        <a:xfrm>
+          <a:off x="0" y="0"/>
+          <a:ext cx="0" cy="0"/>
+          <a:chOff x="0" y="0"/>
+          <a:chExt cx="0" cy="0"/>
+        </a:xfrm>
+      </p:grpSpPr>
+      <p:sp>
+        <p:nvSpPr>
+          <p:cNvPr id="2" name="Title 1"/>
+          <p:cNvSpPr>
+            <a:spLocks noGrp="1"/>
+          </p:cNvSpPr>
+          <p:nvPr>
+            <p:ph type="title"/>
+          </p:nvPr>
+        </p:nvSpPr>
+        <p:spPr/>
+        <p:txBody>
+          <a:bodyPr>
+            <a:normAutofit/>
+          </a:bodyPr>
+          <a:lstStyle/>
+          <a:p>
+            <a:r>
+              <a:rPr lang="en-US" sz="6000" b="1" dirty="0" smtClean="0"/>
               <a:t>Implementation</a:t>
             </a:r>
             <a:endParaRPr lang="en-US" sz="6000" b="1" dirty="0"/>
@@ -8341,121 +8824,6 @@
 </p:sld>
 </file>
 
-<file path=ppt/slides/slide7.xml><?xml version="1.0" encoding="utf-8"?>
-<p:sld xmlns:a="http://schemas.openxmlformats.org/drawingml/2006/main" xmlns:r="http://schemas.openxmlformats.org/officeDocument/2006/relationships" xmlns:p="http://schemas.openxmlformats.org/presentationml/2006/main">
-  <p:cSld>
-    <p:spTree>
-      <p:nvGrpSpPr>
-        <p:cNvPr id="1" name=""/>
-        <p:cNvGrpSpPr/>
-        <p:nvPr/>
-      </p:nvGrpSpPr>
-      <p:grpSpPr>
-        <a:xfrm>
-          <a:off x="0" y="0"/>
-          <a:ext cx="0" cy="0"/>
-          <a:chOff x="0" y="0"/>
-          <a:chExt cx="0" cy="0"/>
-        </a:xfrm>
-      </p:grpSpPr>
-      <p:sp>
-        <p:nvSpPr>
-          <p:cNvPr id="2" name="Title 1"/>
-          <p:cNvSpPr>
-            <a:spLocks noGrp="1"/>
-          </p:cNvSpPr>
-          <p:nvPr>
-            <p:ph type="title"/>
-          </p:nvPr>
-        </p:nvSpPr>
-        <p:spPr/>
-        <p:txBody>
-          <a:bodyPr>
-            <a:normAutofit/>
-          </a:bodyPr>
-          <a:lstStyle/>
-          <a:p>
-            <a:r>
-              <a:rPr lang="en-US" sz="6000" b="1" dirty="0" smtClean="0"/>
-              <a:t>Future </a:t>
-            </a:r>
-            <a:r>
-              <a:rPr lang="en-US" sz="6000" b="1" dirty="0" smtClean="0"/>
-              <a:t>improvements</a:t>
-            </a:r>
-            <a:endParaRPr lang="en-US" sz="6000" b="1" dirty="0"/>
-          </a:p>
-        </p:txBody>
-      </p:sp>
-      <p:sp>
-        <p:nvSpPr>
-          <p:cNvPr id="3" name="Content Placeholder 2"/>
-          <p:cNvSpPr>
-            <a:spLocks noGrp="1"/>
-          </p:cNvSpPr>
-          <p:nvPr>
-            <p:ph idx="1"/>
-          </p:nvPr>
-        </p:nvSpPr>
-        <p:spPr>
-          <a:xfrm>
-            <a:off x="685801" y="1975812"/>
-            <a:ext cx="10131425" cy="3649133"/>
-          </a:xfrm>
-        </p:spPr>
-        <p:txBody>
-          <a:bodyPr>
-            <a:noAutofit/>
-          </a:bodyPr>
-          <a:lstStyle/>
-          <a:p>
-            <a:r>
-              <a:rPr lang="en-US" sz="5000" dirty="0" smtClean="0"/>
-              <a:t>Schools </a:t>
-            </a:r>
-            <a:r>
-              <a:rPr lang="en-US" sz="5000" dirty="0" smtClean="0"/>
-              <a:t>can maintain their own </a:t>
-            </a:r>
-            <a:r>
-              <a:rPr lang="en-US" sz="5000" dirty="0" err="1" smtClean="0"/>
-              <a:t>blockchain</a:t>
-            </a:r>
-            <a:endParaRPr lang="en-US" sz="5000" dirty="0" smtClean="0"/>
-          </a:p>
-          <a:p>
-            <a:r>
-              <a:rPr lang="en-US" sz="5000" dirty="0" err="1" smtClean="0"/>
-              <a:t>Optimising</a:t>
-            </a:r>
-            <a:r>
-              <a:rPr lang="en-US" sz="5000" dirty="0" smtClean="0"/>
-              <a:t> by collecting commitments with </a:t>
-            </a:r>
-            <a:r>
-              <a:rPr lang="en-US" sz="5000" dirty="0" err="1" smtClean="0"/>
-              <a:t>Merkle</a:t>
-            </a:r>
-            <a:r>
-              <a:rPr lang="en-US" sz="5000" dirty="0" smtClean="0"/>
-              <a:t> root hash</a:t>
-            </a:r>
-          </a:p>
-        </p:txBody>
-      </p:sp>
-    </p:spTree>
-    <p:extLst>
-      <p:ext uri="{BB962C8B-B14F-4D97-AF65-F5344CB8AC3E}">
-        <p14:creationId xmlns:p14="http://schemas.microsoft.com/office/powerpoint/2010/main" val="701794689"/>
-      </p:ext>
-    </p:extLst>
-  </p:cSld>
-  <p:clrMapOvr>
-    <a:masterClrMapping/>
-  </p:clrMapOvr>
-</p:sld>
-</file>
-
 <file path=ppt/slides/slide8.xml><?xml version="1.0" encoding="utf-8"?>
 <p:sld xmlns:a="http://schemas.openxmlformats.org/drawingml/2006/main" xmlns:r="http://schemas.openxmlformats.org/officeDocument/2006/relationships" xmlns:p="http://schemas.openxmlformats.org/presentationml/2006/main">
   <p:cSld>
@@ -8492,7 +8860,7 @@
           <a:p>
             <a:r>
               <a:rPr lang="en-US" sz="6000" b="1" dirty="0" smtClean="0"/>
-              <a:t>Other applications</a:t>
+              <a:t>How to use it</a:t>
             </a:r>
             <a:endParaRPr lang="en-US" sz="6000" b="1" dirty="0"/>
           </a:p>
@@ -8511,7 +8879,7 @@
         <p:spPr>
           <a:xfrm>
             <a:off x="685801" y="1975812"/>
-            <a:ext cx="10131425" cy="3649133"/>
+            <a:ext cx="10867570" cy="3649133"/>
           </a:xfrm>
         </p:spPr>
         <p:txBody>
@@ -8520,38 +8888,41 @@
           </a:bodyPr>
           <a:lstStyle/>
           <a:p>
+            <a:pPr marL="0" indent="0">
+              <a:buNone/>
+            </a:pPr>
             <a:r>
               <a:rPr lang="en-US" sz="5000" dirty="0" smtClean="0"/>
-              <a:t>Certification of any kind</a:t>
-            </a:r>
-            <a:r>
-              <a:rPr lang="en-US" sz="5000" dirty="0"/>
-              <a:t> </a:t>
-            </a:r>
+              <a:t>Students can…</a:t>
+            </a:r>
+          </a:p>
+          <a:p>
+            <a:pPr marL="914400" indent="-914400">
+              <a:buFont typeface="+mj-lt"/>
+              <a:buAutoNum type="arabicPeriod"/>
+            </a:pPr>
             <a:r>
               <a:rPr lang="en-US" sz="5000" dirty="0" smtClean="0"/>
-              <a:t>from an issuer that consumers trust</a:t>
-            </a:r>
-          </a:p>
-          <a:p>
+              <a:t>Submit verification key alone</a:t>
+            </a:r>
+          </a:p>
+          <a:p>
+            <a:pPr marL="914400" indent="-914400">
+              <a:buFont typeface="+mj-lt"/>
+              <a:buAutoNum type="arabicPeriod"/>
+            </a:pPr>
             <a:r>
               <a:rPr lang="en-US" sz="5000" dirty="0" smtClean="0"/>
-              <a:t>Safe to use for confidential info</a:t>
-            </a:r>
-            <a:br>
-              <a:rPr lang="en-US" sz="5000" dirty="0" smtClean="0"/>
-            </a:br>
-            <a:r>
-              <a:rPr lang="en-US" sz="5000" dirty="0" smtClean="0"/>
-              <a:t>(e.g. medical records)</a:t>
-            </a:r>
+              <a:t>Send / print PDF file of transcript with verification key</a:t>
+            </a:r>
+            <a:endParaRPr lang="en-US" sz="5000" dirty="0" smtClean="0"/>
           </a:p>
         </p:txBody>
       </p:sp>
     </p:spTree>
     <p:extLst>
       <p:ext uri="{BB962C8B-B14F-4D97-AF65-F5344CB8AC3E}">
-        <p14:creationId xmlns:p14="http://schemas.microsoft.com/office/powerpoint/2010/main" val="859995104"/>
+        <p14:creationId xmlns:p14="http://schemas.microsoft.com/office/powerpoint/2010/main" val="3869584831"/>
       </p:ext>
     </p:extLst>
   </p:cSld>
@@ -8588,18 +8959,17 @@
             <p:ph type="title"/>
           </p:nvPr>
         </p:nvSpPr>
-        <p:spPr>
-          <a:xfrm>
-            <a:off x="844827" y="331305"/>
-            <a:ext cx="10131425" cy="1456267"/>
-          </a:xfrm>
-        </p:spPr>
+        <p:spPr/>
         <p:txBody>
           <a:bodyPr>
             <a:normAutofit/>
           </a:bodyPr>
           <a:lstStyle/>
           <a:p>
+            <a:r>
+              <a:rPr lang="en-US" sz="6000" b="1" dirty="0" smtClean="0"/>
+              <a:t>Future improvements</a:t>
+            </a:r>
             <a:endParaRPr lang="en-US" sz="6000" b="1" dirty="0"/>
           </a:p>
         </p:txBody>
@@ -8616,7 +8986,7 @@
         </p:nvSpPr>
         <p:spPr>
           <a:xfrm>
-            <a:off x="844826" y="1602041"/>
+            <a:off x="685801" y="1975812"/>
             <a:ext cx="10131425" cy="3649133"/>
           </a:xfrm>
         </p:spPr>
@@ -8626,21 +8996,40 @@
           </a:bodyPr>
           <a:lstStyle/>
           <a:p>
-            <a:pPr marL="0" indent="0" algn="ctr">
-              <a:buNone/>
-            </a:pPr>
-            <a:r>
-              <a:rPr lang="en-US" sz="8000" b="1" dirty="0" smtClean="0"/>
-              <a:t>THANK YOU!</a:t>
-            </a:r>
-            <a:endParaRPr lang="en-US" sz="8000" dirty="0" smtClean="0"/>
+            <a:r>
+              <a:rPr lang="en-US" sz="5000" dirty="0" smtClean="0"/>
+              <a:t>Schools can maintain their own </a:t>
+            </a:r>
+            <a:r>
+              <a:rPr lang="en-US" sz="5000" dirty="0" err="1" smtClean="0"/>
+              <a:t>blockchain</a:t>
+            </a:r>
+            <a:endParaRPr lang="en-US" sz="5000" dirty="0" smtClean="0"/>
+          </a:p>
+          <a:p>
+            <a:r>
+              <a:rPr lang="en-US" sz="5000" dirty="0" err="1" smtClean="0"/>
+              <a:t>Optimising</a:t>
+            </a:r>
+            <a:r>
+              <a:rPr lang="en-US" sz="5000" dirty="0" smtClean="0"/>
+              <a:t> by collecting commitments with </a:t>
+            </a:r>
+            <a:r>
+              <a:rPr lang="en-US" sz="5000" dirty="0" err="1" smtClean="0"/>
+              <a:t>Merkle</a:t>
+            </a:r>
+            <a:r>
+              <a:rPr lang="en-US" sz="5000" dirty="0" smtClean="0"/>
+              <a:t> root hash</a:t>
+            </a:r>
           </a:p>
         </p:txBody>
       </p:sp>
     </p:spTree>
     <p:extLst>
       <p:ext uri="{BB962C8B-B14F-4D97-AF65-F5344CB8AC3E}">
-        <p14:creationId xmlns:p14="http://schemas.microsoft.com/office/powerpoint/2010/main" val="3452967928"/>
+        <p14:creationId xmlns:p14="http://schemas.microsoft.com/office/powerpoint/2010/main" val="701794689"/>
       </p:ext>
     </p:extLst>
   </p:cSld>

</xml_diff>

<commit_message>
Presentation ppt from Christy v 3.1
</commit_message>
<xml_diff>
--- a/MachoHacks2018.pptx
+++ b/MachoHacks2018.pptx
@@ -729,31 +729,7 @@
                 <a:ea typeface="+mn-ea"/>
                 <a:cs typeface="+mn-cs"/>
               </a:rPr>
-              <a:t>This reliance on hard copies is slow and inflexible.  But with only 48 hours to deliver our project, we narrowed our focus to something that all six of us have struggled with as students </a:t>
-            </a:r>
-            <a:r>
-              <a:rPr lang="en-US" sz="1200" kern="1200" baseline="0" dirty="0" smtClean="0">
-                <a:solidFill>
-                  <a:schemeClr val="tx1"/>
-                </a:solidFill>
-                <a:effectLst/>
-                <a:latin typeface="+mn-lt"/>
-                <a:ea typeface="+mn-ea"/>
-                <a:cs typeface="+mn-cs"/>
-              </a:rPr>
-              <a:t>– so we </a:t>
-            </a:r>
-            <a:r>
-              <a:rPr lang="en-US" sz="1200" kern="1200" baseline="0" dirty="0" smtClean="0">
-                <a:solidFill>
-                  <a:schemeClr val="tx1"/>
-                </a:solidFill>
-                <a:effectLst/>
-                <a:latin typeface="+mn-lt"/>
-                <a:ea typeface="+mn-ea"/>
-                <a:cs typeface="+mn-cs"/>
-              </a:rPr>
-              <a:t>set out with the goal of </a:t>
+              <a:t>This reliance on hard copies is slow and inflexible.  But with only 48 hours to deliver our project, we narrowed our focus to something that all six of us have struggled with as students – so we set out with the goal of </a:t>
             </a:r>
             <a:r>
               <a:rPr lang="en-US" sz="1200" kern="1200" baseline="0" dirty="0" err="1" smtClean="0">
@@ -915,11 +891,7 @@
             </a:r>
             <a:r>
               <a:rPr lang="en-US" baseline="0" dirty="0" smtClean="0"/>
-              <a:t> information, its properties as an immutable append-only ledger makes it an excellent choice for digital </a:t>
-            </a:r>
-            <a:r>
-              <a:rPr lang="en-US" baseline="0" dirty="0" smtClean="0"/>
-              <a:t>verification of any kind.</a:t>
+              <a:t> information, its properties as an immutable append-only ledger makes it an excellent choice for digital verification of any kind.</a:t>
             </a:r>
           </a:p>
           <a:p>
@@ -930,7 +902,6 @@
               <a:rPr lang="en-US" baseline="0" dirty="0" smtClean="0"/>
               <a:t>And most importantly, it’s safe to use with confidential information.  So our solution is compatible with tracking things as sensitive as medical records as well.</a:t>
             </a:r>
-            <a:endParaRPr lang="en-US" baseline="0" dirty="0" smtClean="0"/>
           </a:p>
         </p:txBody>
       </p:sp>
@@ -1110,51 +1081,14 @@
               <a:rPr lang="en-US" baseline="0" dirty="0" smtClean="0"/>
               <a:t> or college.</a:t>
             </a:r>
+          </a:p>
+          <a:p>
             <a:endParaRPr lang="en-US" baseline="0" dirty="0" smtClean="0"/>
           </a:p>
           <a:p>
-            <a:endParaRPr lang="en-US" baseline="0" dirty="0" smtClean="0"/>
-          </a:p>
-          <a:p>
             <a:r>
               <a:rPr lang="en-US" baseline="0" dirty="0" smtClean="0"/>
-              <a:t>It </a:t>
-            </a:r>
-            <a:r>
-              <a:rPr lang="en-US" baseline="0" dirty="0" smtClean="0"/>
-              <a:t>can take days or up to weeks </a:t>
-            </a:r>
-            <a:r>
-              <a:rPr lang="en-US" baseline="0" dirty="0" smtClean="0"/>
-              <a:t>to request, receive and </a:t>
-            </a:r>
-            <a:r>
-              <a:rPr lang="en-US" baseline="0" dirty="0" smtClean="0"/>
-              <a:t>submit </a:t>
-            </a:r>
-            <a:r>
-              <a:rPr lang="en-US" baseline="0" dirty="0" smtClean="0"/>
-              <a:t>transcripts </a:t>
-            </a:r>
-            <a:r>
-              <a:rPr lang="en-US" baseline="0" dirty="0" smtClean="0"/>
-              <a:t>to schools of </a:t>
-            </a:r>
-            <a:r>
-              <a:rPr lang="en-US" baseline="0" dirty="0" smtClean="0"/>
-              <a:t>our </a:t>
-            </a:r>
-            <a:r>
-              <a:rPr lang="en-US" baseline="0" dirty="0" smtClean="0"/>
-              <a:t>choice.  </a:t>
-            </a:r>
-            <a:r>
-              <a:rPr lang="en-US" baseline="0" dirty="0" smtClean="0"/>
-              <a:t>As students, we had to pay $10 to </a:t>
-            </a:r>
-            <a:r>
-              <a:rPr lang="en-US" baseline="0" dirty="0" smtClean="0"/>
-              <a:t>get a physical copy of our transcript, scan it, and then send the scanned image to BCIT.  </a:t>
+              <a:t>It can take days or up to weeks to request, receive and submit transcripts to schools of our choice.  As students, we had to pay $10 to get a physical copy of our transcript, scan it, and then send the scanned image to BCIT.  </a:t>
             </a:r>
           </a:p>
           <a:p>
@@ -1394,20 +1328,24 @@
             </a:r>
             <a:r>
               <a:rPr lang="en-US" baseline="0" dirty="0" smtClean="0"/>
-              <a:t>. They’re well established and trusted, and not as susceptible to attacks because of the size of their P2P network</a:t>
-            </a:r>
+              <a:t>. They’re well established and trusted, and not as susceptible to attacks because of the size of their P2P network.</a:t>
+            </a:r>
+          </a:p>
+          <a:p>
+            <a:endParaRPr lang="en-US" baseline="0" dirty="0" smtClean="0"/>
+          </a:p>
+          <a:p>
             <a:r>
               <a:rPr lang="en-US" baseline="0" dirty="0" smtClean="0"/>
-              <a:t>.</a:t>
-            </a:r>
-          </a:p>
-          <a:p>
-            <a:endParaRPr lang="en-US" baseline="0" dirty="0" smtClean="0"/>
-          </a:p>
-          <a:p>
+              <a:t>We store hashes </a:t>
+            </a:r>
             <a:r>
               <a:rPr lang="en-US" baseline="0" dirty="0" smtClean="0"/>
-              <a:t>We store hashes signed by the school on the </a:t>
+              <a:t>on </a:t>
+            </a:r>
+            <a:r>
+              <a:rPr lang="en-US" baseline="0" dirty="0" smtClean="0"/>
+              <a:t>the </a:t>
             </a:r>
             <a:r>
               <a:rPr lang="en-US" baseline="0" dirty="0" err="1" smtClean="0"/>
@@ -1415,7 +1353,7 @@
             </a:r>
             <a:r>
               <a:rPr lang="en-US" baseline="0" dirty="0" smtClean="0"/>
-              <a:t>.</a:t>
+              <a:t> after the school signs the transaction.</a:t>
             </a:r>
             <a:endParaRPr lang="en-US" baseline="0" dirty="0" smtClean="0"/>
           </a:p>
@@ -1544,13 +1482,8 @@
             </a:r>
             <a:r>
               <a:rPr lang="en-US" baseline="0" dirty="0" smtClean="0"/>
-              <a:t> for security is secondary.  Our implementation relies on the security of the database </a:t>
-            </a:r>
-            <a:r>
-              <a:rPr lang="en-US" baseline="0" dirty="0" smtClean="0"/>
-              <a:t>itself.</a:t>
-            </a:r>
-            <a:endParaRPr lang="en-US" baseline="0" dirty="0" smtClean="0"/>
+              <a:t> for security is secondary.  Our implementation relies on the security of the database itself.</a:t>
+            </a:r>
           </a:p>
         </p:txBody>
       </p:sp>
@@ -1675,7 +1608,6 @@
               <a:rPr lang="en-US" baseline="0" dirty="0" smtClean="0"/>
               <a:t>.</a:t>
             </a:r>
-            <a:endParaRPr lang="en-US" baseline="0" dirty="0" smtClean="0"/>
           </a:p>
         </p:txBody>
       </p:sp>
@@ -1761,56 +1693,16 @@
           <a:p>
             <a:r>
               <a:rPr lang="en-US" baseline="0" dirty="0" smtClean="0"/>
-              <a:t>After </a:t>
-            </a:r>
+              <a:t>After the hash commitment, students can log in to their school account to select the term grades they want to share.  A random key and transcript file are generated based on their choice, and the random key is stored in the student database.</a:t>
+            </a:r>
+          </a:p>
+          <a:p>
+            <a:endParaRPr lang="en-US" baseline="0" dirty="0" smtClean="0"/>
+          </a:p>
+          <a:p>
             <a:r>
               <a:rPr lang="en-US" baseline="0" dirty="0" smtClean="0"/>
-              <a:t>the hash commitment, </a:t>
-            </a:r>
-            <a:r>
-              <a:rPr lang="en-US" baseline="0" dirty="0" smtClean="0"/>
-              <a:t>students can log in to their school account to select the term grades they want to share.  A random key </a:t>
-            </a:r>
-            <a:r>
-              <a:rPr lang="en-US" baseline="0" dirty="0" smtClean="0"/>
-              <a:t>and transcript file are generated based on their choice, and the random key is </a:t>
-            </a:r>
-            <a:r>
-              <a:rPr lang="en-US" baseline="0" dirty="0" smtClean="0"/>
-              <a:t>stored in the student database.</a:t>
-            </a:r>
-          </a:p>
-          <a:p>
-            <a:endParaRPr lang="en-US" baseline="0" dirty="0" smtClean="0"/>
-          </a:p>
-          <a:p>
-            <a:r>
-              <a:rPr lang="en-US" baseline="0" dirty="0" smtClean="0"/>
-              <a:t>This key is used to </a:t>
-            </a:r>
-            <a:r>
-              <a:rPr lang="en-US" baseline="0" dirty="0" smtClean="0"/>
-              <a:t>(a) pull </a:t>
-            </a:r>
-            <a:r>
-              <a:rPr lang="en-US" baseline="0" dirty="0" smtClean="0"/>
-              <a:t>up the relevant transcript information </a:t>
-            </a:r>
-            <a:r>
-              <a:rPr lang="en-US" baseline="0" dirty="0" smtClean="0"/>
-              <a:t>and (b) </a:t>
-            </a:r>
-            <a:r>
-              <a:rPr lang="en-US" baseline="0" dirty="0" smtClean="0"/>
-              <a:t>to </a:t>
-            </a:r>
-            <a:r>
-              <a:rPr lang="en-US" baseline="0" dirty="0" smtClean="0"/>
-              <a:t>calculate the hash and verify </a:t>
-            </a:r>
-            <a:r>
-              <a:rPr lang="en-US" baseline="0" dirty="0" smtClean="0"/>
-              <a:t>that the information displayed is correct.</a:t>
+              <a:t>This key is used to (a) pull up the relevant transcript information and (b) to calculate the hash and verify that the information displayed is correct.</a:t>
             </a:r>
           </a:p>
         </p:txBody>
@@ -1989,15 +1881,7 @@
             </a:r>
             <a:r>
               <a:rPr lang="en-US" baseline="0" dirty="0" smtClean="0"/>
-              <a:t> gains further acceptance and understanding, institutions can </a:t>
-            </a:r>
-            <a:r>
-              <a:rPr lang="en-US" baseline="0" dirty="0" smtClean="0"/>
-              <a:t>certify documents </a:t>
-            </a:r>
-            <a:r>
-              <a:rPr lang="en-US" baseline="0" dirty="0" smtClean="0"/>
-              <a:t>on their own privately maintained </a:t>
+              <a:t> gains further acceptance and understanding, institutions can certify documents on their own privately maintained </a:t>
             </a:r>
             <a:r>
               <a:rPr lang="en-US" baseline="0" dirty="0" err="1" smtClean="0"/>
@@ -2030,11 +1914,7 @@
             </a:r>
             <a:r>
               <a:rPr lang="en-US" baseline="0" dirty="0" smtClean="0"/>
-              <a:t> this </a:t>
-            </a:r>
-            <a:r>
-              <a:rPr lang="en-US" baseline="0" dirty="0" smtClean="0"/>
-              <a:t>by committing the hash of a </a:t>
+              <a:t> this by committing the hash of a </a:t>
             </a:r>
             <a:r>
               <a:rPr lang="en-US" baseline="0" dirty="0" err="1" smtClean="0"/>
@@ -2042,19 +1922,7 @@
             </a:r>
             <a:r>
               <a:rPr lang="en-US" baseline="0" dirty="0" smtClean="0"/>
-              <a:t> root.  </a:t>
-            </a:r>
-            <a:r>
-              <a:rPr lang="en-US" baseline="0" dirty="0" smtClean="0"/>
-              <a:t>This way, we can logically </a:t>
-            </a:r>
-            <a:r>
-              <a:rPr lang="en-US" baseline="0" dirty="0" smtClean="0"/>
-              <a:t>store large </a:t>
-            </a:r>
-            <a:r>
-              <a:rPr lang="en-US" baseline="0" dirty="0" smtClean="0"/>
-              <a:t>batches of information, like transcripts from all computer science students from the same graduating year.</a:t>
+              <a:t> root.  This way, we can logically store large batches of information, like transcripts from all computer science students from the same graduating year.</a:t>
             </a:r>
           </a:p>
           <a:p>
@@ -8114,7 +7982,6 @@
               <a:rPr lang="en-US" sz="5000" dirty="0" smtClean="0"/>
               <a:t>$10</a:t>
             </a:r>
-            <a:endParaRPr lang="en-US" sz="5000" dirty="0" smtClean="0"/>
           </a:p>
         </p:txBody>
       </p:sp>
@@ -8388,19 +8255,19 @@
           <a:p>
             <a:r>
               <a:rPr lang="en-US" sz="5000" dirty="0" smtClean="0"/>
-              <a:t>Store hashes </a:t>
+              <a:t>Store </a:t>
             </a:r>
             <a:r>
               <a:rPr lang="en-US" sz="5000" dirty="0" smtClean="0"/>
-              <a:t>signed by </a:t>
-            </a:r>
-            <a:r>
-              <a:rPr lang="en-US" sz="5000" dirty="0" smtClean="0"/>
-              <a:t>issuer on </a:t>
+              <a:t>hashes on </a:t>
             </a:r>
             <a:r>
               <a:rPr lang="en-US" sz="5000" dirty="0" err="1" smtClean="0"/>
               <a:t>blockchain</a:t>
+            </a:r>
+            <a:r>
+              <a:rPr lang="en-US" sz="5000" dirty="0" smtClean="0"/>
+              <a:t> in transaction signed by issuer</a:t>
             </a:r>
             <a:endParaRPr lang="en-US" sz="5000" dirty="0" smtClean="0"/>
           </a:p>
@@ -8629,7 +8496,6 @@
               <a:rPr lang="en-US" sz="5000" dirty="0" smtClean="0"/>
               <a:t> Database</a:t>
             </a:r>
-            <a:endParaRPr lang="en-US" sz="5000" dirty="0" smtClean="0"/>
           </a:p>
         </p:txBody>
       </p:sp>
@@ -8878,8 +8744,8 @@
         </p:nvSpPr>
         <p:spPr>
           <a:xfrm>
-            <a:off x="685801" y="1975812"/>
-            <a:ext cx="10867570" cy="3649133"/>
+            <a:off x="484774" y="2685674"/>
+            <a:ext cx="6918157" cy="3649133"/>
           </a:xfrm>
         </p:spPr>
         <p:txBody>
@@ -8888,37 +8754,63 @@
           </a:bodyPr>
           <a:lstStyle/>
           <a:p>
-            <a:pPr marL="0" indent="0">
-              <a:buNone/>
-            </a:pPr>
-            <a:r>
-              <a:rPr lang="en-US" sz="5000" dirty="0" smtClean="0"/>
-              <a:t>Students can…</a:t>
-            </a:r>
-          </a:p>
-          <a:p>
-            <a:pPr marL="914400" indent="-914400">
+            <a:pPr marL="514350" indent="-514350">
               <a:buFont typeface="+mj-lt"/>
               <a:buAutoNum type="arabicPeriod"/>
             </a:pPr>
             <a:r>
               <a:rPr lang="en-US" sz="5000" dirty="0" smtClean="0"/>
-              <a:t>Submit verification key alone</a:t>
-            </a:r>
-          </a:p>
-          <a:p>
-            <a:pPr marL="914400" indent="-914400">
+              <a:t>Submit key alone</a:t>
+            </a:r>
+            <a:endParaRPr lang="en-US" sz="5000" dirty="0"/>
+          </a:p>
+          <a:p>
+            <a:pPr marL="514350" indent="-514350">
               <a:buFont typeface="+mj-lt"/>
               <a:buAutoNum type="arabicPeriod"/>
             </a:pPr>
             <a:r>
+              <a:rPr lang="en-US" sz="5000" dirty="0"/>
+              <a:t>Send / print PDF file of transcript with </a:t>
+            </a:r>
+            <a:r>
               <a:rPr lang="en-US" sz="5000" dirty="0" smtClean="0"/>
-              <a:t>Send / print PDF file of transcript with verification key</a:t>
-            </a:r>
+              <a:t>key</a:t>
+            </a:r>
+            <a:endParaRPr lang="en-US" sz="5000" dirty="0"/>
+          </a:p>
+          <a:p>
+            <a:endParaRPr lang="en-US" sz="5000" dirty="0"/>
+          </a:p>
+          <a:p>
             <a:endParaRPr lang="en-US" sz="5000" dirty="0" smtClean="0"/>
           </a:p>
         </p:txBody>
       </p:sp>
+      <p:pic>
+        <p:nvPicPr>
+          <p:cNvPr id="12" name="Picture 11"/>
+          <p:cNvPicPr>
+            <a:picLocks noChangeAspect="1"/>
+          </p:cNvPicPr>
+          <p:nvPr/>
+        </p:nvPicPr>
+        <p:blipFill>
+          <a:blip r:embed="rId3"/>
+          <a:stretch>
+            <a:fillRect/>
+          </a:stretch>
+        </p:blipFill>
+        <p:spPr>
+          <a:xfrm>
+            <a:off x="7402931" y="1926119"/>
+            <a:ext cx="3714750" cy="3838575"/>
+          </a:xfrm>
+          <a:prstGeom prst="rect">
+            <a:avLst/>
+          </a:prstGeom>
+        </p:spPr>
+      </p:pic>
     </p:spTree>
     <p:extLst>
       <p:ext uri="{BB962C8B-B14F-4D97-AF65-F5344CB8AC3E}">

</xml_diff>

<commit_message>
Presentation ppt from Christy v 3.2
</commit_message>
<xml_diff>
--- a/MachoHacks2018.pptx
+++ b/MachoHacks2018.pptx
@@ -5,20 +5,19 @@
     <p:sldMasterId id="2147483648" r:id="rId1"/>
   </p:sldMasterIdLst>
   <p:notesMasterIdLst>
-    <p:notesMasterId r:id="rId13"/>
+    <p:notesMasterId r:id="rId12"/>
   </p:notesMasterIdLst>
   <p:sldIdLst>
     <p:sldId id="256" r:id="rId2"/>
     <p:sldId id="260" r:id="rId3"/>
     <p:sldId id="259" r:id="rId4"/>
     <p:sldId id="261" r:id="rId5"/>
-    <p:sldId id="263" r:id="rId6"/>
-    <p:sldId id="267" r:id="rId7"/>
+    <p:sldId id="267" r:id="rId6"/>
+    <p:sldId id="268" r:id="rId7"/>
     <p:sldId id="264" r:id="rId8"/>
-    <p:sldId id="268" r:id="rId9"/>
+    <p:sldId id="269" r:id="rId9"/>
     <p:sldId id="262" r:id="rId10"/>
-    <p:sldId id="266" r:id="rId11"/>
-    <p:sldId id="265" r:id="rId12"/>
+    <p:sldId id="265" r:id="rId11"/>
   </p:sldIdLst>
   <p:sldSz cx="12192000" cy="6858000"/>
   <p:notesSz cx="6858000" cy="9144000"/>
@@ -590,23 +589,10 @@
                 <a:ea typeface="+mn-ea"/>
                 <a:cs typeface="+mn-cs"/>
               </a:rPr>
-              <a:t>&lt;Team member introduction&gt;</a:t>
-            </a:r>
-          </a:p>
-          <a:p>
-            <a:endParaRPr lang="en-US" sz="1200" kern="1200" baseline="0" dirty="0" smtClean="0">
-              <a:solidFill>
-                <a:schemeClr val="tx1"/>
-              </a:solidFill>
-              <a:effectLst/>
-              <a:latin typeface="+mn-lt"/>
-              <a:ea typeface="+mn-ea"/>
-              <a:cs typeface="+mn-cs"/>
-            </a:endParaRPr>
-          </a:p>
-          <a:p>
-            <a:r>
-              <a:rPr lang="en-US" sz="1200" kern="1200" dirty="0" smtClean="0">
+              <a:t>&lt;Team member introduction</a:t>
+            </a:r>
+            <a:r>
+              <a:rPr lang="en-US" sz="1200" kern="1200" baseline="0" dirty="0" smtClean="0">
                 <a:solidFill>
                   <a:schemeClr val="tx1"/>
                 </a:solidFill>
@@ -615,181 +601,8 @@
                 <a:ea typeface="+mn-ea"/>
                 <a:cs typeface="+mn-cs"/>
               </a:rPr>
-              <a:t>Most aspects of our lives have</a:t>
-            </a:r>
-            <a:r>
-              <a:rPr lang="en-US" sz="1200" kern="1200" baseline="0" dirty="0" smtClean="0">
-                <a:solidFill>
-                  <a:schemeClr val="tx1"/>
-                </a:solidFill>
-                <a:effectLst/>
-                <a:latin typeface="+mn-lt"/>
-                <a:ea typeface="+mn-ea"/>
-                <a:cs typeface="+mn-cs"/>
-              </a:rPr>
-              <a:t> been </a:t>
-            </a:r>
-            <a:r>
-              <a:rPr lang="en-US" sz="1200" kern="1200" baseline="0" dirty="0" err="1" smtClean="0">
-                <a:solidFill>
-                  <a:schemeClr val="tx1"/>
-                </a:solidFill>
-                <a:effectLst/>
-                <a:latin typeface="+mn-lt"/>
-                <a:ea typeface="+mn-ea"/>
-                <a:cs typeface="+mn-cs"/>
-              </a:rPr>
-              <a:t>digitised</a:t>
-            </a:r>
-            <a:r>
-              <a:rPr lang="en-US" sz="1200" kern="1200" baseline="0" dirty="0" smtClean="0">
-                <a:solidFill>
-                  <a:schemeClr val="tx1"/>
-                </a:solidFill>
-                <a:effectLst/>
-                <a:latin typeface="+mn-lt"/>
-                <a:ea typeface="+mn-ea"/>
-                <a:cs typeface="+mn-cs"/>
-              </a:rPr>
-              <a:t>, but one area remains resistant to the tides of change.  Most institutions still require hard copies for any official certification, because we’re r</a:t>
-            </a:r>
-            <a:r>
-              <a:rPr lang="en-US" sz="1200" kern="1200" dirty="0" smtClean="0">
-                <a:solidFill>
-                  <a:schemeClr val="tx1"/>
-                </a:solidFill>
-                <a:effectLst/>
-                <a:latin typeface="+mn-lt"/>
-                <a:ea typeface="+mn-ea"/>
-                <a:cs typeface="+mn-cs"/>
-              </a:rPr>
-              <a:t>eliant on physical security features</a:t>
-            </a:r>
-            <a:r>
-              <a:rPr lang="en-US" sz="1200" kern="1200" baseline="0" dirty="0" smtClean="0">
-                <a:solidFill>
-                  <a:schemeClr val="tx1"/>
-                </a:solidFill>
-                <a:effectLst/>
-                <a:latin typeface="+mn-lt"/>
-                <a:ea typeface="+mn-ea"/>
-                <a:cs typeface="+mn-cs"/>
-              </a:rPr>
-              <a:t> such as </a:t>
-            </a:r>
-            <a:r>
-              <a:rPr lang="en-US" sz="1200" kern="1200" dirty="0" smtClean="0">
-                <a:solidFill>
-                  <a:schemeClr val="tx1"/>
-                </a:solidFill>
-                <a:effectLst/>
-                <a:latin typeface="+mn-lt"/>
-                <a:ea typeface="+mn-ea"/>
-                <a:cs typeface="+mn-cs"/>
-              </a:rPr>
-              <a:t>security ink, watermarks, micro-text, or serial numbers printed on special security paper. </a:t>
-            </a:r>
-          </a:p>
-          <a:p>
-            <a:endParaRPr lang="en-US" sz="1200" kern="1200" baseline="0" dirty="0" smtClean="0">
-              <a:solidFill>
-                <a:schemeClr val="tx1"/>
-              </a:solidFill>
-              <a:effectLst/>
-              <a:latin typeface="+mn-lt"/>
-              <a:ea typeface="+mn-ea"/>
-              <a:cs typeface="+mn-cs"/>
-            </a:endParaRPr>
-          </a:p>
-          <a:p>
-            <a:pPr marL="0" marR="0" lvl="0" indent="0" algn="l" defTabSz="914400" rtl="0" eaLnBrk="1" fontAlgn="auto" latinLnBrk="0" hangingPunct="1">
-              <a:lnSpc>
-                <a:spcPct val="100000"/>
-              </a:lnSpc>
-              <a:spcBef>
-                <a:spcPts val="0"/>
-              </a:spcBef>
-              <a:spcAft>
-                <a:spcPts val="0"/>
-              </a:spcAft>
-              <a:buClrTx/>
-              <a:buSzTx/>
-              <a:buFontTx/>
-              <a:buNone/>
-              <a:tabLst/>
-              <a:defRPr/>
-            </a:pPr>
-            <a:r>
-              <a:rPr lang="en-US" sz="1200" kern="1200" baseline="0" dirty="0" smtClean="0">
-                <a:solidFill>
-                  <a:schemeClr val="tx1"/>
-                </a:solidFill>
-                <a:effectLst/>
-                <a:latin typeface="+mn-lt"/>
-                <a:ea typeface="+mn-ea"/>
-                <a:cs typeface="+mn-cs"/>
-              </a:rPr>
-              <a:t>This reliance on hard copies is slow and inflexible.  But with only 48 hours to deliver our project, we narrowed our focus to something that all six of us have struggled with as students – so we set out with the goal of </a:t>
-            </a:r>
-            <a:r>
-              <a:rPr lang="en-US" sz="1200" kern="1200" baseline="0" dirty="0" err="1" smtClean="0">
-                <a:solidFill>
-                  <a:schemeClr val="tx1"/>
-                </a:solidFill>
-                <a:effectLst/>
-                <a:latin typeface="+mn-lt"/>
-                <a:ea typeface="+mn-ea"/>
-                <a:cs typeface="+mn-cs"/>
-              </a:rPr>
-              <a:t>digitising</a:t>
-            </a:r>
-            <a:r>
-              <a:rPr lang="en-US" sz="1200" kern="1200" baseline="0" dirty="0" smtClean="0">
-                <a:solidFill>
-                  <a:schemeClr val="tx1"/>
-                </a:solidFill>
-                <a:effectLst/>
-                <a:latin typeface="+mn-lt"/>
-                <a:ea typeface="+mn-ea"/>
-                <a:cs typeface="+mn-cs"/>
-              </a:rPr>
-              <a:t> verified academic transcripts with </a:t>
-            </a:r>
-            <a:r>
-              <a:rPr lang="en-US" sz="1200" kern="1200" baseline="0" dirty="0" err="1" smtClean="0">
-                <a:solidFill>
-                  <a:schemeClr val="tx1"/>
-                </a:solidFill>
-                <a:effectLst/>
-                <a:latin typeface="+mn-lt"/>
-                <a:ea typeface="+mn-ea"/>
-                <a:cs typeface="+mn-cs"/>
-              </a:rPr>
-              <a:t>blockchain</a:t>
-            </a:r>
-            <a:r>
-              <a:rPr lang="en-US" sz="1200" kern="1200" baseline="0" dirty="0" smtClean="0">
-                <a:solidFill>
-                  <a:schemeClr val="tx1"/>
-                </a:solidFill>
-                <a:effectLst/>
-                <a:latin typeface="+mn-lt"/>
-                <a:ea typeface="+mn-ea"/>
-                <a:cs typeface="+mn-cs"/>
-              </a:rPr>
-              <a:t>. </a:t>
-            </a:r>
-            <a:endParaRPr lang="en-US" sz="1200" kern="1200" baseline="0" dirty="0" smtClean="0">
-              <a:solidFill>
-                <a:schemeClr val="tx1"/>
-              </a:solidFill>
-              <a:effectLst/>
-              <a:latin typeface="+mn-lt"/>
-              <a:ea typeface="+mn-ea"/>
-              <a:cs typeface="+mn-cs"/>
-            </a:endParaRPr>
-          </a:p>
-          <a:p>
+              <a:t>&gt;</a:t>
+            </a:r>
             <a:endParaRPr lang="en-US" sz="1200" kern="1200" baseline="0" dirty="0" smtClean="0">
               <a:solidFill>
                 <a:schemeClr val="tx1"/>
@@ -882,36 +695,8 @@
           <a:bodyPr/>
           <a:lstStyle/>
           <a:p>
-            <a:r>
-              <a:rPr lang="en-US" baseline="0" dirty="0" smtClean="0"/>
-              <a:t>While </a:t>
-            </a:r>
-            <a:r>
-              <a:rPr lang="en-US" baseline="0" dirty="0" err="1" smtClean="0"/>
-              <a:t>blockchain</a:t>
-            </a:r>
-            <a:r>
-              <a:rPr lang="en-US" baseline="0" dirty="0" smtClean="0"/>
-              <a:t> cryptocurrencies were originally conceived as a way to </a:t>
-            </a:r>
-            <a:r>
-              <a:rPr lang="en-US" baseline="0" dirty="0" err="1" smtClean="0"/>
-              <a:t>decentralise</a:t>
-            </a:r>
-            <a:r>
-              <a:rPr lang="en-US" baseline="0" dirty="0" smtClean="0"/>
-              <a:t> information, its properties as an immutable append-only ledger makes it an excellent choice for digital verification of any kind.</a:t>
-            </a:r>
-          </a:p>
-          <a:p>
             <a:endParaRPr lang="en-US" baseline="0" dirty="0" smtClean="0"/>
           </a:p>
-          <a:p>
-            <a:r>
-              <a:rPr lang="en-US" baseline="0" dirty="0" smtClean="0"/>
-              <a:t>And most importantly, it’s safe to use with confidential information.  So our solution is compatible with tracking things as sensitive as medical records as well.</a:t>
-            </a:r>
-          </a:p>
         </p:txBody>
       </p:sp>
       <p:sp>
@@ -932,90 +717,6 @@
             <a:fld id="{EF034704-03E9-4A76-ACD6-2132D503C18D}" type="slidenum">
               <a:rPr lang="en-US" smtClean="0"/>
               <a:t>10</a:t>
-            </a:fld>
-            <a:endParaRPr lang="en-US"/>
-          </a:p>
-        </p:txBody>
-      </p:sp>
-    </p:spTree>
-    <p:extLst>
-      <p:ext uri="{BB962C8B-B14F-4D97-AF65-F5344CB8AC3E}">
-        <p14:creationId xmlns:p14="http://schemas.microsoft.com/office/powerpoint/2010/main" val="2325144710"/>
-      </p:ext>
-    </p:extLst>
-  </p:cSld>
-  <p:clrMapOvr>
-    <a:masterClrMapping/>
-  </p:clrMapOvr>
-</p:notes>
-</file>
-
-<file path=ppt/notesSlides/notesSlide11.xml><?xml version="1.0" encoding="utf-8"?>
-<p:notes xmlns:a="http://schemas.openxmlformats.org/drawingml/2006/main" xmlns:r="http://schemas.openxmlformats.org/officeDocument/2006/relationships" xmlns:p="http://schemas.openxmlformats.org/presentationml/2006/main">
-  <p:cSld>
-    <p:spTree>
-      <p:nvGrpSpPr>
-        <p:cNvPr id="1" name=""/>
-        <p:cNvGrpSpPr/>
-        <p:nvPr/>
-      </p:nvGrpSpPr>
-      <p:grpSpPr>
-        <a:xfrm>
-          <a:off x="0" y="0"/>
-          <a:ext cx="0" cy="0"/>
-          <a:chOff x="0" y="0"/>
-          <a:chExt cx="0" cy="0"/>
-        </a:xfrm>
-      </p:grpSpPr>
-      <p:sp>
-        <p:nvSpPr>
-          <p:cNvPr id="2" name="Slide Image Placeholder 1"/>
-          <p:cNvSpPr>
-            <a:spLocks noGrp="1" noRot="1" noChangeAspect="1"/>
-          </p:cNvSpPr>
-          <p:nvPr>
-            <p:ph type="sldImg"/>
-          </p:nvPr>
-        </p:nvSpPr>
-        <p:spPr/>
-      </p:sp>
-      <p:sp>
-        <p:nvSpPr>
-          <p:cNvPr id="3" name="Notes Placeholder 2"/>
-          <p:cNvSpPr>
-            <a:spLocks noGrp="1"/>
-          </p:cNvSpPr>
-          <p:nvPr>
-            <p:ph type="body" idx="1"/>
-          </p:nvPr>
-        </p:nvSpPr>
-        <p:spPr/>
-        <p:txBody>
-          <a:bodyPr/>
-          <a:lstStyle/>
-          <a:p>
-            <a:endParaRPr lang="en-US" baseline="0" dirty="0" smtClean="0"/>
-          </a:p>
-        </p:txBody>
-      </p:sp>
-      <p:sp>
-        <p:nvSpPr>
-          <p:cNvPr id="4" name="Slide Number Placeholder 3"/>
-          <p:cNvSpPr>
-            <a:spLocks noGrp="1"/>
-          </p:cNvSpPr>
-          <p:nvPr>
-            <p:ph type="sldNum" sz="quarter" idx="10"/>
-          </p:nvPr>
-        </p:nvSpPr>
-        <p:spPr/>
-        <p:txBody>
-          <a:bodyPr/>
-          <a:lstStyle/>
-          <a:p>
-            <a:fld id="{EF034704-03E9-4A76-ACD6-2132D503C18D}" type="slidenum">
-              <a:rPr lang="en-US" smtClean="0"/>
-              <a:t>11</a:t>
             </a:fld>
             <a:endParaRPr lang="en-US"/>
           </a:p>
@@ -1079,8 +780,192 @@
           <a:lstStyle/>
           <a:p>
             <a:r>
+              <a:rPr lang="en-US" sz="1200" kern="1200" dirty="0" smtClean="0">
+                <a:solidFill>
+                  <a:schemeClr val="tx1"/>
+                </a:solidFill>
+                <a:effectLst/>
+                <a:latin typeface="+mn-lt"/>
+                <a:ea typeface="+mn-ea"/>
+                <a:cs typeface="+mn-cs"/>
+              </a:rPr>
+              <a:t>Most aspects of our lives have</a:t>
+            </a:r>
+            <a:r>
+              <a:rPr lang="en-US" sz="1200" kern="1200" baseline="0" dirty="0" smtClean="0">
+                <a:solidFill>
+                  <a:schemeClr val="tx1"/>
+                </a:solidFill>
+                <a:effectLst/>
+                <a:latin typeface="+mn-lt"/>
+                <a:ea typeface="+mn-ea"/>
+                <a:cs typeface="+mn-cs"/>
+              </a:rPr>
+              <a:t> been </a:t>
+            </a:r>
+            <a:r>
+              <a:rPr lang="en-US" sz="1200" kern="1200" baseline="0" dirty="0" err="1" smtClean="0">
+                <a:solidFill>
+                  <a:schemeClr val="tx1"/>
+                </a:solidFill>
+                <a:effectLst/>
+                <a:latin typeface="+mn-lt"/>
+                <a:ea typeface="+mn-ea"/>
+                <a:cs typeface="+mn-cs"/>
+              </a:rPr>
+              <a:t>digitised</a:t>
+            </a:r>
+            <a:r>
+              <a:rPr lang="en-US" sz="1200" kern="1200" baseline="0" dirty="0" smtClean="0">
+                <a:solidFill>
+                  <a:schemeClr val="tx1"/>
+                </a:solidFill>
+                <a:effectLst/>
+                <a:latin typeface="+mn-lt"/>
+                <a:ea typeface="+mn-ea"/>
+                <a:cs typeface="+mn-cs"/>
+              </a:rPr>
+              <a:t>, but one area remains resistant to the tides of change.  Most institutions still require hard copies for any official certification, because we’re r</a:t>
+            </a:r>
+            <a:r>
+              <a:rPr lang="en-US" sz="1200" kern="1200" dirty="0" smtClean="0">
+                <a:solidFill>
+                  <a:schemeClr val="tx1"/>
+                </a:solidFill>
+                <a:effectLst/>
+                <a:latin typeface="+mn-lt"/>
+                <a:ea typeface="+mn-ea"/>
+                <a:cs typeface="+mn-cs"/>
+              </a:rPr>
+              <a:t>eliant on physical security features</a:t>
+            </a:r>
+            <a:r>
+              <a:rPr lang="en-US" sz="1200" kern="1200" baseline="0" dirty="0" smtClean="0">
+                <a:solidFill>
+                  <a:schemeClr val="tx1"/>
+                </a:solidFill>
+                <a:effectLst/>
+                <a:latin typeface="+mn-lt"/>
+                <a:ea typeface="+mn-ea"/>
+                <a:cs typeface="+mn-cs"/>
+              </a:rPr>
+              <a:t> such as </a:t>
+            </a:r>
+            <a:r>
+              <a:rPr lang="en-US" sz="1200" kern="1200" dirty="0" smtClean="0">
+                <a:solidFill>
+                  <a:schemeClr val="tx1"/>
+                </a:solidFill>
+                <a:effectLst/>
+                <a:latin typeface="+mn-lt"/>
+                <a:ea typeface="+mn-ea"/>
+                <a:cs typeface="+mn-cs"/>
+              </a:rPr>
+              <a:t>security ink, watermarks, micro-text, or serial numbers printed on special security paper. </a:t>
+            </a:r>
+          </a:p>
+          <a:p>
+            <a:endParaRPr lang="en-US" sz="1200" kern="1200" baseline="0" dirty="0" smtClean="0">
+              <a:solidFill>
+                <a:schemeClr val="tx1"/>
+              </a:solidFill>
+              <a:effectLst/>
+              <a:latin typeface="+mn-lt"/>
+              <a:ea typeface="+mn-ea"/>
+              <a:cs typeface="+mn-cs"/>
+            </a:endParaRPr>
+          </a:p>
+          <a:p>
+            <a:pPr marL="0" marR="0" lvl="0" indent="0" algn="l" defTabSz="914400" rtl="0" eaLnBrk="1" fontAlgn="auto" latinLnBrk="0" hangingPunct="1">
+              <a:lnSpc>
+                <a:spcPct val="100000"/>
+              </a:lnSpc>
+              <a:spcBef>
+                <a:spcPts val="0"/>
+              </a:spcBef>
+              <a:spcAft>
+                <a:spcPts val="0"/>
+              </a:spcAft>
+              <a:buClrTx/>
+              <a:buSzTx/>
+              <a:buFontTx/>
+              <a:buNone/>
+              <a:tabLst/>
+              <a:defRPr/>
+            </a:pPr>
+            <a:r>
+              <a:rPr lang="en-US" sz="1200" kern="1200" baseline="0" dirty="0" smtClean="0">
+                <a:solidFill>
+                  <a:schemeClr val="tx1"/>
+                </a:solidFill>
+                <a:effectLst/>
+                <a:latin typeface="+mn-lt"/>
+                <a:ea typeface="+mn-ea"/>
+                <a:cs typeface="+mn-cs"/>
+              </a:rPr>
+              <a:t>This reliance on hard copies is slow and inflexible.  But with only 48 hours to deliver our project, we narrowed our focus to something that all six of us have struggled with as students – so we set out with the goal of </a:t>
+            </a:r>
+            <a:r>
+              <a:rPr lang="en-US" sz="1200" kern="1200" baseline="0" dirty="0" err="1" smtClean="0">
+                <a:solidFill>
+                  <a:schemeClr val="tx1"/>
+                </a:solidFill>
+                <a:effectLst/>
+                <a:latin typeface="+mn-lt"/>
+                <a:ea typeface="+mn-ea"/>
+                <a:cs typeface="+mn-cs"/>
+              </a:rPr>
+              <a:t>digitising</a:t>
+            </a:r>
+            <a:r>
+              <a:rPr lang="en-US" sz="1200" kern="1200" baseline="0" dirty="0" smtClean="0">
+                <a:solidFill>
+                  <a:schemeClr val="tx1"/>
+                </a:solidFill>
+                <a:effectLst/>
+                <a:latin typeface="+mn-lt"/>
+                <a:ea typeface="+mn-ea"/>
+                <a:cs typeface="+mn-cs"/>
+              </a:rPr>
+              <a:t> verified academic transcripts with </a:t>
+            </a:r>
+            <a:r>
+              <a:rPr lang="en-US" sz="1200" kern="1200" baseline="0" dirty="0" err="1" smtClean="0">
+                <a:solidFill>
+                  <a:schemeClr val="tx1"/>
+                </a:solidFill>
+                <a:effectLst/>
+                <a:latin typeface="+mn-lt"/>
+                <a:ea typeface="+mn-ea"/>
+                <a:cs typeface="+mn-cs"/>
+              </a:rPr>
+              <a:t>blockchain</a:t>
+            </a:r>
+            <a:r>
+              <a:rPr lang="en-US" sz="1200" kern="1200" baseline="0" dirty="0" smtClean="0">
+                <a:solidFill>
+                  <a:schemeClr val="tx1"/>
+                </a:solidFill>
+                <a:effectLst/>
+                <a:latin typeface="+mn-lt"/>
+                <a:ea typeface="+mn-ea"/>
+                <a:cs typeface="+mn-cs"/>
+              </a:rPr>
+              <a:t>. </a:t>
+            </a:r>
+            <a:endParaRPr lang="en-US" baseline="0" dirty="0" smtClean="0"/>
+          </a:p>
+          <a:p>
+            <a:endParaRPr lang="en-US" baseline="0" dirty="0" smtClean="0"/>
+          </a:p>
+          <a:p>
+            <a:r>
               <a:rPr lang="en-US" baseline="0" dirty="0" smtClean="0"/>
-              <a:t>Right now, it can be painful </a:t>
+              <a:t>Right </a:t>
+            </a:r>
+            <a:r>
+              <a:rPr lang="en-US" baseline="0" dirty="0" smtClean="0"/>
+              <a:t>now, it can be painful </a:t>
             </a:r>
             <a:r>
               <a:rPr lang="en-US" dirty="0" smtClean="0"/>
@@ -1440,6 +1325,35 @@
           <a:lstStyle/>
           <a:p>
             <a:r>
+              <a:rPr lang="en-US" sz="1200" dirty="0" err="1" smtClean="0"/>
+              <a:t>Blockchain</a:t>
+            </a:r>
+            <a:r>
+              <a:rPr lang="en-US" sz="1200" dirty="0" smtClean="0"/>
+              <a:t> only secures hash of student info</a:t>
+            </a:r>
+          </a:p>
+          <a:p>
+            <a:r>
+              <a:rPr lang="en-US" sz="1200" dirty="0" err="1" smtClean="0"/>
+              <a:t>Centralised</a:t>
+            </a:r>
+            <a:r>
+              <a:rPr lang="en-US" sz="1200" dirty="0" smtClean="0"/>
+              <a:t> database to protect private info</a:t>
+            </a:r>
+          </a:p>
+          <a:p>
+            <a:r>
+              <a:rPr lang="en-US" sz="1200" dirty="0" smtClean="0"/>
+              <a:t>Still reliant on database security</a:t>
+            </a:r>
+          </a:p>
+          <a:p>
+            <a:endParaRPr lang="en-US" baseline="0" dirty="0" smtClean="0"/>
+          </a:p>
+          <a:p>
+            <a:r>
               <a:rPr lang="en-US" baseline="0" dirty="0" smtClean="0"/>
               <a:t>We felt that student information was too sensitive to store publicly, so our solution still uses a </a:t>
             </a:r>
@@ -1483,6 +1397,59 @@
             <a:r>
               <a:rPr lang="en-US" baseline="0" dirty="0" smtClean="0"/>
               <a:t> for security is secondary.  Our implementation relies on the security of the database itself.</a:t>
+            </a:r>
+          </a:p>
+          <a:p>
+            <a:endParaRPr lang="en-US" baseline="0" dirty="0" smtClean="0"/>
+          </a:p>
+          <a:p>
+            <a:endParaRPr lang="en-US" baseline="0" dirty="0" smtClean="0"/>
+          </a:p>
+          <a:p>
+            <a:r>
+              <a:rPr lang="en-US" baseline="0" dirty="0" smtClean="0"/>
+              <a:t>Let’s </a:t>
+            </a:r>
+            <a:r>
+              <a:rPr lang="en-US" baseline="0" dirty="0" smtClean="0"/>
+              <a:t>take a closer look at the nuts and bolts.  </a:t>
+            </a:r>
+          </a:p>
+          <a:p>
+            <a:endParaRPr lang="en-US" baseline="0" dirty="0" smtClean="0"/>
+          </a:p>
+          <a:p>
+            <a:r>
+              <a:rPr lang="en-US" baseline="0" dirty="0" smtClean="0"/>
+              <a:t>We take information from the student database as inputs to generate a hash that is verified by the school.  The school burns a small amount of money from their public address in </a:t>
+            </a:r>
+            <a:r>
+              <a:rPr lang="en-US" b="1" baseline="0" dirty="0" smtClean="0"/>
+              <a:t>provably </a:t>
+            </a:r>
+            <a:r>
+              <a:rPr lang="en-US" b="1" baseline="0" dirty="0" err="1" smtClean="0"/>
+              <a:t>unspendable</a:t>
+            </a:r>
+            <a:r>
+              <a:rPr lang="en-US" b="1" baseline="0" dirty="0" smtClean="0"/>
+              <a:t> commitments </a:t>
+            </a:r>
+            <a:r>
+              <a:rPr lang="en-US" b="0" baseline="0" dirty="0" smtClean="0"/>
+              <a:t>to store hashes</a:t>
+            </a:r>
+            <a:r>
+              <a:rPr lang="en-US" baseline="0" dirty="0" smtClean="0"/>
+              <a:t> in the OP_RETURN field on a </a:t>
+            </a:r>
+            <a:r>
+              <a:rPr lang="en-US" baseline="0" dirty="0" err="1" smtClean="0"/>
+              <a:t>blockchain</a:t>
+            </a:r>
+            <a:r>
+              <a:rPr lang="en-US" baseline="0" dirty="0" smtClean="0"/>
+              <a:t>.</a:t>
             </a:r>
           </a:p>
         </p:txBody>
@@ -1513,7 +1480,7 @@
     </p:spTree>
     <p:extLst>
       <p:ext uri="{BB962C8B-B14F-4D97-AF65-F5344CB8AC3E}">
-        <p14:creationId xmlns:p14="http://schemas.microsoft.com/office/powerpoint/2010/main" val="2296405001"/>
+        <p14:creationId xmlns:p14="http://schemas.microsoft.com/office/powerpoint/2010/main" val="314149806"/>
       </p:ext>
     </p:extLst>
   </p:cSld>
@@ -1567,47 +1534,7 @@
           <a:bodyPr/>
           <a:lstStyle/>
           <a:p>
-            <a:r>
-              <a:rPr lang="en-US" baseline="0" dirty="0" smtClean="0"/>
-              <a:t>Let’s take a closer look at the nuts and bolts.  </a:t>
-            </a:r>
-          </a:p>
-          <a:p>
             <a:endParaRPr lang="en-US" baseline="0" dirty="0" smtClean="0"/>
-          </a:p>
-          <a:p>
-            <a:r>
-              <a:rPr lang="en-US" baseline="0" dirty="0" smtClean="0"/>
-              <a:t>We take information from the student database as inputs to generate a hash that is verified by the school.  The school burns a small amount of money from their public address in </a:t>
-            </a:r>
-            <a:r>
-              <a:rPr lang="en-US" b="1" baseline="0" dirty="0" smtClean="0"/>
-              <a:t>provably </a:t>
-            </a:r>
-            <a:r>
-              <a:rPr lang="en-US" b="1" baseline="0" dirty="0" err="1" smtClean="0"/>
-              <a:t>unspendable</a:t>
-            </a:r>
-            <a:r>
-              <a:rPr lang="en-US" b="1" baseline="0" dirty="0" smtClean="0"/>
-              <a:t> commitments </a:t>
-            </a:r>
-            <a:r>
-              <a:rPr lang="en-US" b="0" baseline="0" dirty="0" smtClean="0"/>
-              <a:t>to store hashes</a:t>
-            </a:r>
-            <a:r>
-              <a:rPr lang="en-US" baseline="0" dirty="0" smtClean="0"/>
-              <a:t> in the OP_RETURN field on a </a:t>
-            </a:r>
-            <a:r>
-              <a:rPr lang="en-US" baseline="0" dirty="0" err="1" smtClean="0"/>
-              <a:t>blockchain</a:t>
-            </a:r>
-            <a:r>
-              <a:rPr lang="en-US" baseline="0" dirty="0" smtClean="0"/>
-              <a:t>.</a:t>
-            </a:r>
           </a:p>
         </p:txBody>
       </p:sp>
@@ -1637,7 +1564,7 @@
     </p:spTree>
     <p:extLst>
       <p:ext uri="{BB962C8B-B14F-4D97-AF65-F5344CB8AC3E}">
-        <p14:creationId xmlns:p14="http://schemas.microsoft.com/office/powerpoint/2010/main" val="314149806"/>
+        <p14:creationId xmlns:p14="http://schemas.microsoft.com/office/powerpoint/2010/main" val="2018885129"/>
       </p:ext>
     </p:extLst>
   </p:cSld>
@@ -1787,7 +1714,19 @@
           <a:bodyPr/>
           <a:lstStyle/>
           <a:p>
+            <a:r>
+              <a:rPr lang="en-US" baseline="0" dirty="0" smtClean="0"/>
+              <a:t>After the hash commitment, students can log in to their school account to select the term grades they want to share.  A random key and transcript file are generated based on their choice, and the random key is stored in the student database.</a:t>
+            </a:r>
+          </a:p>
+          <a:p>
             <a:endParaRPr lang="en-US" baseline="0" dirty="0" smtClean="0"/>
+          </a:p>
+          <a:p>
+            <a:r>
+              <a:rPr lang="en-US" baseline="0" dirty="0" smtClean="0"/>
+              <a:t>This key is used to (a) pull up the relevant transcript information and (b) to calculate the hash and verify that the information displayed is correct.</a:t>
+            </a:r>
           </a:p>
         </p:txBody>
       </p:sp>
@@ -1817,7 +1756,7 @@
     </p:spTree>
     <p:extLst>
       <p:ext uri="{BB962C8B-B14F-4D97-AF65-F5344CB8AC3E}">
-        <p14:creationId xmlns:p14="http://schemas.microsoft.com/office/powerpoint/2010/main" val="2018885129"/>
+        <p14:creationId xmlns:p14="http://schemas.microsoft.com/office/powerpoint/2010/main" val="4087188551"/>
       </p:ext>
     </p:extLst>
   </p:cSld>
@@ -7651,12 +7590,12 @@
           <a:lstStyle/>
           <a:p>
             <a:r>
+              <a:rPr lang="en-US" sz="7000" b="1" dirty="0" smtClean="0"/>
+              <a:t>Transcript </a:t>
+            </a:r>
+            <a:r>
               <a:rPr lang="en-US" sz="7000" b="1" dirty="0" err="1" smtClean="0"/>
-              <a:t>Blockchain</a:t>
-            </a:r>
-            <a:r>
-              <a:rPr lang="en-US" sz="7000" b="1" dirty="0" smtClean="0"/>
-              <a:t> certification</a:t>
+              <a:t>verifciation</a:t>
             </a:r>
             <a:endParaRPr lang="en-US" sz="7000" b="1" dirty="0"/>
           </a:p>
@@ -7680,13 +7619,27 @@
         </p:spPr>
         <p:txBody>
           <a:bodyPr>
-            <a:normAutofit/>
+            <a:normAutofit lnSpcReduction="10000"/>
           </a:bodyPr>
           <a:lstStyle/>
           <a:p>
             <a:r>
+              <a:rPr lang="en-US" sz="4000" dirty="0" err="1" smtClean="0"/>
+              <a:t>Blockchain</a:t>
+            </a:r>
+            <a:r>
               <a:rPr lang="en-US" sz="4000" dirty="0" smtClean="0"/>
-              <a:t>Team: NKB</a:t>
+              <a:t> ----</a:t>
+            </a:r>
+          </a:p>
+          <a:p>
+            <a:r>
+              <a:rPr lang="en-US" sz="4000" dirty="0" smtClean="0"/>
+              <a:t>Team</a:t>
+            </a:r>
+            <a:r>
+              <a:rPr lang="en-US" sz="4000" dirty="0" smtClean="0"/>
+              <a:t>: NKB</a:t>
             </a:r>
           </a:p>
         </p:txBody>
@@ -7731,111 +7684,6 @@
             <p:ph type="title"/>
           </p:nvPr>
         </p:nvSpPr>
-        <p:spPr/>
-        <p:txBody>
-          <a:bodyPr>
-            <a:normAutofit/>
-          </a:bodyPr>
-          <a:lstStyle/>
-          <a:p>
-            <a:r>
-              <a:rPr lang="en-US" sz="6000" b="1" dirty="0" smtClean="0"/>
-              <a:t>Other applications</a:t>
-            </a:r>
-            <a:endParaRPr lang="en-US" sz="6000" b="1" dirty="0"/>
-          </a:p>
-        </p:txBody>
-      </p:sp>
-      <p:sp>
-        <p:nvSpPr>
-          <p:cNvPr id="3" name="Content Placeholder 2"/>
-          <p:cNvSpPr>
-            <a:spLocks noGrp="1"/>
-          </p:cNvSpPr>
-          <p:nvPr>
-            <p:ph idx="1"/>
-          </p:nvPr>
-        </p:nvSpPr>
-        <p:spPr>
-          <a:xfrm>
-            <a:off x="685801" y="1975812"/>
-            <a:ext cx="10131425" cy="3649133"/>
-          </a:xfrm>
-        </p:spPr>
-        <p:txBody>
-          <a:bodyPr>
-            <a:noAutofit/>
-          </a:bodyPr>
-          <a:lstStyle/>
-          <a:p>
-            <a:r>
-              <a:rPr lang="en-US" sz="5000" dirty="0" smtClean="0"/>
-              <a:t>Certification of any kind</a:t>
-            </a:r>
-            <a:r>
-              <a:rPr lang="en-US" sz="5000" dirty="0"/>
-              <a:t> </a:t>
-            </a:r>
-            <a:r>
-              <a:rPr lang="en-US" sz="5000" dirty="0" smtClean="0"/>
-              <a:t>from an issuer that consumers trust</a:t>
-            </a:r>
-          </a:p>
-          <a:p>
-            <a:r>
-              <a:rPr lang="en-US" sz="5000" dirty="0" smtClean="0"/>
-              <a:t>Safe to use for confidential info</a:t>
-            </a:r>
-            <a:br>
-              <a:rPr lang="en-US" sz="5000" dirty="0" smtClean="0"/>
-            </a:br>
-            <a:r>
-              <a:rPr lang="en-US" sz="5000" dirty="0" smtClean="0"/>
-              <a:t>(e.g. medical records)</a:t>
-            </a:r>
-          </a:p>
-        </p:txBody>
-      </p:sp>
-    </p:spTree>
-    <p:extLst>
-      <p:ext uri="{BB962C8B-B14F-4D97-AF65-F5344CB8AC3E}">
-        <p14:creationId xmlns:p14="http://schemas.microsoft.com/office/powerpoint/2010/main" val="859995104"/>
-      </p:ext>
-    </p:extLst>
-  </p:cSld>
-  <p:clrMapOvr>
-    <a:masterClrMapping/>
-  </p:clrMapOvr>
-</p:sld>
-</file>
-
-<file path=ppt/slides/slide11.xml><?xml version="1.0" encoding="utf-8"?>
-<p:sld xmlns:a="http://schemas.openxmlformats.org/drawingml/2006/main" xmlns:r="http://schemas.openxmlformats.org/officeDocument/2006/relationships" xmlns:p="http://schemas.openxmlformats.org/presentationml/2006/main">
-  <p:cSld>
-    <p:spTree>
-      <p:nvGrpSpPr>
-        <p:cNvPr id="1" name=""/>
-        <p:cNvGrpSpPr/>
-        <p:nvPr/>
-      </p:nvGrpSpPr>
-      <p:grpSpPr>
-        <a:xfrm>
-          <a:off x="0" y="0"/>
-          <a:ext cx="0" cy="0"/>
-          <a:chOff x="0" y="0"/>
-          <a:chExt cx="0" cy="0"/>
-        </a:xfrm>
-      </p:grpSpPr>
-      <p:sp>
-        <p:nvSpPr>
-          <p:cNvPr id="2" name="Title 1"/>
-          <p:cNvSpPr>
-            <a:spLocks noGrp="1"/>
-          </p:cNvSpPr>
-          <p:nvPr>
-            <p:ph type="title"/>
-          </p:nvPr>
-        </p:nvSpPr>
         <p:spPr>
           <a:xfrm>
             <a:off x="844827" y="331305"/>
@@ -7934,7 +7782,7 @@
           <a:p>
             <a:r>
               <a:rPr lang="en-US" sz="6000" b="1" dirty="0" smtClean="0"/>
-              <a:t>CURRENTLY…</a:t>
+              <a:t>CURRENT problem</a:t>
             </a:r>
             <a:endParaRPr lang="en-US" sz="6000" b="1" dirty="0"/>
           </a:p>
@@ -7952,7 +7800,7 @@
         </p:nvSpPr>
         <p:spPr>
           <a:xfrm>
-            <a:off x="685801" y="1583926"/>
+            <a:off x="685801" y="1888726"/>
             <a:ext cx="10131425" cy="3649133"/>
           </a:xfrm>
         </p:spPr>
@@ -7967,21 +7815,35 @@
             </a:pPr>
             <a:r>
               <a:rPr lang="en-US" sz="5000" dirty="0" smtClean="0"/>
-              <a:t>Verification is:</a:t>
-            </a:r>
-            <a:endParaRPr lang="en-US" sz="5000" dirty="0"/>
-          </a:p>
-          <a:p>
+              <a:t>Verification is</a:t>
+            </a:r>
             <a:r>
               <a:rPr lang="en-US" sz="5000" dirty="0" smtClean="0"/>
-              <a:t>Slow (1 – 2 weeks)</a:t>
+              <a:t>:</a:t>
             </a:r>
           </a:p>
           <a:p>
             <a:r>
               <a:rPr lang="en-US" sz="5000" dirty="0" smtClean="0"/>
-              <a:t>$10</a:t>
-            </a:r>
+              <a:t>Physical</a:t>
+            </a:r>
+          </a:p>
+          <a:p>
+            <a:r>
+              <a:rPr lang="en-US" sz="5000" dirty="0" smtClean="0"/>
+              <a:t>Slow </a:t>
+            </a:r>
+            <a:r>
+              <a:rPr lang="en-US" sz="5000" dirty="0" smtClean="0"/>
+              <a:t>(1 – 2 weeks)</a:t>
+            </a:r>
+          </a:p>
+          <a:p>
+            <a:r>
+              <a:rPr lang="en-US" sz="5000" dirty="0" smtClean="0"/>
+              <a:t>Costly</a:t>
+            </a:r>
+            <a:endParaRPr lang="en-US" sz="5000" dirty="0" smtClean="0"/>
           </a:p>
         </p:txBody>
       </p:sp>
@@ -8105,12 +7967,13 @@
           <a:p>
             <a:r>
               <a:rPr lang="en-US" sz="5000" dirty="0" err="1" smtClean="0"/>
-              <a:t>Digitise</a:t>
+              <a:t>Digitised</a:t>
             </a:r>
             <a:r>
               <a:rPr lang="en-US" sz="5000" dirty="0" smtClean="0"/>
-              <a:t> credentials from issuers</a:t>
-            </a:r>
+              <a:t> transcripts from schools</a:t>
+            </a:r>
+            <a:endParaRPr lang="en-US" sz="5000" dirty="0" smtClean="0"/>
           </a:p>
           <a:p>
             <a:r>
@@ -8152,7 +8015,7 @@
         </p:blipFill>
         <p:spPr bwMode="auto">
           <a:xfrm>
-            <a:off x="6731148" y="2025876"/>
+            <a:off x="6731148" y="2266507"/>
             <a:ext cx="5062157" cy="2649197"/>
           </a:xfrm>
           <a:prstGeom prst="rect">
@@ -8255,7 +8118,15 @@
           <a:p>
             <a:r>
               <a:rPr lang="en-US" sz="5000" dirty="0" smtClean="0"/>
-              <a:t>Store hashes on </a:t>
+              <a:t>Store </a:t>
+            </a:r>
+            <a:r>
+              <a:rPr lang="en-US" sz="5000" dirty="0" smtClean="0"/>
+              <a:t>hashed student info </a:t>
+            </a:r>
+            <a:r>
+              <a:rPr lang="en-US" sz="5000" dirty="0" smtClean="0"/>
+              <a:t>on </a:t>
             </a:r>
             <a:r>
               <a:rPr lang="en-US" sz="5000" dirty="0" err="1" smtClean="0"/>
@@ -8263,8 +8134,13 @@
             </a:r>
             <a:r>
               <a:rPr lang="en-US" sz="5000" dirty="0" smtClean="0"/>
-              <a:t> in transaction signed by issuer</a:t>
-            </a:r>
+              <a:t> in transaction signed by </a:t>
+            </a:r>
+            <a:r>
+              <a:rPr lang="en-US" sz="5000" dirty="0" smtClean="0"/>
+              <a:t>school</a:t>
+            </a:r>
+            <a:endParaRPr lang="en-US" sz="5000" dirty="0" smtClean="0"/>
           </a:p>
         </p:txBody>
       </p:sp>
@@ -8317,142 +8193,7 @@
           <a:p>
             <a:r>
               <a:rPr lang="en-US" sz="6000" b="1" dirty="0" smtClean="0"/>
-              <a:t>Implementation</a:t>
-            </a:r>
-            <a:endParaRPr lang="en-US" sz="6000" b="1" dirty="0"/>
-          </a:p>
-        </p:txBody>
-      </p:sp>
-      <p:sp>
-        <p:nvSpPr>
-          <p:cNvPr id="3" name="Content Placeholder 2"/>
-          <p:cNvSpPr>
-            <a:spLocks noGrp="1"/>
-          </p:cNvSpPr>
-          <p:nvPr>
-            <p:ph idx="1"/>
-          </p:nvPr>
-        </p:nvSpPr>
-        <p:spPr>
-          <a:xfrm>
-            <a:off x="685802" y="1975812"/>
-            <a:ext cx="6735416" cy="3649133"/>
-          </a:xfrm>
-        </p:spPr>
-        <p:txBody>
-          <a:bodyPr>
-            <a:noAutofit/>
-          </a:bodyPr>
-          <a:lstStyle/>
-          <a:p>
-            <a:r>
-              <a:rPr lang="en-US" sz="5000" dirty="0" err="1" smtClean="0"/>
-              <a:t>Centralised</a:t>
-            </a:r>
-            <a:r>
-              <a:rPr lang="en-US" sz="5000" dirty="0" smtClean="0"/>
-              <a:t> database to protect confidential info</a:t>
-            </a:r>
-          </a:p>
-          <a:p>
-            <a:r>
-              <a:rPr lang="en-US" sz="5000" dirty="0" smtClean="0"/>
-              <a:t>Still reliant on database security</a:t>
-            </a:r>
-          </a:p>
-        </p:txBody>
-      </p:sp>
-      <p:pic>
-        <p:nvPicPr>
-          <p:cNvPr id="1026" name="Picture 2" descr="Database symbol by eternaltyro"/>
-          <p:cNvPicPr>
-            <a:picLocks noChangeAspect="1" noChangeArrowheads="1"/>
-          </p:cNvPicPr>
-          <p:nvPr/>
-        </p:nvPicPr>
-        <p:blipFill>
-          <a:blip r:embed="rId3">
-            <a:extLst>
-              <a:ext uri="{28A0092B-C50C-407E-A947-70E740481C1C}">
-                <a14:useLocalDpi xmlns:a14="http://schemas.microsoft.com/office/drawing/2010/main" val="0"/>
-              </a:ext>
-            </a:extLst>
-          </a:blip>
-          <a:srcRect/>
-          <a:stretch>
-            <a:fillRect/>
-          </a:stretch>
-        </p:blipFill>
-        <p:spPr bwMode="auto">
-          <a:xfrm>
-            <a:off x="7822534" y="1715555"/>
-            <a:ext cx="2819647" cy="3909390"/>
-          </a:xfrm>
-          <a:prstGeom prst="rect">
-            <a:avLst/>
-          </a:prstGeom>
-          <a:noFill/>
-          <a:extLst>
-            <a:ext uri="{909E8E84-426E-40DD-AFC4-6F175D3DCCD1}">
-              <a14:hiddenFill xmlns:a14="http://schemas.microsoft.com/office/drawing/2010/main">
-                <a:solidFill>
-                  <a:srgbClr val="FFFFFF"/>
-                </a:solidFill>
-              </a14:hiddenFill>
-            </a:ext>
-          </a:extLst>
-        </p:spPr>
-      </p:pic>
-    </p:spTree>
-    <p:extLst>
-      <p:ext uri="{BB962C8B-B14F-4D97-AF65-F5344CB8AC3E}">
-        <p14:creationId xmlns:p14="http://schemas.microsoft.com/office/powerpoint/2010/main" val="3910172602"/>
-      </p:ext>
-    </p:extLst>
-  </p:cSld>
-  <p:clrMapOvr>
-    <a:masterClrMapping/>
-  </p:clrMapOvr>
-</p:sld>
-</file>
-
-<file path=ppt/slides/slide6.xml><?xml version="1.0" encoding="utf-8"?>
-<p:sld xmlns:a="http://schemas.openxmlformats.org/drawingml/2006/main" xmlns:r="http://schemas.openxmlformats.org/officeDocument/2006/relationships" xmlns:p="http://schemas.openxmlformats.org/presentationml/2006/main">
-  <p:cSld>
-    <p:spTree>
-      <p:nvGrpSpPr>
-        <p:cNvPr id="1" name=""/>
-        <p:cNvGrpSpPr/>
-        <p:nvPr/>
-      </p:nvGrpSpPr>
-      <p:grpSpPr>
-        <a:xfrm>
-          <a:off x="0" y="0"/>
-          <a:ext cx="0" cy="0"/>
-          <a:chOff x="0" y="0"/>
-          <a:chExt cx="0" cy="0"/>
-        </a:xfrm>
-      </p:grpSpPr>
-      <p:sp>
-        <p:nvSpPr>
-          <p:cNvPr id="2" name="Title 1"/>
-          <p:cNvSpPr>
-            <a:spLocks noGrp="1"/>
-          </p:cNvSpPr>
-          <p:nvPr>
-            <p:ph type="title"/>
-          </p:nvPr>
-        </p:nvSpPr>
-        <p:spPr/>
-        <p:txBody>
-          <a:bodyPr>
-            <a:normAutofit/>
-          </a:bodyPr>
-          <a:lstStyle/>
-          <a:p>
-            <a:r>
-              <a:rPr lang="en-US" sz="6000" b="1" dirty="0" smtClean="0"/>
-              <a:t>A closer look…</a:t>
+              <a:t>How it works (school)</a:t>
             </a:r>
             <a:endParaRPr lang="en-US" sz="6000" b="1" dirty="0"/>
           </a:p>
@@ -8531,6 +8272,144 @@
 </p:sld>
 </file>
 
+<file path=ppt/slides/slide6.xml><?xml version="1.0" encoding="utf-8"?>
+<p:sld xmlns:a="http://schemas.openxmlformats.org/drawingml/2006/main" xmlns:r="http://schemas.openxmlformats.org/officeDocument/2006/relationships" xmlns:p="http://schemas.openxmlformats.org/presentationml/2006/main">
+  <p:cSld>
+    <p:spTree>
+      <p:nvGrpSpPr>
+        <p:cNvPr id="1" name=""/>
+        <p:cNvGrpSpPr/>
+        <p:nvPr/>
+      </p:nvGrpSpPr>
+      <p:grpSpPr>
+        <a:xfrm>
+          <a:off x="0" y="0"/>
+          <a:ext cx="0" cy="0"/>
+          <a:chOff x="0" y="0"/>
+          <a:chExt cx="0" cy="0"/>
+        </a:xfrm>
+      </p:grpSpPr>
+      <p:sp>
+        <p:nvSpPr>
+          <p:cNvPr id="2" name="Title 1"/>
+          <p:cNvSpPr>
+            <a:spLocks noGrp="1"/>
+          </p:cNvSpPr>
+          <p:nvPr>
+            <p:ph type="title"/>
+          </p:nvPr>
+        </p:nvSpPr>
+        <p:spPr/>
+        <p:txBody>
+          <a:bodyPr>
+            <a:normAutofit/>
+          </a:bodyPr>
+          <a:lstStyle/>
+          <a:p>
+            <a:r>
+              <a:rPr lang="en-US" sz="6000" b="1" dirty="0" smtClean="0"/>
+              <a:t>How </a:t>
+            </a:r>
+            <a:r>
+              <a:rPr lang="en-US" sz="6000" b="1" dirty="0" smtClean="0"/>
+              <a:t>it works (student)</a:t>
+            </a:r>
+            <a:endParaRPr lang="en-US" sz="6000" b="1" dirty="0"/>
+          </a:p>
+        </p:txBody>
+      </p:sp>
+      <p:sp>
+        <p:nvSpPr>
+          <p:cNvPr id="3" name="Content Placeholder 2"/>
+          <p:cNvSpPr>
+            <a:spLocks noGrp="1"/>
+          </p:cNvSpPr>
+          <p:nvPr>
+            <p:ph idx="1"/>
+          </p:nvPr>
+        </p:nvSpPr>
+        <p:spPr>
+          <a:xfrm>
+            <a:off x="484774" y="2685674"/>
+            <a:ext cx="6918157" cy="3649133"/>
+          </a:xfrm>
+        </p:spPr>
+        <p:txBody>
+          <a:bodyPr>
+            <a:noAutofit/>
+          </a:bodyPr>
+          <a:lstStyle/>
+          <a:p>
+            <a:pPr marL="514350" indent="-514350">
+              <a:buFont typeface="+mj-lt"/>
+              <a:buAutoNum type="arabicPeriod"/>
+            </a:pPr>
+            <a:r>
+              <a:rPr lang="en-US" sz="5000" dirty="0" smtClean="0"/>
+              <a:t>Submit key alone</a:t>
+            </a:r>
+            <a:endParaRPr lang="en-US" sz="5000" dirty="0"/>
+          </a:p>
+          <a:p>
+            <a:pPr marL="514350" indent="-514350">
+              <a:buFont typeface="+mj-lt"/>
+              <a:buAutoNum type="arabicPeriod"/>
+            </a:pPr>
+            <a:r>
+              <a:rPr lang="en-US" sz="5000" dirty="0"/>
+              <a:t>Send / print PDF file of transcript with </a:t>
+            </a:r>
+            <a:r>
+              <a:rPr lang="en-US" sz="5000" dirty="0" smtClean="0"/>
+              <a:t>key</a:t>
+            </a:r>
+            <a:endParaRPr lang="en-US" sz="5000" dirty="0"/>
+          </a:p>
+          <a:p>
+            <a:endParaRPr lang="en-US" sz="5000" dirty="0"/>
+          </a:p>
+          <a:p>
+            <a:endParaRPr lang="en-US" sz="5000" dirty="0" smtClean="0"/>
+          </a:p>
+        </p:txBody>
+      </p:sp>
+      <p:pic>
+        <p:nvPicPr>
+          <p:cNvPr id="12" name="Picture 11"/>
+          <p:cNvPicPr>
+            <a:picLocks noChangeAspect="1"/>
+          </p:cNvPicPr>
+          <p:nvPr/>
+        </p:nvPicPr>
+        <p:blipFill>
+          <a:blip r:embed="rId3"/>
+          <a:stretch>
+            <a:fillRect/>
+          </a:stretch>
+        </p:blipFill>
+        <p:spPr>
+          <a:xfrm>
+            <a:off x="7402931" y="1926119"/>
+            <a:ext cx="3714750" cy="3838575"/>
+          </a:xfrm>
+          <a:prstGeom prst="rect">
+            <a:avLst/>
+          </a:prstGeom>
+        </p:spPr>
+      </p:pic>
+    </p:spTree>
+    <p:extLst>
+      <p:ext uri="{BB962C8B-B14F-4D97-AF65-F5344CB8AC3E}">
+        <p14:creationId xmlns:p14="http://schemas.microsoft.com/office/powerpoint/2010/main" val="3869584831"/>
+      </p:ext>
+    </p:extLst>
+  </p:cSld>
+  <p:clrMapOvr>
+    <a:masterClrMapping/>
+  </p:clrMapOvr>
+</p:sld>
+</file>
+
 <file path=ppt/slides/slide7.xml><?xml version="1.0" encoding="utf-8"?>
 <p:sld xmlns:a="http://schemas.openxmlformats.org/drawingml/2006/main" xmlns:r="http://schemas.openxmlformats.org/officeDocument/2006/relationships" xmlns:p="http://schemas.openxmlformats.org/presentationml/2006/main">
   <p:cSld>
@@ -8567,7 +8446,7 @@
           <a:p>
             <a:r>
               <a:rPr lang="en-US" sz="6000" b="1" dirty="0" smtClean="0"/>
-              <a:t>Implementation</a:t>
+              <a:t>How it works (recipient)</a:t>
             </a:r>
             <a:endParaRPr lang="en-US" sz="6000" b="1" dirty="0"/>
           </a:p>
@@ -8585,8 +8464,8 @@
         </p:nvSpPr>
         <p:spPr>
           <a:xfrm>
-            <a:off x="685801" y="1975812"/>
-            <a:ext cx="8441773" cy="3649133"/>
+            <a:off x="878307" y="1442857"/>
+            <a:ext cx="6388767" cy="4749396"/>
           </a:xfrm>
         </p:spPr>
         <p:txBody>
@@ -8604,72 +8483,55 @@
             </a:r>
             <a:r>
               <a:rPr lang="en-US" sz="5000" dirty="0" smtClean="0"/>
-              <a:t>erification key</a:t>
-            </a:r>
-            <a:br>
+              <a:t>erification </a:t>
+            </a:r>
+            <a:r>
               <a:rPr lang="en-US" sz="5000" dirty="0" smtClean="0"/>
-            </a:br>
+              <a:t>key</a:t>
+            </a:r>
+          </a:p>
+          <a:p>
+            <a:pPr marL="0" indent="0">
+              <a:buNone/>
+            </a:pPr>
+            <a:r>
+              <a:rPr lang="en-US" sz="5000" dirty="0"/>
+              <a:t>1</a:t>
+            </a:r>
             <a:r>
               <a:rPr lang="en-US" sz="5000" dirty="0" smtClean="0"/>
-              <a:t>(a) pulls relevant transcript info</a:t>
-            </a:r>
-            <a:br>
+              <a:t>.</a:t>
+            </a:r>
+            <a:r>
               <a:rPr lang="en-US" sz="5000" dirty="0" smtClean="0"/>
-            </a:br>
-            <a:r>
-              <a:rPr lang="en-US" sz="5000" dirty="0" smtClean="0"/>
-              <a:t>(b) calculates hash and verifies it against </a:t>
-            </a:r>
-            <a:r>
-              <a:rPr lang="en-US" sz="5000" dirty="0" err="1" smtClean="0"/>
-              <a:t>blockchain</a:t>
-            </a:r>
-            <a:r>
-              <a:rPr lang="en-US" sz="5000" dirty="0" smtClean="0"/>
-              <a:t> hash commitment</a:t>
-            </a:r>
+              <a:t> Pulls relevant transcript info</a:t>
+            </a:r>
+            <a:endParaRPr lang="en-US" sz="5000" dirty="0" smtClean="0"/>
           </a:p>
         </p:txBody>
       </p:sp>
       <p:pic>
         <p:nvPicPr>
-          <p:cNvPr id="2050" name="Picture 2" descr="Lovely Report Card Clipart P A C Year End Lord Tweedsmuir PAC Blog"/>
+          <p:cNvPr id="8" name="Picture 7"/>
           <p:cNvPicPr>
-            <a:picLocks noChangeAspect="1" noChangeArrowheads="1"/>
+            <a:picLocks noChangeAspect="1"/>
           </p:cNvPicPr>
           <p:nvPr/>
         </p:nvPicPr>
         <p:blipFill>
-          <a:blip r:embed="rId3">
-            <a:extLst>
-              <a:ext uri="{28A0092B-C50C-407E-A947-70E740481C1C}">
-                <a14:useLocalDpi xmlns:a14="http://schemas.microsoft.com/office/drawing/2010/main" val="0"/>
-              </a:ext>
-            </a:extLst>
-          </a:blip>
-          <a:srcRect/>
+          <a:blip r:embed="rId3"/>
           <a:stretch>
             <a:fillRect/>
           </a:stretch>
         </p:blipFill>
-        <p:spPr bwMode="auto">
+        <p:spPr>
           <a:xfrm>
-            <a:off x="9127574" y="2405494"/>
-            <a:ext cx="2286000" cy="3219451"/>
+            <a:off x="6319506" y="2446490"/>
+            <a:ext cx="4956917" cy="3120121"/>
           </a:xfrm>
           <a:prstGeom prst="rect">
             <a:avLst/>
           </a:prstGeom>
-          <a:noFill/>
-          <a:extLst>
-            <a:ext uri="{909E8E84-426E-40DD-AFC4-6F175D3DCCD1}">
-              <a14:hiddenFill xmlns:a14="http://schemas.microsoft.com/office/drawing/2010/main">
-                <a:solidFill>
-                  <a:srgbClr val="FFFFFF"/>
-                </a:solidFill>
-              </a14:hiddenFill>
-            </a:ext>
-          </a:extLst>
         </p:spPr>
       </p:pic>
     </p:spTree>
@@ -8721,7 +8583,7 @@
           <a:p>
             <a:r>
               <a:rPr lang="en-US" sz="6000" b="1" dirty="0" smtClean="0"/>
-              <a:t>How to use it</a:t>
+              <a:t>How it works (recipient)</a:t>
             </a:r>
             <a:endParaRPr lang="en-US" sz="6000" b="1" dirty="0"/>
           </a:p>
@@ -8739,8 +8601,8 @@
         </p:nvSpPr>
         <p:spPr>
           <a:xfrm>
-            <a:off x="484774" y="2685674"/>
-            <a:ext cx="6918157" cy="3649133"/>
+            <a:off x="878307" y="2142513"/>
+            <a:ext cx="5428998" cy="3649133"/>
           </a:xfrm>
         </p:spPr>
         <p:txBody>
@@ -8749,42 +8611,45 @@
           </a:bodyPr>
           <a:lstStyle/>
           <a:p>
-            <a:pPr marL="514350" indent="-514350">
-              <a:buFont typeface="+mj-lt"/>
-              <a:buAutoNum type="arabicPeriod"/>
+            <a:pPr marL="0" indent="0">
+              <a:buNone/>
             </a:pPr>
             <a:r>
+              <a:rPr lang="en-US" sz="5000" dirty="0"/>
+              <a:t>V</a:t>
+            </a:r>
+            <a:r>
               <a:rPr lang="en-US" sz="5000" dirty="0" smtClean="0"/>
-              <a:t>Submit key alone</a:t>
-            </a:r>
-            <a:endParaRPr lang="en-US" sz="5000" dirty="0"/>
-          </a:p>
-          <a:p>
-            <a:pPr marL="514350" indent="-514350">
-              <a:buFont typeface="+mj-lt"/>
-              <a:buAutoNum type="arabicPeriod"/>
-            </a:pPr>
-            <a:r>
-              <a:rPr lang="en-US" sz="5000" dirty="0"/>
-              <a:t>Send / print PDF file of transcript with </a:t>
+              <a:t>erification </a:t>
             </a:r>
             <a:r>
               <a:rPr lang="en-US" sz="5000" dirty="0" smtClean="0"/>
               <a:t>key</a:t>
             </a:r>
-            <a:endParaRPr lang="en-US" sz="5000" dirty="0"/>
-          </a:p>
-          <a:p>
-            <a:endParaRPr lang="en-US" sz="5000" dirty="0"/>
-          </a:p>
-          <a:p>
+          </a:p>
+          <a:p>
+            <a:pPr marL="0" indent="0">
+              <a:buNone/>
+            </a:pPr>
+            <a:r>
+              <a:rPr lang="en-US" sz="5000" dirty="0" smtClean="0"/>
+              <a:t>2.</a:t>
+            </a:r>
+            <a:r>
+              <a:rPr lang="en-US" sz="5000" dirty="0" smtClean="0"/>
+              <a:t> </a:t>
+            </a:r>
+            <a:r>
+              <a:rPr lang="en-US" sz="5000" dirty="0" smtClean="0"/>
+              <a:t>Recalculates hashed student info to verify info is correct</a:t>
+            </a:r>
             <a:endParaRPr lang="en-US" sz="5000" dirty="0" smtClean="0"/>
           </a:p>
         </p:txBody>
       </p:sp>
       <p:pic>
         <p:nvPicPr>
-          <p:cNvPr id="12" name="Picture 11"/>
+          <p:cNvPr id="5" name="Picture 4"/>
           <p:cNvPicPr>
             <a:picLocks noChangeAspect="1"/>
           </p:cNvPicPr>
@@ -8798,8 +8663,8 @@
         </p:blipFill>
         <p:spPr>
           <a:xfrm>
-            <a:off x="7402931" y="1926119"/>
-            <a:ext cx="3714750" cy="3838575"/>
+            <a:off x="6467725" y="2269923"/>
+            <a:ext cx="4964357" cy="3276099"/>
           </a:xfrm>
           <a:prstGeom prst="rect">
             <a:avLst/>
@@ -8809,7 +8674,7 @@
     </p:spTree>
     <p:extLst>
       <p:ext uri="{BB962C8B-B14F-4D97-AF65-F5344CB8AC3E}">
-        <p14:creationId xmlns:p14="http://schemas.microsoft.com/office/powerpoint/2010/main" val="3869584831"/>
+        <p14:creationId xmlns:p14="http://schemas.microsoft.com/office/powerpoint/2010/main" val="1422927036"/>
       </p:ext>
     </p:extLst>
   </p:cSld>

</xml_diff>

<commit_message>
Presentation ppt from Christy v 3.3
</commit_message>
<xml_diff>
--- a/MachoHacks2018.pptx
+++ b/MachoHacks2018.pptx
@@ -589,29 +589,8 @@
                 <a:ea typeface="+mn-ea"/>
                 <a:cs typeface="+mn-cs"/>
               </a:rPr>
-              <a:t>&lt;Team member introduction</a:t>
-            </a:r>
-            <a:r>
-              <a:rPr lang="en-US" sz="1200" kern="1200" baseline="0" dirty="0" smtClean="0">
-                <a:solidFill>
-                  <a:schemeClr val="tx1"/>
-                </a:solidFill>
-                <a:effectLst/>
-                <a:latin typeface="+mn-lt"/>
-                <a:ea typeface="+mn-ea"/>
-                <a:cs typeface="+mn-cs"/>
-              </a:rPr>
-              <a:t>&gt;</a:t>
-            </a:r>
-            <a:endParaRPr lang="en-US" sz="1200" kern="1200" baseline="0" dirty="0" smtClean="0">
-              <a:solidFill>
-                <a:schemeClr val="tx1"/>
-              </a:solidFill>
-              <a:effectLst/>
-              <a:latin typeface="+mn-lt"/>
-              <a:ea typeface="+mn-ea"/>
-              <a:cs typeface="+mn-cs"/>
-            </a:endParaRPr>
+              <a:t>&lt;Team member introduction&gt;</a:t>
+            </a:r>
           </a:p>
         </p:txBody>
       </p:sp>
@@ -961,11 +940,7 @@
           <a:p>
             <a:r>
               <a:rPr lang="en-US" baseline="0" dirty="0" smtClean="0"/>
-              <a:t>Right </a:t>
-            </a:r>
-            <a:r>
-              <a:rPr lang="en-US" baseline="0" dirty="0" smtClean="0"/>
-              <a:t>now, it can be painful </a:t>
+              <a:t>Right now, it can be painful </a:t>
             </a:r>
             <a:r>
               <a:rPr lang="en-US" dirty="0" smtClean="0"/>
@@ -1208,39 +1183,74 @@
           <a:bodyPr/>
           <a:lstStyle/>
           <a:p>
+            <a:pPr rtl="0"/>
+            <a:r>
+              <a:rPr lang="en-US" sz="1200" b="0" i="0" u="none" strike="noStrike" kern="1200" dirty="0" smtClean="0">
+                <a:solidFill>
+                  <a:schemeClr val="tx1"/>
+                </a:solidFill>
+                <a:effectLst/>
+                <a:latin typeface="+mn-lt"/>
+                <a:ea typeface="+mn-ea"/>
+                <a:cs typeface="+mn-cs"/>
+              </a:rPr>
+              <a:t>We decided to piggyback on an existing cryptocurrency – namely, either Bitcoin or </a:t>
+            </a:r>
+            <a:r>
+              <a:rPr lang="en-US" sz="1200" b="0" i="0" u="none" strike="noStrike" kern="1200" dirty="0" err="1" smtClean="0">
+                <a:solidFill>
+                  <a:schemeClr val="tx1"/>
+                </a:solidFill>
+                <a:effectLst/>
+                <a:latin typeface="+mn-lt"/>
+                <a:ea typeface="+mn-ea"/>
+                <a:cs typeface="+mn-cs"/>
+              </a:rPr>
+              <a:t>Namecoin</a:t>
+            </a:r>
+            <a:r>
+              <a:rPr lang="en-US" sz="1200" b="0" i="0" u="none" strike="noStrike" kern="1200" dirty="0" smtClean="0">
+                <a:solidFill>
+                  <a:schemeClr val="tx1"/>
+                </a:solidFill>
+                <a:effectLst/>
+                <a:latin typeface="+mn-lt"/>
+                <a:ea typeface="+mn-ea"/>
+                <a:cs typeface="+mn-cs"/>
+              </a:rPr>
+              <a:t>. They’re well established and trusted, and not as susceptible to attacks because of the size of their P2P network.</a:t>
+            </a:r>
+            <a:endParaRPr lang="en-US" b="0" dirty="0" smtClean="0">
+              <a:effectLst/>
+            </a:endParaRPr>
+          </a:p>
+          <a:p>
+            <a:pPr rtl="0"/>
+            <a:r>
+              <a:rPr lang="en-US" sz="1200" b="0" i="0" u="none" strike="noStrike" kern="1200" dirty="0" smtClean="0">
+                <a:solidFill>
+                  <a:schemeClr val="tx1"/>
+                </a:solidFill>
+                <a:effectLst/>
+                <a:latin typeface="+mn-lt"/>
+                <a:ea typeface="+mn-ea"/>
+                <a:cs typeface="+mn-cs"/>
+              </a:rPr>
+              <a:t>The way it works is, a school would verify by signing off on a transaction that holds hashed student info as arbitrary data.</a:t>
+            </a:r>
+            <a:endParaRPr lang="en-US" b="0" dirty="0" smtClean="0">
+              <a:effectLst/>
+            </a:endParaRPr>
+          </a:p>
+          <a:p>
             <a:r>
               <a:rPr lang="en-US" dirty="0" smtClean="0"/>
-              <a:t>We decided to piggyback on an</a:t>
-            </a:r>
-            <a:r>
-              <a:rPr lang="en-US" baseline="0" dirty="0" smtClean="0"/>
-              <a:t> existing cryptocurrency – namely, either Bitcoin or </a:t>
-            </a:r>
-            <a:r>
-              <a:rPr lang="en-US" baseline="0" dirty="0" err="1" smtClean="0"/>
-              <a:t>Namecoin</a:t>
-            </a:r>
-            <a:r>
-              <a:rPr lang="en-US" baseline="0" dirty="0" smtClean="0"/>
-              <a:t>. They’re well established and trusted, and not as susceptible to attacks because of the size of their P2P network.</a:t>
-            </a:r>
-          </a:p>
-          <a:p>
+              <a:t/>
+            </a:r>
+            <a:br>
+              <a:rPr lang="en-US" dirty="0" smtClean="0"/>
+            </a:br>
             <a:endParaRPr lang="en-US" baseline="0" dirty="0" smtClean="0"/>
-          </a:p>
-          <a:p>
-            <a:r>
-              <a:rPr lang="en-US" baseline="0" dirty="0" smtClean="0"/>
-              <a:t>We store hashes on the </a:t>
-            </a:r>
-            <a:r>
-              <a:rPr lang="en-US" baseline="0" dirty="0" err="1" smtClean="0"/>
-              <a:t>blockchain</a:t>
-            </a:r>
-            <a:r>
-              <a:rPr lang="en-US" baseline="0" dirty="0" smtClean="0"/>
-              <a:t> after the school signs the transaction.</a:t>
-            </a:r>
           </a:p>
         </p:txBody>
       </p:sp>
@@ -1324,133 +1334,122 @@
           <a:bodyPr/>
           <a:lstStyle/>
           <a:p>
-            <a:r>
-              <a:rPr lang="en-US" sz="1200" dirty="0" err="1" smtClean="0"/>
-              <a:t>Blockchain</a:t>
-            </a:r>
-            <a:r>
-              <a:rPr lang="en-US" sz="1200" dirty="0" smtClean="0"/>
-              <a:t> only secures hash of student info</a:t>
-            </a:r>
-          </a:p>
-          <a:p>
-            <a:r>
-              <a:rPr lang="en-US" sz="1200" dirty="0" err="1" smtClean="0"/>
-              <a:t>Centralised</a:t>
-            </a:r>
-            <a:r>
-              <a:rPr lang="en-US" sz="1200" dirty="0" smtClean="0"/>
-              <a:t> database to protect private info</a:t>
-            </a:r>
-          </a:p>
-          <a:p>
-            <a:r>
-              <a:rPr lang="en-US" sz="1200" dirty="0" smtClean="0"/>
-              <a:t>Still reliant on database security</a:t>
-            </a:r>
-          </a:p>
-          <a:p>
+            <a:pPr rtl="0"/>
+            <a:r>
+              <a:rPr lang="en-US" sz="1200" b="0" i="0" u="none" strike="noStrike" kern="1200" dirty="0" smtClean="0">
+                <a:solidFill>
+                  <a:schemeClr val="tx1"/>
+                </a:solidFill>
+                <a:effectLst/>
+                <a:latin typeface="+mn-lt"/>
+                <a:ea typeface="+mn-ea"/>
+                <a:cs typeface="+mn-cs"/>
+              </a:rPr>
+              <a:t>We want to </a:t>
+            </a:r>
+            <a:r>
+              <a:rPr lang="en-US" sz="1200" b="0" i="0" u="none" strike="noStrike" kern="1200" dirty="0" err="1" smtClean="0">
+                <a:solidFill>
+                  <a:schemeClr val="tx1"/>
+                </a:solidFill>
+                <a:effectLst/>
+                <a:latin typeface="+mn-lt"/>
+                <a:ea typeface="+mn-ea"/>
+                <a:cs typeface="+mn-cs"/>
+              </a:rPr>
+              <a:t>emphasise</a:t>
+            </a:r>
+            <a:r>
+              <a:rPr lang="en-US" sz="1200" b="0" i="0" u="none" strike="noStrike" kern="1200" dirty="0" smtClean="0">
+                <a:solidFill>
+                  <a:schemeClr val="tx1"/>
+                </a:solidFill>
+                <a:effectLst/>
+                <a:latin typeface="+mn-lt"/>
+                <a:ea typeface="+mn-ea"/>
+                <a:cs typeface="+mn-cs"/>
+              </a:rPr>
+              <a:t> that </a:t>
+            </a:r>
+            <a:r>
+              <a:rPr lang="en-US" sz="1200" b="0" i="0" u="none" strike="noStrike" kern="1200" dirty="0" err="1" smtClean="0">
+                <a:solidFill>
+                  <a:schemeClr val="tx1"/>
+                </a:solidFill>
+                <a:effectLst/>
+                <a:latin typeface="+mn-lt"/>
+                <a:ea typeface="+mn-ea"/>
+                <a:cs typeface="+mn-cs"/>
+              </a:rPr>
+              <a:t>blockchain</a:t>
+            </a:r>
+            <a:r>
+              <a:rPr lang="en-US" sz="1200" b="0" i="0" u="none" strike="noStrike" kern="1200" dirty="0" smtClean="0">
+                <a:solidFill>
+                  <a:schemeClr val="tx1"/>
+                </a:solidFill>
+                <a:effectLst/>
+                <a:latin typeface="+mn-lt"/>
+                <a:ea typeface="+mn-ea"/>
+                <a:cs typeface="+mn-cs"/>
+              </a:rPr>
+              <a:t> is only used to verify approval/accuracy from the school, and not the transcript itself.  All student info is stored on a school database. </a:t>
+            </a:r>
+            <a:endParaRPr lang="en-US" b="0" dirty="0" smtClean="0">
+              <a:effectLst/>
+            </a:endParaRPr>
+          </a:p>
+          <a:p>
+            <a:pPr rtl="0"/>
+            <a:r>
+              <a:rPr lang="en-US" sz="1200" b="0" i="0" u="none" strike="noStrike" kern="1200" dirty="0" smtClean="0">
+                <a:solidFill>
+                  <a:schemeClr val="tx1"/>
+                </a:solidFill>
+                <a:effectLst/>
+                <a:latin typeface="+mn-lt"/>
+                <a:ea typeface="+mn-ea"/>
+                <a:cs typeface="+mn-cs"/>
+              </a:rPr>
+              <a:t>On a lower level, we take student info as inputs to generate a hash and store it as arbitrary data in provably </a:t>
+            </a:r>
+            <a:r>
+              <a:rPr lang="en-US" sz="1200" b="0" i="0" u="none" strike="noStrike" kern="1200" dirty="0" err="1" smtClean="0">
+                <a:solidFill>
+                  <a:schemeClr val="tx1"/>
+                </a:solidFill>
+                <a:effectLst/>
+                <a:latin typeface="+mn-lt"/>
+                <a:ea typeface="+mn-ea"/>
+                <a:cs typeface="+mn-cs"/>
+              </a:rPr>
+              <a:t>unspendable</a:t>
+            </a:r>
+            <a:r>
+              <a:rPr lang="en-US" sz="1200" b="0" i="0" u="none" strike="noStrike" kern="1200" dirty="0" smtClean="0">
+                <a:solidFill>
+                  <a:schemeClr val="tx1"/>
+                </a:solidFill>
+                <a:effectLst/>
+                <a:latin typeface="+mn-lt"/>
+                <a:ea typeface="+mn-ea"/>
+                <a:cs typeface="+mn-cs"/>
+              </a:rPr>
+              <a:t> commitments.</a:t>
+            </a:r>
+            <a:endParaRPr lang="en-US" b="0" dirty="0" smtClean="0">
+              <a:effectLst/>
+            </a:endParaRPr>
+          </a:p>
+          <a:p>
+            <a:r>
+              <a:rPr lang="en-US" dirty="0" smtClean="0"/>
+              <a:t/>
+            </a:r>
+            <a:br>
+              <a:rPr lang="en-US" dirty="0" smtClean="0"/>
+            </a:br>
             <a:endParaRPr lang="en-US" baseline="0" dirty="0" smtClean="0"/>
-          </a:p>
-          <a:p>
-            <a:r>
-              <a:rPr lang="en-US" baseline="0" dirty="0" smtClean="0"/>
-              <a:t>We felt that student information was too sensitive to store publicly, so our solution still uses a </a:t>
-            </a:r>
-            <a:r>
-              <a:rPr lang="en-US" baseline="0" dirty="0" err="1" smtClean="0"/>
-              <a:t>centralised</a:t>
-            </a:r>
-            <a:r>
-              <a:rPr lang="en-US" baseline="0" dirty="0" smtClean="0"/>
-              <a:t> database.</a:t>
-            </a:r>
-          </a:p>
-          <a:p>
-            <a:endParaRPr lang="en-US" baseline="0" dirty="0" smtClean="0"/>
-          </a:p>
-          <a:p>
-            <a:r>
-              <a:rPr lang="en-US" baseline="0" dirty="0" smtClean="0"/>
-              <a:t>It’s important to note that our </a:t>
-            </a:r>
-            <a:r>
-              <a:rPr lang="en-US" b="1" baseline="0" dirty="0" smtClean="0"/>
-              <a:t>primary goal </a:t>
-            </a:r>
-            <a:r>
-              <a:rPr lang="en-US" baseline="0" dirty="0" smtClean="0"/>
-              <a:t>is improving efficiency and </a:t>
-            </a:r>
-            <a:r>
-              <a:rPr lang="en-US" baseline="0" dirty="0" err="1" smtClean="0"/>
-              <a:t>digitising</a:t>
-            </a:r>
-            <a:r>
-              <a:rPr lang="en-US" baseline="0" dirty="0" smtClean="0"/>
-              <a:t> verification. Using </a:t>
-            </a:r>
-            <a:r>
-              <a:rPr lang="en-US" baseline="0" dirty="0" err="1" smtClean="0"/>
-              <a:t>blockchain</a:t>
-            </a:r>
-            <a:r>
-              <a:rPr lang="en-US" baseline="0" dirty="0" smtClean="0"/>
-              <a:t> for security is secondary.  Our implementation relies on the security of the database itself.</a:t>
-            </a:r>
-          </a:p>
-          <a:p>
-            <a:endParaRPr lang="en-US" baseline="0" dirty="0" smtClean="0"/>
-          </a:p>
-          <a:p>
-            <a:endParaRPr lang="en-US" baseline="0" dirty="0" smtClean="0"/>
-          </a:p>
-          <a:p>
-            <a:r>
-              <a:rPr lang="en-US" baseline="0" dirty="0" smtClean="0"/>
-              <a:t>Let’s </a:t>
-            </a:r>
-            <a:r>
-              <a:rPr lang="en-US" baseline="0" dirty="0" smtClean="0"/>
-              <a:t>take a closer look at the nuts and bolts.  </a:t>
-            </a:r>
-          </a:p>
-          <a:p>
-            <a:endParaRPr lang="en-US" baseline="0" dirty="0" smtClean="0"/>
-          </a:p>
-          <a:p>
-            <a:r>
-              <a:rPr lang="en-US" baseline="0" dirty="0" smtClean="0"/>
-              <a:t>We take information from the student database as inputs to generate a hash that is verified by the school.  The school burns a small amount of money from their public address in </a:t>
-            </a:r>
-            <a:r>
-              <a:rPr lang="en-US" b="1" baseline="0" dirty="0" smtClean="0"/>
-              <a:t>provably </a:t>
-            </a:r>
-            <a:r>
-              <a:rPr lang="en-US" b="1" baseline="0" dirty="0" err="1" smtClean="0"/>
-              <a:t>unspendable</a:t>
-            </a:r>
-            <a:r>
-              <a:rPr lang="en-US" b="1" baseline="0" dirty="0" smtClean="0"/>
-              <a:t> commitments </a:t>
-            </a:r>
-            <a:r>
-              <a:rPr lang="en-US" b="0" baseline="0" dirty="0" smtClean="0"/>
-              <a:t>to store hashes</a:t>
-            </a:r>
-            <a:r>
-              <a:rPr lang="en-US" baseline="0" dirty="0" smtClean="0"/>
-              <a:t> in the OP_RETURN field on a </a:t>
-            </a:r>
-            <a:r>
-              <a:rPr lang="en-US" baseline="0" dirty="0" err="1" smtClean="0"/>
-              <a:t>blockchain</a:t>
-            </a:r>
-            <a:r>
-              <a:rPr lang="en-US" baseline="0" dirty="0" smtClean="0"/>
-              <a:t>.</a:t>
-            </a:r>
           </a:p>
         </p:txBody>
       </p:sp>
@@ -1534,6 +1533,18 @@
           <a:bodyPr/>
           <a:lstStyle/>
           <a:p>
+            <a:r>
+              <a:rPr lang="en-US" sz="1200" b="0" i="0" u="none" strike="noStrike" kern="1200" dirty="0" smtClean="0">
+                <a:solidFill>
+                  <a:schemeClr val="tx1"/>
+                </a:solidFill>
+                <a:effectLst/>
+                <a:latin typeface="+mn-lt"/>
+                <a:ea typeface="+mn-ea"/>
+                <a:cs typeface="+mn-cs"/>
+              </a:rPr>
+              <a:t>From the student’s perspective, they would log in to their school account and request a transcript.  A verification key and transcript are generated. Depending on what the recipient (school/employer) wants, they could either submit the verification key alone, or send or print out the transcript that has the verification key on it as a “stamp” of approval.</a:t>
+            </a:r>
             <a:endParaRPr lang="en-US" baseline="0" dirty="0" smtClean="0"/>
           </a:p>
         </p:txBody>
@@ -7594,8 +7605,8 @@
               <a:t>Transcript </a:t>
             </a:r>
             <a:r>
-              <a:rPr lang="en-US" sz="7000" b="1" dirty="0" err="1" smtClean="0"/>
-              <a:t>verifciation</a:t>
+              <a:rPr lang="en-US" sz="7000" b="1" dirty="0" smtClean="0"/>
+              <a:t>verification</a:t>
             </a:r>
             <a:endParaRPr lang="en-US" sz="7000" b="1" dirty="0"/>
           </a:p>
@@ -7614,23 +7625,27 @@
         <p:spPr>
           <a:xfrm>
             <a:off x="2650834" y="4385731"/>
-            <a:ext cx="9023929" cy="1405467"/>
+            <a:ext cx="9023929" cy="1742353"/>
           </a:xfrm>
         </p:spPr>
         <p:txBody>
           <a:bodyPr>
-            <a:normAutofit lnSpcReduction="10000"/>
+            <a:normAutofit fontScale="85000" lnSpcReduction="20000"/>
           </a:bodyPr>
           <a:lstStyle/>
           <a:p>
             <a:r>
-              <a:rPr lang="en-US" sz="4000" dirty="0" err="1" smtClean="0"/>
+              <a:rPr lang="en-US" sz="4900" b="1" dirty="0" smtClean="0"/>
+              <a:t>Using </a:t>
+            </a:r>
+            <a:r>
+              <a:rPr lang="en-US" sz="4900" b="1" dirty="0" err="1" smtClean="0"/>
               <a:t>Blockchain</a:t>
             </a:r>
-            <a:r>
-              <a:rPr lang="en-US" sz="4000" dirty="0" smtClean="0"/>
-              <a:t> ----</a:t>
-            </a:r>
+            <a:endParaRPr lang="en-US" sz="4900" b="1" dirty="0" smtClean="0"/>
+          </a:p>
+          <a:p>
+            <a:endParaRPr lang="en-US" sz="4000" dirty="0" smtClean="0"/>
           </a:p>
           <a:p>
             <a:r>
@@ -7654,6 +7669,25 @@
   <p:clrMapOvr>
     <a:masterClrMapping/>
   </p:clrMapOvr>
+  <mc:AlternateContent xmlns:mc="http://schemas.openxmlformats.org/markup-compatibility/2006">
+    <mc:Choice xmlns:p14="http://schemas.microsoft.com/office/powerpoint/2010/main" Requires="p14">
+      <p:transition spd="med" p14:dur="700">
+        <p:fade/>
+      </p:transition>
+    </mc:Choice>
+    <mc:Fallback>
+      <p:transition spd="med">
+        <p:fade/>
+      </p:transition>
+    </mc:Fallback>
+  </mc:AlternateContent>
+  <p:timing>
+    <p:tnLst>
+      <p:par>
+        <p:cTn id="1" dur="indefinite" restart="never" nodeType="tmRoot"/>
+      </p:par>
+    </p:tnLst>
+  </p:timing>
 </p:sld>
 </file>
 
@@ -7743,6 +7777,18 @@
   <p:clrMapOvr>
     <a:masterClrMapping/>
   </p:clrMapOvr>
+  <mc:AlternateContent xmlns:mc="http://schemas.openxmlformats.org/markup-compatibility/2006">
+    <mc:Choice xmlns:p14="http://schemas.microsoft.com/office/powerpoint/2010/main" Requires="p14">
+      <p:transition spd="med" p14:dur="700">
+        <p:fade/>
+      </p:transition>
+    </mc:Choice>
+    <mc:Fallback>
+      <p:transition spd="med">
+        <p:fade/>
+      </p:transition>
+    </mc:Fallback>
+  </mc:AlternateContent>
 </p:sld>
 </file>
 
@@ -7815,11 +7861,7 @@
             </a:pPr>
             <a:r>
               <a:rPr lang="en-US" sz="5000" dirty="0" smtClean="0"/>
-              <a:t>Verification is</a:t>
-            </a:r>
-            <a:r>
-              <a:rPr lang="en-US" sz="5000" dirty="0" smtClean="0"/>
-              <a:t>:</a:t>
+              <a:t>Verification is:</a:t>
             </a:r>
           </a:p>
           <a:p>
@@ -7831,11 +7873,7 @@
           <a:p>
             <a:r>
               <a:rPr lang="en-US" sz="5000" dirty="0" smtClean="0"/>
-              <a:t>Slow </a:t>
-            </a:r>
-            <a:r>
-              <a:rPr lang="en-US" sz="5000" dirty="0" smtClean="0"/>
-              <a:t>(1 – 2 weeks)</a:t>
+              <a:t>Slow (1 – 2 weeks)</a:t>
             </a:r>
           </a:p>
           <a:p>
@@ -7843,7 +7881,6 @@
               <a:rPr lang="en-US" sz="5000" dirty="0" smtClean="0"/>
               <a:t>Costly</a:t>
             </a:r>
-            <a:endParaRPr lang="en-US" sz="5000" dirty="0" smtClean="0"/>
           </a:p>
         </p:txBody>
       </p:sp>
@@ -7898,6 +7935,25 @@
   <p:clrMapOvr>
     <a:masterClrMapping/>
   </p:clrMapOvr>
+  <mc:AlternateContent xmlns:mc="http://schemas.openxmlformats.org/markup-compatibility/2006">
+    <mc:Choice xmlns:p14="http://schemas.microsoft.com/office/powerpoint/2010/main" Requires="p14">
+      <p:transition spd="med" p14:dur="700">
+        <p:fade/>
+      </p:transition>
+    </mc:Choice>
+    <mc:Fallback>
+      <p:transition spd="med">
+        <p:fade/>
+      </p:transition>
+    </mc:Fallback>
+  </mc:AlternateContent>
+  <p:timing>
+    <p:tnLst>
+      <p:par>
+        <p:cTn id="1" dur="indefinite" restart="never" nodeType="tmRoot"/>
+      </p:par>
+    </p:tnLst>
+  </p:timing>
 </p:sld>
 </file>
 
@@ -7973,7 +8029,6 @@
               <a:rPr lang="en-US" sz="5000" dirty="0" smtClean="0"/>
               <a:t> transcripts from schools</a:t>
             </a:r>
-            <a:endParaRPr lang="en-US" sz="5000" dirty="0" smtClean="0"/>
           </a:p>
           <a:p>
             <a:r>
@@ -8015,8 +8070,8 @@
         </p:blipFill>
         <p:spPr bwMode="auto">
           <a:xfrm>
-            <a:off x="6731148" y="2266507"/>
-            <a:ext cx="5062157" cy="2649197"/>
+            <a:off x="6946232" y="2266508"/>
+            <a:ext cx="4847073" cy="2536636"/>
           </a:xfrm>
           <a:prstGeom prst="rect">
             <a:avLst/>
@@ -8043,6 +8098,25 @@
   <p:clrMapOvr>
     <a:masterClrMapping/>
   </p:clrMapOvr>
+  <mc:AlternateContent xmlns:mc="http://schemas.openxmlformats.org/markup-compatibility/2006">
+    <mc:Choice xmlns:p14="http://schemas.microsoft.com/office/powerpoint/2010/main" Requires="p14">
+      <p:transition spd="med" p14:dur="700">
+        <p:fade/>
+      </p:transition>
+    </mc:Choice>
+    <mc:Fallback>
+      <p:transition spd="med">
+        <p:fade/>
+      </p:transition>
+    </mc:Fallback>
+  </mc:AlternateContent>
+  <p:timing>
+    <p:tnLst>
+      <p:par>
+        <p:cTn id="1" dur="indefinite" restart="never" nodeType="tmRoot"/>
+      </p:par>
+    </p:tnLst>
+  </p:timing>
 </p:sld>
 </file>
 
@@ -8118,15 +8192,7 @@
           <a:p>
             <a:r>
               <a:rPr lang="en-US" sz="5000" dirty="0" smtClean="0"/>
-              <a:t>Store </a:t>
-            </a:r>
-            <a:r>
-              <a:rPr lang="en-US" sz="5000" dirty="0" smtClean="0"/>
-              <a:t>hashed student info </a:t>
-            </a:r>
-            <a:r>
-              <a:rPr lang="en-US" sz="5000" dirty="0" smtClean="0"/>
-              <a:t>on </a:t>
+              <a:t>Store hashed student info on </a:t>
             </a:r>
             <a:r>
               <a:rPr lang="en-US" sz="5000" dirty="0" err="1" smtClean="0"/>
@@ -8134,13 +8200,8 @@
             </a:r>
             <a:r>
               <a:rPr lang="en-US" sz="5000" dirty="0" smtClean="0"/>
-              <a:t> in transaction signed by </a:t>
-            </a:r>
-            <a:r>
-              <a:rPr lang="en-US" sz="5000" dirty="0" smtClean="0"/>
-              <a:t>school</a:t>
-            </a:r>
-            <a:endParaRPr lang="en-US" sz="5000" dirty="0" smtClean="0"/>
+              <a:t> in transaction signed by school</a:t>
+            </a:r>
           </a:p>
         </p:txBody>
       </p:sp>
@@ -8154,6 +8215,25 @@
   <p:clrMapOvr>
     <a:masterClrMapping/>
   </p:clrMapOvr>
+  <mc:AlternateContent xmlns:mc="http://schemas.openxmlformats.org/markup-compatibility/2006">
+    <mc:Choice xmlns:p14="http://schemas.microsoft.com/office/powerpoint/2010/main" Requires="p14">
+      <p:transition spd="med" p14:dur="700">
+        <p:fade/>
+      </p:transition>
+    </mc:Choice>
+    <mc:Fallback>
+      <p:transition spd="med">
+        <p:fade/>
+      </p:transition>
+    </mc:Fallback>
+  </mc:AlternateContent>
+  <p:timing>
+    <p:tnLst>
+      <p:par>
+        <p:cTn id="1" dur="indefinite" restart="never" nodeType="tmRoot"/>
+      </p:par>
+    </p:tnLst>
+  </p:timing>
 </p:sld>
 </file>
 
@@ -8225,12 +8305,12 @@
               <a:buNone/>
             </a:pPr>
             <a:r>
-              <a:rPr lang="en-US" sz="5000" dirty="0" err="1" smtClean="0"/>
-              <a:t>Centralised</a:t>
-            </a:r>
-            <a:r>
               <a:rPr lang="en-US" sz="5000" dirty="0" smtClean="0"/>
-              <a:t> Database</a:t>
+              <a:t>School </a:t>
+            </a:r>
+            <a:r>
+              <a:rPr lang="en-US" sz="5000" dirty="0" smtClean="0"/>
+              <a:t>Database</a:t>
             </a:r>
           </a:p>
         </p:txBody>
@@ -8269,6 +8349,25 @@
   <p:clrMapOvr>
     <a:masterClrMapping/>
   </p:clrMapOvr>
+  <mc:AlternateContent xmlns:mc="http://schemas.openxmlformats.org/markup-compatibility/2006">
+    <mc:Choice xmlns:p14="http://schemas.microsoft.com/office/powerpoint/2010/main" Requires="p14">
+      <p:transition spd="med" p14:dur="700">
+        <p:fade/>
+      </p:transition>
+    </mc:Choice>
+    <mc:Fallback>
+      <p:transition spd="med">
+        <p:fade/>
+      </p:transition>
+    </mc:Fallback>
+  </mc:AlternateContent>
+  <p:timing>
+    <p:tnLst>
+      <p:par>
+        <p:cTn id="1" dur="indefinite" restart="never" nodeType="tmRoot"/>
+      </p:par>
+    </p:tnLst>
+  </p:timing>
 </p:sld>
 </file>
 
@@ -8308,11 +8407,7 @@
           <a:p>
             <a:r>
               <a:rPr lang="en-US" sz="6000" b="1" dirty="0" smtClean="0"/>
-              <a:t>How </a:t>
-            </a:r>
-            <a:r>
-              <a:rPr lang="en-US" sz="6000" b="1" dirty="0" smtClean="0"/>
-              <a:t>it works (student)</a:t>
+              <a:t>How it works (student)</a:t>
             </a:r>
             <a:endParaRPr lang="en-US" sz="6000" b="1" dirty="0"/>
           </a:p>
@@ -8330,7 +8425,7 @@
         </p:nvSpPr>
         <p:spPr>
           <a:xfrm>
-            <a:off x="484774" y="2685674"/>
+            <a:off x="484774" y="2926306"/>
             <a:ext cx="6918157" cy="3649133"/>
           </a:xfrm>
         </p:spPr>
@@ -8345,10 +8440,18 @@
               <a:buAutoNum type="arabicPeriod"/>
             </a:pPr>
             <a:r>
-              <a:rPr lang="en-US" sz="5000" dirty="0" smtClean="0"/>
-              <a:t>Submit key alone</a:t>
-            </a:r>
-            <a:endParaRPr lang="en-US" sz="5000" dirty="0"/>
+              <a:rPr lang="en-US" sz="4500" dirty="0" smtClean="0"/>
+              <a:t>Submit </a:t>
+            </a:r>
+            <a:r>
+              <a:rPr lang="en-US" sz="4500" dirty="0" smtClean="0"/>
+              <a:t>verification key </a:t>
+            </a:r>
+            <a:r>
+              <a:rPr lang="en-US" sz="4500" dirty="0" smtClean="0"/>
+              <a:t>alone</a:t>
+            </a:r>
+            <a:endParaRPr lang="en-US" sz="4500" dirty="0"/>
           </a:p>
           <a:p>
             <a:pPr marL="514350" indent="-514350">
@@ -8356,20 +8459,20 @@
               <a:buAutoNum type="arabicPeriod"/>
             </a:pPr>
             <a:r>
-              <a:rPr lang="en-US" sz="5000" dirty="0"/>
+              <a:rPr lang="en-US" sz="4500" dirty="0"/>
               <a:t>Send / print PDF file of transcript with </a:t>
             </a:r>
             <a:r>
-              <a:rPr lang="en-US" sz="5000" dirty="0" smtClean="0"/>
-              <a:t>key</a:t>
-            </a:r>
-            <a:endParaRPr lang="en-US" sz="5000" dirty="0"/>
-          </a:p>
-          <a:p>
-            <a:endParaRPr lang="en-US" sz="5000" dirty="0"/>
-          </a:p>
-          <a:p>
-            <a:endParaRPr lang="en-US" sz="5000" dirty="0" smtClean="0"/>
+              <a:rPr lang="en-US" sz="4500" dirty="0" smtClean="0"/>
+              <a:t>verification key</a:t>
+            </a:r>
+            <a:endParaRPr lang="en-US" sz="4500" dirty="0"/>
+          </a:p>
+          <a:p>
+            <a:endParaRPr lang="en-US" sz="4500" dirty="0"/>
+          </a:p>
+          <a:p>
+            <a:endParaRPr lang="en-US" sz="4500" dirty="0" smtClean="0"/>
           </a:p>
         </p:txBody>
       </p:sp>
@@ -8407,6 +8510,25 @@
   <p:clrMapOvr>
     <a:masterClrMapping/>
   </p:clrMapOvr>
+  <mc:AlternateContent xmlns:mc="http://schemas.openxmlformats.org/markup-compatibility/2006">
+    <mc:Choice xmlns:p14="http://schemas.microsoft.com/office/powerpoint/2010/main" Requires="p14">
+      <p:transition spd="med" p14:dur="700">
+        <p:fade/>
+      </p:transition>
+    </mc:Choice>
+    <mc:Fallback>
+      <p:transition spd="med">
+        <p:fade/>
+      </p:transition>
+    </mc:Fallback>
+  </mc:AlternateContent>
+  <p:timing>
+    <p:tnLst>
+      <p:par>
+        <p:cTn id="1" dur="indefinite" restart="never" nodeType="tmRoot"/>
+      </p:par>
+    </p:tnLst>
+  </p:timing>
 </p:sld>
 </file>
 
@@ -8483,11 +8605,7 @@
             </a:r>
             <a:r>
               <a:rPr lang="en-US" sz="5000" dirty="0" smtClean="0"/>
-              <a:t>erification </a:t>
-            </a:r>
-            <a:r>
-              <a:rPr lang="en-US" sz="5000" dirty="0" smtClean="0"/>
-              <a:t>key</a:t>
+              <a:t>erification key</a:t>
             </a:r>
           </a:p>
           <a:p>
@@ -8500,19 +8618,14 @@
             </a:r>
             <a:r>
               <a:rPr lang="en-US" sz="5000" dirty="0" smtClean="0"/>
-              <a:t>.</a:t>
-            </a:r>
-            <a:r>
-              <a:rPr lang="en-US" sz="5000" dirty="0" smtClean="0"/>
-              <a:t> Pulls relevant transcript info</a:t>
-            </a:r>
-            <a:endParaRPr lang="en-US" sz="5000" dirty="0" smtClean="0"/>
+              <a:t>. Pulls relevant transcript info</a:t>
+            </a:r>
           </a:p>
         </p:txBody>
       </p:sp>
       <p:pic>
         <p:nvPicPr>
-          <p:cNvPr id="8" name="Picture 7"/>
+          <p:cNvPr id="4" name="Picture 3"/>
           <p:cNvPicPr>
             <a:picLocks noChangeAspect="1"/>
           </p:cNvPicPr>
@@ -8526,8 +8639,8 @@
         </p:blipFill>
         <p:spPr>
           <a:xfrm>
-            <a:off x="6319506" y="2446490"/>
-            <a:ext cx="4956917" cy="3120121"/>
+            <a:off x="5571623" y="2591301"/>
+            <a:ext cx="5705977" cy="2526932"/>
           </a:xfrm>
           <a:prstGeom prst="rect">
             <a:avLst/>
@@ -8544,6 +8657,25 @@
   <p:clrMapOvr>
     <a:masterClrMapping/>
   </p:clrMapOvr>
+  <mc:AlternateContent xmlns:mc="http://schemas.openxmlformats.org/markup-compatibility/2006">
+    <mc:Choice xmlns:p14="http://schemas.microsoft.com/office/powerpoint/2010/main" Requires="p14">
+      <p:transition spd="med" p14:dur="700">
+        <p:fade/>
+      </p:transition>
+    </mc:Choice>
+    <mc:Fallback>
+      <p:transition spd="med">
+        <p:fade/>
+      </p:transition>
+    </mc:Fallback>
+  </mc:AlternateContent>
+  <p:timing>
+    <p:tnLst>
+      <p:par>
+        <p:cTn id="1" dur="indefinite" restart="never" nodeType="tmRoot"/>
+      </p:par>
+    </p:tnLst>
+  </p:timing>
 </p:sld>
 </file>
 
@@ -8620,55 +8752,59 @@
             </a:r>
             <a:r>
               <a:rPr lang="en-US" sz="5000" dirty="0" smtClean="0"/>
-              <a:t>erification </a:t>
-            </a:r>
+              <a:t>erification key</a:t>
+            </a:r>
+          </a:p>
+          <a:p>
+            <a:pPr marL="0" indent="0">
+              <a:buNone/>
+            </a:pPr>
             <a:r>
               <a:rPr lang="en-US" sz="5000" dirty="0" smtClean="0"/>
-              <a:t>key</a:t>
-            </a:r>
-          </a:p>
-          <a:p>
-            <a:pPr marL="0" indent="0">
-              <a:buNone/>
-            </a:pPr>
-            <a:r>
-              <a:rPr lang="en-US" sz="5000" dirty="0" smtClean="0"/>
-              <a:t>2.</a:t>
-            </a:r>
-            <a:r>
-              <a:rPr lang="en-US" sz="5000" dirty="0" smtClean="0"/>
-              <a:t> </a:t>
-            </a:r>
-            <a:r>
-              <a:rPr lang="en-US" sz="5000" dirty="0" smtClean="0"/>
-              <a:t>Recalculates hashed student info to verify info is correct</a:t>
-            </a:r>
-            <a:endParaRPr lang="en-US" sz="5000" dirty="0" smtClean="0"/>
+              <a:t>2. Recalculates hashed student info to verify info is correct</a:t>
+            </a:r>
           </a:p>
         </p:txBody>
       </p:sp>
       <p:pic>
         <p:nvPicPr>
-          <p:cNvPr id="5" name="Picture 4"/>
+          <p:cNvPr id="1026" name="Picture 2" descr="https://lh6.googleusercontent.com/eCsDvZRlDUFPM77UrzpudU04-P3Ej3_R0KIxUo73CxSNRg_9xPfHtmWoLT0GXJ9fBEvLYO7VfEPW5s0zVCCNRgzoFw8inuMfLKMCHIo1aSeL0w5vuyQhcMkJq0Hy8Qk-vT5NM2MT"/>
           <p:cNvPicPr>
-            <a:picLocks noChangeAspect="1"/>
+            <a:picLocks noChangeAspect="1" noChangeArrowheads="1"/>
           </p:cNvPicPr>
           <p:nvPr/>
         </p:nvPicPr>
         <p:blipFill>
-          <a:blip r:embed="rId3"/>
+          <a:blip r:embed="rId3">
+            <a:extLst>
+              <a:ext uri="{28A0092B-C50C-407E-A947-70E740481C1C}">
+                <a14:useLocalDpi xmlns:a14="http://schemas.microsoft.com/office/drawing/2010/main" val="0"/>
+              </a:ext>
+            </a:extLst>
+          </a:blip>
+          <a:srcRect/>
           <a:stretch>
             <a:fillRect/>
           </a:stretch>
         </p:blipFill>
-        <p:spPr>
+        <p:spPr bwMode="auto">
           <a:xfrm>
-            <a:off x="6467725" y="2269923"/>
-            <a:ext cx="4964357" cy="3276099"/>
+            <a:off x="6489450" y="2398450"/>
+            <a:ext cx="4804192" cy="3137257"/>
           </a:xfrm>
           <a:prstGeom prst="rect">
             <a:avLst/>
           </a:prstGeom>
+          <a:noFill/>
+          <a:extLst>
+            <a:ext uri="{909E8E84-426E-40DD-AFC4-6F175D3DCCD1}">
+              <a14:hiddenFill xmlns:a14="http://schemas.microsoft.com/office/drawing/2010/main">
+                <a:solidFill>
+                  <a:srgbClr val="FFFFFF"/>
+                </a:solidFill>
+              </a14:hiddenFill>
+            </a:ext>
+          </a:extLst>
         </p:spPr>
       </p:pic>
     </p:spTree>
@@ -8681,6 +8817,25 @@
   <p:clrMapOvr>
     <a:masterClrMapping/>
   </p:clrMapOvr>
+  <mc:AlternateContent xmlns:mc="http://schemas.openxmlformats.org/markup-compatibility/2006">
+    <mc:Choice xmlns:p14="http://schemas.microsoft.com/office/powerpoint/2010/main" Requires="p14">
+      <p:transition spd="med" p14:dur="700">
+        <p:fade/>
+      </p:transition>
+    </mc:Choice>
+    <mc:Fallback>
+      <p:transition spd="med">
+        <p:fade/>
+      </p:transition>
+    </mc:Fallback>
+  </mc:AlternateContent>
+  <p:timing>
+    <p:tnLst>
+      <p:par>
+        <p:cTn id="1" dur="indefinite" restart="never" nodeType="tmRoot"/>
+      </p:par>
+    </p:tnLst>
+  </p:timing>
 </p:sld>
 </file>
 
@@ -8765,7 +8920,11 @@
             </a:r>
             <a:r>
               <a:rPr lang="en-US" sz="5000" dirty="0" smtClean="0"/>
-              <a:t> by collecting commitments with </a:t>
+              <a:t> by </a:t>
+            </a:r>
+            <a:r>
+              <a:rPr lang="en-US" sz="5000" dirty="0" smtClean="0"/>
+              <a:t>using </a:t>
             </a:r>
             <a:r>
               <a:rPr lang="en-US" sz="5000" dirty="0" err="1" smtClean="0"/>
@@ -8773,8 +8932,9 @@
             </a:r>
             <a:r>
               <a:rPr lang="en-US" sz="5000" dirty="0" smtClean="0"/>
-              <a:t> root hash</a:t>
-            </a:r>
+              <a:t> trees</a:t>
+            </a:r>
+            <a:endParaRPr lang="en-US" sz="5000" dirty="0" smtClean="0"/>
           </a:p>
         </p:txBody>
       </p:sp>
@@ -8788,6 +8948,25 @@
   <p:clrMapOvr>
     <a:masterClrMapping/>
   </p:clrMapOvr>
+  <mc:AlternateContent xmlns:mc="http://schemas.openxmlformats.org/markup-compatibility/2006">
+    <mc:Choice xmlns:p14="http://schemas.microsoft.com/office/powerpoint/2010/main" Requires="p14">
+      <p:transition spd="med" p14:dur="700">
+        <p:fade/>
+      </p:transition>
+    </mc:Choice>
+    <mc:Fallback>
+      <p:transition spd="med">
+        <p:fade/>
+      </p:transition>
+    </mc:Fallback>
+  </mc:AlternateContent>
+  <p:timing>
+    <p:tnLst>
+      <p:par>
+        <p:cTn id="1" dur="indefinite" restart="never" nodeType="tmRoot"/>
+      </p:par>
+    </p:tnLst>
+  </p:timing>
 </p:sld>
 </file>
 

</xml_diff>